<commit_message>
Added alternative methods slide
</commit_message>
<xml_diff>
--- a/docs/In_class_presentation.pptx
+++ b/docs/In_class_presentation.pptx
@@ -5,7 +5,7 @@
     <p:sldMasterId id="2147483660" r:id="rId1"/>
   </p:sldMasterIdLst>
   <p:notesMasterIdLst>
-    <p:notesMasterId r:id="rId13"/>
+    <p:notesMasterId r:id="rId14"/>
   </p:notesMasterIdLst>
   <p:sldIdLst>
     <p:sldId id="256" r:id="rId2"/>
@@ -19,43 +19,44 @@
     <p:sldId id="265" r:id="rId10"/>
     <p:sldId id="266" r:id="rId11"/>
     <p:sldId id="267" r:id="rId12"/>
+    <p:sldId id="268" r:id="rId13"/>
   </p:sldIdLst>
   <p:sldSz cx="9144000" cy="6858000" type="screen4x3"/>
   <p:notesSz cx="6858000" cy="9144000"/>
   <p:embeddedFontLst>
     <p:embeddedFont>
       <p:font typeface="Calibri" panose="020F0502020204030204" pitchFamily="34" charset="0"/>
-      <p:regular r:id="rId14"/>
-      <p:bold r:id="rId15"/>
-      <p:italic r:id="rId16"/>
-      <p:boldItalic r:id="rId17"/>
+      <p:regular r:id="rId15"/>
+      <p:bold r:id="rId16"/>
+      <p:italic r:id="rId17"/>
+      <p:boldItalic r:id="rId18"/>
     </p:embeddedFont>
     <p:embeddedFont>
       <p:font typeface="Roboto" panose="02000000000000000000" pitchFamily="2" charset="0"/>
-      <p:regular r:id="rId18"/>
-      <p:bold r:id="rId19"/>
-      <p:italic r:id="rId20"/>
-      <p:boldItalic r:id="rId21"/>
+      <p:regular r:id="rId19"/>
+      <p:bold r:id="rId20"/>
+      <p:italic r:id="rId21"/>
+      <p:boldItalic r:id="rId22"/>
     </p:embeddedFont>
     <p:embeddedFont>
       <p:font typeface="Cambria Math" panose="02040503050406030204" pitchFamily="18" charset="0"/>
-      <p:regular r:id="rId22"/>
+      <p:regular r:id="rId23"/>
     </p:embeddedFont>
     <p:embeddedFont>
       <p:font typeface="Calibri Light" panose="020F0302020204030204" pitchFamily="34" charset="0"/>
-      <p:regular r:id="rId23"/>
-      <p:italic r:id="rId24"/>
+      <p:regular r:id="rId24"/>
+      <p:italic r:id="rId25"/>
     </p:embeddedFont>
     <p:embeddedFont>
       <p:font typeface="Roboto Condensed" panose="02000000000000000000" pitchFamily="2" charset="0"/>
-      <p:regular r:id="rId25"/>
-      <p:bold r:id="rId26"/>
-      <p:italic r:id="rId27"/>
-      <p:boldItalic r:id="rId28"/>
+      <p:regular r:id="rId26"/>
+      <p:bold r:id="rId27"/>
+      <p:italic r:id="rId28"/>
+      <p:boldItalic r:id="rId29"/>
     </p:embeddedFont>
     <p:embeddedFont>
       <p:font typeface="SimSun-ExtB" panose="02010609060101010101" pitchFamily="49" charset="-122"/>
-      <p:regular r:id="rId29"/>
+      <p:regular r:id="rId30"/>
     </p:embeddedFont>
   </p:embeddedFontLst>
   <p:defaultTextStyle>
@@ -168,7 +169,7 @@
             <p14:sldId id="260"/>
           </p14:sldIdLst>
         </p14:section>
-        <p14:section name="Graph analysis" id="{9BFA5E92-8BAD-4CD1-BED9-0F2A4F327F92}">
+        <p14:section name="Graph Analysis" id="{9BFA5E92-8BAD-4CD1-BED9-0F2A4F327F92}">
           <p14:sldIdLst>
             <p14:sldId id="261"/>
             <p14:sldId id="262"/>
@@ -178,6 +179,23 @@
             <p14:sldId id="266"/>
             <p14:sldId id="267"/>
           </p14:sldIdLst>
+        </p14:section>
+        <p14:section name="NoSQL Analysis" id="{83A7944F-BBBC-47C3-BC94-C9487F730C00}">
+          <p14:sldIdLst/>
+        </p14:section>
+        <p14:section name="SQL Analysis" id="{34994DFF-1E0E-4B50-B70B-A89FE70BA3FF}">
+          <p14:sldIdLst/>
+        </p14:section>
+        <p14:section name="Group Analysis" id="{2E426598-0376-4D6F-B35D-7C4234B72432}">
+          <p14:sldIdLst/>
+        </p14:section>
+        <p14:section name="Alternative Methods" id="{5B06AF51-F6CB-4B25-8BEC-6B88FF56FF19}">
+          <p14:sldIdLst>
+            <p14:sldId id="268"/>
+          </p14:sldIdLst>
+        </p14:section>
+        <p14:section name="Conclusions" id="{80FEFC96-5BF3-47E8-97C0-D4C347CD1431}">
+          <p14:sldIdLst/>
         </p14:section>
       </p14:sectionLst>
     </p:ext>
@@ -283,7 +301,6 @@
             <c:showLeaderLines val="0"/>
             <c:extLst>
               <c:ext xmlns:c15="http://schemas.microsoft.com/office/drawing/2012/chart" uri="{CE6537A1-D6FC-4f65-9D91-7224C49458BB}">
-                <c15:layout/>
                 <c15:showLeaderLines val="1"/>
                 <c15:leaderLines>
                   <c:spPr>
@@ -408,7 +425,6 @@
             <c:showLeaderLines val="0"/>
             <c:extLst>
               <c:ext xmlns:c15="http://schemas.microsoft.com/office/drawing/2012/chart" uri="{CE6537A1-D6FC-4f65-9D91-7224C49458BB}">
-                <c15:layout/>
                 <c15:showLeaderLines val="1"/>
                 <c15:leaderLines>
                   <c:spPr>
@@ -480,11 +496,11 @@
         </c:dLbls>
         <c:gapWidth val="150"/>
         <c:overlap val="-13"/>
-        <c:axId val="1638708928"/>
-        <c:axId val="1638709472"/>
+        <c:axId val="-20803216"/>
+        <c:axId val="-20797776"/>
       </c:barChart>
       <c:catAx>
-        <c:axId val="1638708928"/>
+        <c:axId val="-20803216"/>
         <c:scaling>
           <c:orientation val="minMax"/>
         </c:scaling>
@@ -527,7 +543,7 @@
             <a:endParaRPr lang="en-US"/>
           </a:p>
         </c:txPr>
-        <c:crossAx val="1638709472"/>
+        <c:crossAx val="-20797776"/>
         <c:crosses val="autoZero"/>
         <c:auto val="1"/>
         <c:lblAlgn val="ctr"/>
@@ -535,7 +551,7 @@
         <c:noMultiLvlLbl val="0"/>
       </c:catAx>
       <c:valAx>
-        <c:axId val="1638709472"/>
+        <c:axId val="-20797776"/>
         <c:scaling>
           <c:orientation val="minMax"/>
         </c:scaling>
@@ -658,7 +674,7 @@
             <a:endParaRPr lang="en-US"/>
           </a:p>
         </c:txPr>
-        <c:crossAx val="1638708928"/>
+        <c:crossAx val="-20803216"/>
         <c:crosses val="autoZero"/>
         <c:crossBetween val="between"/>
       </c:valAx>
@@ -826,7 +842,6 @@
             <c:showLeaderLines val="0"/>
             <c:extLst>
               <c:ext xmlns:c15="http://schemas.microsoft.com/office/drawing/2012/chart" uri="{CE6537A1-D6FC-4f65-9D91-7224C49458BB}">
-                <c15:layout/>
                 <c15:showLeaderLines val="1"/>
                 <c15:leaderLines>
                   <c:spPr>
@@ -933,7 +948,6 @@
             <c:showLeaderLines val="0"/>
             <c:extLst>
               <c:ext xmlns:c15="http://schemas.microsoft.com/office/drawing/2012/chart" uri="{CE6537A1-D6FC-4f65-9D91-7224C49458BB}">
-                <c15:layout/>
                 <c15:showLeaderLines val="1"/>
                 <c15:leaderLines>
                   <c:spPr>
@@ -2330,11 +2344,11 @@
         </c:dLbls>
         <c:gapWidth val="219"/>
         <c:overlap val="-27"/>
-        <c:axId val="1907859824"/>
-        <c:axId val="1907861456"/>
+        <c:axId val="-119003408"/>
+        <c:axId val="-119002864"/>
       </c:barChart>
       <c:catAx>
-        <c:axId val="1907859824"/>
+        <c:axId val="-119003408"/>
         <c:scaling>
           <c:orientation val="minMax"/>
         </c:scaling>
@@ -2377,7 +2391,7 @@
             <a:endParaRPr lang="en-US"/>
           </a:p>
         </c:txPr>
-        <c:crossAx val="1907861456"/>
+        <c:crossAx val="-119002864"/>
         <c:crosses val="autoZero"/>
         <c:auto val="1"/>
         <c:lblAlgn val="ctr"/>
@@ -2385,7 +2399,7 @@
         <c:noMultiLvlLbl val="0"/>
       </c:catAx>
       <c:valAx>
-        <c:axId val="1907861456"/>
+        <c:axId val="-119002864"/>
         <c:scaling>
           <c:orientation val="minMax"/>
         </c:scaling>
@@ -2440,7 +2454,6 @@
               </a:p>
             </c:rich>
           </c:tx>
-          <c:layout/>
           <c:overlay val="0"/>
           <c:spPr>
             <a:noFill/>
@@ -2501,7 +2514,7 @@
             <a:endParaRPr lang="en-US"/>
           </a:p>
         </c:txPr>
-        <c:crossAx val="1907859824"/>
+        <c:crossAx val="-119003408"/>
         <c:crosses val="autoZero"/>
         <c:crossBetween val="between"/>
       </c:valAx>
@@ -4147,6 +4160,90 @@
 </p:notes>
 </file>
 
+<file path=ppt/notesSlides/notesSlide11.xml><?xml version="1.0" encoding="utf-8"?>
+<p:notes xmlns:a="http://schemas.openxmlformats.org/drawingml/2006/main" xmlns:r="http://schemas.openxmlformats.org/officeDocument/2006/relationships" xmlns:p="http://schemas.openxmlformats.org/presentationml/2006/main">
+  <p:cSld>
+    <p:spTree>
+      <p:nvGrpSpPr>
+        <p:cNvPr id="1" name=""/>
+        <p:cNvGrpSpPr/>
+        <p:nvPr/>
+      </p:nvGrpSpPr>
+      <p:grpSpPr>
+        <a:xfrm>
+          <a:off x="0" y="0"/>
+          <a:ext cx="0" cy="0"/>
+          <a:chOff x="0" y="0"/>
+          <a:chExt cx="0" cy="0"/>
+        </a:xfrm>
+      </p:grpSpPr>
+      <p:sp>
+        <p:nvSpPr>
+          <p:cNvPr id="2" name="Slide Image Placeholder 1"/>
+          <p:cNvSpPr>
+            <a:spLocks noGrp="1" noRot="1" noChangeAspect="1"/>
+          </p:cNvSpPr>
+          <p:nvPr>
+            <p:ph type="sldImg"/>
+          </p:nvPr>
+        </p:nvSpPr>
+        <p:spPr/>
+      </p:sp>
+      <p:sp>
+        <p:nvSpPr>
+          <p:cNvPr id="3" name="Notes Placeholder 2"/>
+          <p:cNvSpPr>
+            <a:spLocks noGrp="1"/>
+          </p:cNvSpPr>
+          <p:nvPr>
+            <p:ph type="body" idx="1"/>
+          </p:nvPr>
+        </p:nvSpPr>
+        <p:spPr/>
+        <p:txBody>
+          <a:bodyPr/>
+          <a:lstStyle/>
+          <a:p>
+            <a:endParaRPr lang="en-US" dirty="0"/>
+          </a:p>
+        </p:txBody>
+      </p:sp>
+      <p:sp>
+        <p:nvSpPr>
+          <p:cNvPr id="4" name="Slide Number Placeholder 3"/>
+          <p:cNvSpPr>
+            <a:spLocks noGrp="1"/>
+          </p:cNvSpPr>
+          <p:nvPr>
+            <p:ph type="sldNum" sz="quarter" idx="10"/>
+          </p:nvPr>
+        </p:nvSpPr>
+        <p:spPr/>
+        <p:txBody>
+          <a:bodyPr/>
+          <a:lstStyle/>
+          <a:p>
+            <a:fld id="{47272002-7BE1-4FC8-A434-AC40FF9D9210}" type="slidenum">
+              <a:rPr lang="en-US" smtClean="0"/>
+              <a:t>12</a:t>
+            </a:fld>
+            <a:endParaRPr lang="en-US"/>
+          </a:p>
+        </p:txBody>
+      </p:sp>
+    </p:spTree>
+    <p:extLst>
+      <p:ext uri="{BB962C8B-B14F-4D97-AF65-F5344CB8AC3E}">
+        <p14:creationId xmlns:p14="http://schemas.microsoft.com/office/powerpoint/2010/main" val="3229663771"/>
+      </p:ext>
+    </p:extLst>
+  </p:cSld>
+  <p:clrMapOvr>
+    <a:masterClrMapping/>
+  </p:clrMapOvr>
+</p:notes>
+</file>
+
 <file path=ppt/notesSlides/notesSlide2.xml><?xml version="1.0" encoding="utf-8"?>
 <p:notes xmlns:a="http://schemas.openxmlformats.org/drawingml/2006/main" xmlns:r="http://schemas.openxmlformats.org/officeDocument/2006/relationships" xmlns:p="http://schemas.openxmlformats.org/presentationml/2006/main">
   <p:cSld>
@@ -7823,17 +7920,7 @@
                 <a:latin typeface="Roboto Condensed" panose="02000000000000000000" pitchFamily="2" charset="0"/>
                 <a:ea typeface="Roboto Condensed" panose="02000000000000000000" pitchFamily="2" charset="0"/>
               </a:rPr>
-              <a:t>JUSTIN </a:t>
-            </a:r>
-            <a:r>
-              <a:rPr lang="en-US" dirty="0" smtClean="0">
-                <a:solidFill>
-                  <a:srgbClr val="5BC4FF"/>
-                </a:solidFill>
-                <a:latin typeface="Roboto Condensed" panose="02000000000000000000" pitchFamily="2" charset="0"/>
-                <a:ea typeface="Roboto Condensed" panose="02000000000000000000" pitchFamily="2" charset="0"/>
-              </a:rPr>
-              <a:t>ALBANO   •   </a:t>
+              <a:t>JUSTIN ALBANO   •   </a:t>
             </a:r>
             <a:r>
               <a:rPr lang="en-US" dirty="0">
@@ -7930,14 +8017,6 @@
               </a:rPr>
               <a:t>http://fc06.deviantart.net/fs71/f/2012/346/f/d/blueprint_3d_iphone_5_by_dracu_teufel666-d5nsnqe.jpg</a:t>
             </a:r>
-            <a:endParaRPr lang="en-US" sz="900" dirty="0">
-              <a:solidFill>
-                <a:schemeClr val="accent1">
-                  <a:lumMod val="60000"/>
-                  <a:lumOff val="40000"/>
-                </a:schemeClr>
-              </a:solidFill>
-            </a:endParaRPr>
           </a:p>
         </p:txBody>
       </p:sp>
@@ -8223,11 +8302,6 @@
               </a:rPr>
               <a:t>Albano, Jones, Tournour</a:t>
             </a:r>
-            <a:endParaRPr lang="en-US" sz="1100" b="1" cap="all" dirty="0">
-              <a:solidFill>
-                <a:srgbClr val="252525"/>
-              </a:solidFill>
-            </a:endParaRPr>
           </a:p>
         </p:txBody>
       </p:sp>
@@ -8512,13 +8586,13 @@
   <p:clrMapOvr>
     <a:masterClrMapping/>
   </p:clrMapOvr>
-  <mc:AlternateContent xmlns:mc="http://schemas.openxmlformats.org/markup-compatibility/2006">
-    <mc:Choice xmlns:p14="http://schemas.microsoft.com/office/powerpoint/2010/main" Requires="p14">
+  <mc:AlternateContent xmlns:mc="http://schemas.openxmlformats.org/markup-compatibility/2006" xmlns:p14="http://schemas.microsoft.com/office/powerpoint/2010/main">
+    <mc:Choice Requires="p14">
       <p:transition spd="med" p14:dur="700">
         <p:fade/>
       </p:transition>
     </mc:Choice>
-    <mc:Fallback>
+    <mc:Fallback xmlns="">
       <p:transition spd="med">
         <p:fade/>
       </p:transition>
@@ -8761,11 +8835,6 @@
               </a:rPr>
               <a:t>Albano, Jones, Tournour</a:t>
             </a:r>
-            <a:endParaRPr lang="en-US" sz="1100" b="1" cap="all" dirty="0">
-              <a:solidFill>
-                <a:srgbClr val="252525"/>
-              </a:solidFill>
-            </a:endParaRPr>
           </a:p>
         </p:txBody>
       </p:sp>
@@ -9123,6 +9192,970 @@
     <p:extLst>
       <p:ext uri="{BB962C8B-B14F-4D97-AF65-F5344CB8AC3E}">
         <p14:creationId xmlns:p14="http://schemas.microsoft.com/office/powerpoint/2010/main" val="922106471"/>
+      </p:ext>
+    </p:extLst>
+  </p:cSld>
+  <p:clrMapOvr>
+    <a:masterClrMapping/>
+  </p:clrMapOvr>
+  <mc:AlternateContent xmlns:mc="http://schemas.openxmlformats.org/markup-compatibility/2006" xmlns:p14="http://schemas.microsoft.com/office/powerpoint/2010/main">
+    <mc:Choice Requires="p14">
+      <p:transition spd="med" p14:dur="700">
+        <p:fade/>
+      </p:transition>
+    </mc:Choice>
+    <mc:Fallback xmlns="">
+      <p:transition spd="med">
+        <p:fade/>
+      </p:transition>
+    </mc:Fallback>
+  </mc:AlternateContent>
+  <p:timing>
+    <p:tnLst>
+      <p:par>
+        <p:cTn id="1" dur="indefinite" restart="never" nodeType="tmRoot"/>
+      </p:par>
+    </p:tnLst>
+  </p:timing>
+</p:sld>
+</file>
+
+<file path=ppt/slides/slide12.xml><?xml version="1.0" encoding="utf-8"?>
+<p:sld xmlns:a="http://schemas.openxmlformats.org/drawingml/2006/main" xmlns:r="http://schemas.openxmlformats.org/officeDocument/2006/relationships" xmlns:p="http://schemas.openxmlformats.org/presentationml/2006/main">
+  <p:cSld>
+    <p:spTree>
+      <p:nvGrpSpPr>
+        <p:cNvPr id="1" name=""/>
+        <p:cNvGrpSpPr/>
+        <p:nvPr/>
+      </p:nvGrpSpPr>
+      <p:grpSpPr>
+        <a:xfrm>
+          <a:off x="0" y="0"/>
+          <a:ext cx="0" cy="0"/>
+          <a:chOff x="0" y="0"/>
+          <a:chExt cx="0" cy="0"/>
+        </a:xfrm>
+      </p:grpSpPr>
+      <p:sp>
+        <p:nvSpPr>
+          <p:cNvPr id="29" name="Rectangle 28"/>
+          <p:cNvSpPr/>
+          <p:nvPr/>
+        </p:nvSpPr>
+        <p:spPr>
+          <a:xfrm>
+            <a:off x="0" y="457200"/>
+            <a:ext cx="9144000" cy="914400"/>
+          </a:xfrm>
+          <a:prstGeom prst="rect">
+            <a:avLst/>
+          </a:prstGeom>
+          <a:solidFill>
+            <a:srgbClr val="252525"/>
+          </a:solidFill>
+          <a:ln>
+            <a:noFill/>
+          </a:ln>
+        </p:spPr>
+        <p:style>
+          <a:lnRef idx="2">
+            <a:schemeClr val="accent1">
+              <a:shade val="50000"/>
+            </a:schemeClr>
+          </a:lnRef>
+          <a:fillRef idx="1">
+            <a:schemeClr val="accent1"/>
+          </a:fillRef>
+          <a:effectRef idx="0">
+            <a:schemeClr val="accent1"/>
+          </a:effectRef>
+          <a:fontRef idx="minor">
+            <a:schemeClr val="lt1"/>
+          </a:fontRef>
+        </p:style>
+        <p:txBody>
+          <a:bodyPr rtlCol="0" anchor="ctr"/>
+          <a:lstStyle/>
+          <a:p>
+            <a:pPr algn="ctr"/>
+            <a:endParaRPr lang="en-US"/>
+          </a:p>
+        </p:txBody>
+      </p:sp>
+      <p:sp>
+        <p:nvSpPr>
+          <p:cNvPr id="30" name="Rectangle 29"/>
+          <p:cNvSpPr/>
+          <p:nvPr/>
+        </p:nvSpPr>
+        <p:spPr>
+          <a:xfrm>
+            <a:off x="457200" y="0"/>
+            <a:ext cx="1524000" cy="457200"/>
+          </a:xfrm>
+          <a:prstGeom prst="rect">
+            <a:avLst/>
+          </a:prstGeom>
+          <a:solidFill>
+            <a:srgbClr val="0066A0"/>
+          </a:solidFill>
+          <a:ln>
+            <a:noFill/>
+          </a:ln>
+        </p:spPr>
+        <p:style>
+          <a:lnRef idx="2">
+            <a:schemeClr val="accent1">
+              <a:shade val="50000"/>
+            </a:schemeClr>
+          </a:lnRef>
+          <a:fillRef idx="1">
+            <a:schemeClr val="accent1"/>
+          </a:fillRef>
+          <a:effectRef idx="0">
+            <a:schemeClr val="accent1"/>
+          </a:effectRef>
+          <a:fontRef idx="minor">
+            <a:schemeClr val="lt1"/>
+          </a:fontRef>
+        </p:style>
+        <p:txBody>
+          <a:bodyPr rtlCol="0" anchor="ctr"/>
+          <a:lstStyle/>
+          <a:p>
+            <a:pPr algn="ctr"/>
+            <a:endParaRPr lang="en-US"/>
+          </a:p>
+        </p:txBody>
+      </p:sp>
+      <p:sp>
+        <p:nvSpPr>
+          <p:cNvPr id="31" name="TextBox 30"/>
+          <p:cNvSpPr txBox="1"/>
+          <p:nvPr/>
+        </p:nvSpPr>
+        <p:spPr>
+          <a:xfrm>
+            <a:off x="457200" y="76200"/>
+            <a:ext cx="1524000" cy="430887"/>
+          </a:xfrm>
+          <a:prstGeom prst="rect">
+            <a:avLst/>
+          </a:prstGeom>
+          <a:noFill/>
+        </p:spPr>
+        <p:txBody>
+          <a:bodyPr wrap="square" rtlCol="0">
+            <a:spAutoFit/>
+          </a:bodyPr>
+          <a:lstStyle/>
+          <a:p>
+            <a:pPr algn="ctr"/>
+            <a:r>
+              <a:rPr lang="en-US" sz="1100" b="1" dirty="0" smtClean="0">
+                <a:solidFill>
+                  <a:schemeClr val="bg1"/>
+                </a:solidFill>
+                <a:latin typeface="+mj-lt"/>
+                <a:ea typeface="SimSun-ExtB" panose="02010609060101010101" pitchFamily="49" charset="-122"/>
+                <a:cs typeface="Arial" panose="020B0604020202020204" pitchFamily="34" charset="0"/>
+              </a:rPr>
+              <a:t>PERFORMANCE ANALYSIS</a:t>
+            </a:r>
+            <a:endParaRPr lang="en-US" sz="1100" b="1" dirty="0">
+              <a:solidFill>
+                <a:schemeClr val="bg1"/>
+              </a:solidFill>
+              <a:latin typeface="+mj-lt"/>
+              <a:ea typeface="SimSun-ExtB" panose="02010609060101010101" pitchFamily="49" charset="-122"/>
+              <a:cs typeface="Arial" panose="020B0604020202020204" pitchFamily="34" charset="0"/>
+            </a:endParaRPr>
+          </a:p>
+        </p:txBody>
+      </p:sp>
+      <p:sp>
+        <p:nvSpPr>
+          <p:cNvPr id="32" name="TextBox 31"/>
+          <p:cNvSpPr txBox="1"/>
+          <p:nvPr/>
+        </p:nvSpPr>
+        <p:spPr>
+          <a:xfrm>
+            <a:off x="304800" y="683567"/>
+            <a:ext cx="4267200" cy="461665"/>
+          </a:xfrm>
+          <a:prstGeom prst="rect">
+            <a:avLst/>
+          </a:prstGeom>
+          <a:noFill/>
+        </p:spPr>
+        <p:txBody>
+          <a:bodyPr wrap="square" rtlCol="0">
+            <a:spAutoFit/>
+          </a:bodyPr>
+          <a:lstStyle/>
+          <a:p>
+            <a:r>
+              <a:rPr lang="en-US" sz="2400" dirty="0" smtClean="0">
+                <a:solidFill>
+                  <a:schemeClr val="bg1"/>
+                </a:solidFill>
+                <a:latin typeface="Roboto Condensed"/>
+                <a:ea typeface="Roboto Condensed" pitchFamily="2" charset="0"/>
+              </a:rPr>
+              <a:t>Alternative Methods</a:t>
+            </a:r>
+            <a:endParaRPr lang="en-US" sz="2400" dirty="0">
+              <a:solidFill>
+                <a:schemeClr val="bg1"/>
+              </a:solidFill>
+              <a:latin typeface="Roboto Condensed"/>
+              <a:ea typeface="Roboto Condensed" pitchFamily="2" charset="0"/>
+            </a:endParaRPr>
+          </a:p>
+        </p:txBody>
+      </p:sp>
+      <p:sp>
+        <p:nvSpPr>
+          <p:cNvPr id="33" name="TextBox 32"/>
+          <p:cNvSpPr txBox="1"/>
+          <p:nvPr/>
+        </p:nvSpPr>
+        <p:spPr>
+          <a:xfrm>
+            <a:off x="6308764" y="97795"/>
+            <a:ext cx="2759036" cy="261610"/>
+          </a:xfrm>
+          <a:prstGeom prst="rect">
+            <a:avLst/>
+          </a:prstGeom>
+          <a:noFill/>
+        </p:spPr>
+        <p:txBody>
+          <a:bodyPr wrap="square" rtlCol="0">
+            <a:spAutoFit/>
+          </a:bodyPr>
+          <a:lstStyle/>
+          <a:p>
+            <a:pPr algn="r"/>
+            <a:r>
+              <a:rPr lang="en-US" sz="1100" b="1" cap="all" dirty="0">
+                <a:solidFill>
+                  <a:srgbClr val="252525"/>
+                </a:solidFill>
+              </a:rPr>
+              <a:t>Albano, Jones, Tournour</a:t>
+            </a:r>
+          </a:p>
+        </p:txBody>
+      </p:sp>
+      <p:sp>
+        <p:nvSpPr>
+          <p:cNvPr id="34" name="Isosceles Triangle 33"/>
+          <p:cNvSpPr/>
+          <p:nvPr/>
+        </p:nvSpPr>
+        <p:spPr>
+          <a:xfrm flipV="1">
+            <a:off x="457200" y="457200"/>
+            <a:ext cx="1524000" cy="152400"/>
+          </a:xfrm>
+          <a:prstGeom prst="triangle">
+            <a:avLst/>
+          </a:prstGeom>
+          <a:solidFill>
+            <a:srgbClr val="0066A0"/>
+          </a:solidFill>
+          <a:ln>
+            <a:noFill/>
+          </a:ln>
+        </p:spPr>
+        <p:style>
+          <a:lnRef idx="2">
+            <a:schemeClr val="accent1">
+              <a:shade val="50000"/>
+            </a:schemeClr>
+          </a:lnRef>
+          <a:fillRef idx="1">
+            <a:schemeClr val="accent1"/>
+          </a:fillRef>
+          <a:effectRef idx="0">
+            <a:schemeClr val="accent1"/>
+          </a:effectRef>
+          <a:fontRef idx="minor">
+            <a:schemeClr val="lt1"/>
+          </a:fontRef>
+        </p:style>
+        <p:txBody>
+          <a:bodyPr rtlCol="0" anchor="ctr"/>
+          <a:lstStyle/>
+          <a:p>
+            <a:pPr algn="ctr"/>
+            <a:endParaRPr lang="en-US"/>
+          </a:p>
+        </p:txBody>
+      </p:sp>
+      <p:sp>
+        <p:nvSpPr>
+          <p:cNvPr id="50" name="TextBox 49"/>
+          <p:cNvSpPr txBox="1"/>
+          <p:nvPr/>
+        </p:nvSpPr>
+        <p:spPr>
+          <a:xfrm>
+            <a:off x="304799" y="1684117"/>
+            <a:ext cx="4015991" cy="461665"/>
+          </a:xfrm>
+          <a:prstGeom prst="rect">
+            <a:avLst/>
+          </a:prstGeom>
+          <a:noFill/>
+        </p:spPr>
+        <p:txBody>
+          <a:bodyPr wrap="square" rtlCol="0">
+            <a:spAutoFit/>
+          </a:bodyPr>
+          <a:lstStyle/>
+          <a:p>
+            <a:r>
+              <a:rPr lang="en-US" sz="2400" dirty="0" smtClean="0">
+                <a:solidFill>
+                  <a:srgbClr val="3A3A3A"/>
+                </a:solidFill>
+                <a:latin typeface="Roboto Condensed" pitchFamily="2" charset="0"/>
+                <a:ea typeface="Roboto Condensed" pitchFamily="2" charset="0"/>
+              </a:rPr>
+              <a:t>Analytical Modeling</a:t>
+            </a:r>
+            <a:endParaRPr lang="en-US" sz="2400" dirty="0">
+              <a:solidFill>
+                <a:srgbClr val="3A3A3A"/>
+              </a:solidFill>
+              <a:latin typeface="Roboto Condensed" pitchFamily="2" charset="0"/>
+              <a:ea typeface="Roboto Condensed" pitchFamily="2" charset="0"/>
+            </a:endParaRPr>
+          </a:p>
+        </p:txBody>
+      </p:sp>
+      <mc:AlternateContent xmlns:mc="http://schemas.openxmlformats.org/markup-compatibility/2006">
+        <mc:Choice xmlns:a14="http://schemas.microsoft.com/office/drawing/2010/main" Requires="a14">
+          <p:sp>
+            <p:nvSpPr>
+              <p:cNvPr id="51" name="TextBox 50"/>
+              <p:cNvSpPr txBox="1"/>
+              <p:nvPr/>
+            </p:nvSpPr>
+            <p:spPr>
+              <a:xfrm>
+                <a:off x="304799" y="2203545"/>
+                <a:ext cx="8155913" cy="1705082"/>
+              </a:xfrm>
+              <a:prstGeom prst="rect">
+                <a:avLst/>
+              </a:prstGeom>
+              <a:noFill/>
+            </p:spPr>
+            <p:txBody>
+              <a:bodyPr wrap="square" rtlCol="0">
+                <a:spAutoFit/>
+              </a:bodyPr>
+              <a:lstStyle/>
+              <a:p>
+                <a:pPr marL="342900" indent="-342900">
+                  <a:spcAft>
+                    <a:spcPts val="800"/>
+                  </a:spcAft>
+                  <a:buFont typeface="Arial" panose="020B0604020202020204" pitchFamily="34" charset="0"/>
+                  <a:buChar char="•"/>
+                </a:pPr>
+                <a:r>
+                  <a:rPr lang="en-US" dirty="0" smtClean="0">
+                    <a:solidFill>
+                      <a:schemeClr val="tx1">
+                        <a:lumMod val="50000"/>
+                        <a:lumOff val="50000"/>
+                      </a:schemeClr>
+                    </a:solidFill>
+                    <a:latin typeface="Roboto Condensed" pitchFamily="2" charset="0"/>
+                    <a:ea typeface="Roboto Condensed" pitchFamily="2" charset="0"/>
+                  </a:rPr>
+                  <a:t>For example, graph operations can be divided into micro-, micro-, and algorithmic operations, and the execution of the higher-level operations are a function of the execution of lower-level operations</a:t>
+                </a:r>
+              </a:p>
+              <a:p>
+                <a:pPr marL="800100" lvl="1" indent="-342900">
+                  <a:spcAft>
+                    <a:spcPts val="800"/>
+                  </a:spcAft>
+                  <a:buFont typeface="Arial" panose="020B0604020202020204" pitchFamily="34" charset="0"/>
+                  <a:buChar char="•"/>
+                </a:pPr>
+                <a:r>
+                  <a:rPr lang="en-US" dirty="0" smtClean="0">
+                    <a:solidFill>
+                      <a:schemeClr val="tx1">
+                        <a:lumMod val="50000"/>
+                        <a:lumOff val="50000"/>
+                      </a:schemeClr>
+                    </a:solidFill>
+                    <a:latin typeface="Roboto Condensed" pitchFamily="2" charset="0"/>
+                    <a:ea typeface="Roboto Condensed" pitchFamily="2" charset="0"/>
+                  </a:rPr>
+                  <a:t>Reading a vertex, edge, or property: </a:t>
+                </a:r>
+                <a14:m>
+                  <m:oMath xmlns:m="http://schemas.openxmlformats.org/officeDocument/2006/math">
+                    <m:r>
+                      <a:rPr lang="en-US" b="0" i="1" smtClean="0">
+                        <a:solidFill>
+                          <a:schemeClr val="tx1">
+                            <a:lumMod val="50000"/>
+                            <a:lumOff val="50000"/>
+                          </a:schemeClr>
+                        </a:solidFill>
+                        <a:latin typeface="Cambria Math" panose="02040503050406030204" pitchFamily="18" charset="0"/>
+                        <a:ea typeface="Roboto Condensed" pitchFamily="2" charset="0"/>
+                      </a:rPr>
+                      <m:t>𝑅</m:t>
+                    </m:r>
+                  </m:oMath>
+                </a14:m>
+                <a:endParaRPr lang="en-US" dirty="0" smtClean="0">
+                  <a:solidFill>
+                    <a:schemeClr val="tx1">
+                      <a:lumMod val="50000"/>
+                      <a:lumOff val="50000"/>
+                    </a:schemeClr>
+                  </a:solidFill>
+                  <a:latin typeface="Roboto Condensed" pitchFamily="2" charset="0"/>
+                  <a:ea typeface="Roboto Condensed" pitchFamily="2" charset="0"/>
+                </a:endParaRPr>
+              </a:p>
+              <a:p>
+                <a:pPr marL="800100" lvl="1" indent="-342900">
+                  <a:spcAft>
+                    <a:spcPts val="800"/>
+                  </a:spcAft>
+                  <a:buFont typeface="Arial" panose="020B0604020202020204" pitchFamily="34" charset="0"/>
+                  <a:buChar char="•"/>
+                </a:pPr>
+                <a:r>
+                  <a:rPr lang="en-US" dirty="0" smtClean="0">
+                    <a:solidFill>
+                      <a:schemeClr val="tx1">
+                        <a:lumMod val="50000"/>
+                        <a:lumOff val="50000"/>
+                      </a:schemeClr>
+                    </a:solidFill>
+                    <a:latin typeface="Roboto Condensed" pitchFamily="2" charset="0"/>
+                    <a:ea typeface="Roboto Condensed" pitchFamily="2" charset="0"/>
+                  </a:rPr>
+                  <a:t>Get </a:t>
+                </a:r>
+                <a:r>
+                  <a:rPr lang="en-US" dirty="0">
+                    <a:solidFill>
+                      <a:schemeClr val="tx1">
+                        <a:lumMod val="50000"/>
+                        <a:lumOff val="50000"/>
+                      </a:schemeClr>
+                    </a:solidFill>
+                    <a:latin typeface="Roboto Condensed" pitchFamily="2" charset="0"/>
+                    <a:ea typeface="Roboto Condensed" pitchFamily="2" charset="0"/>
+                  </a:rPr>
+                  <a:t>all neighbors via incoming, outgoing, both </a:t>
+                </a:r>
+                <a:r>
+                  <a:rPr lang="en-US" dirty="0" smtClean="0">
+                    <a:solidFill>
+                      <a:schemeClr val="tx1">
+                        <a:lumMod val="50000"/>
+                        <a:lumOff val="50000"/>
+                      </a:schemeClr>
+                    </a:solidFill>
+                    <a:latin typeface="Roboto Condensed" pitchFamily="2" charset="0"/>
+                    <a:ea typeface="Roboto Condensed" pitchFamily="2" charset="0"/>
+                  </a:rPr>
+                  <a:t>edges: </a:t>
+                </a:r>
+                <a14:m>
+                  <m:oMath xmlns:m="http://schemas.openxmlformats.org/officeDocument/2006/math">
+                    <m:r>
+                      <a:rPr lang="en-US" b="0" i="1" smtClean="0">
+                        <a:solidFill>
+                          <a:schemeClr val="tx1">
+                            <a:lumMod val="50000"/>
+                            <a:lumOff val="50000"/>
+                          </a:schemeClr>
+                        </a:solidFill>
+                        <a:latin typeface="Cambria Math" panose="02040503050406030204" pitchFamily="18" charset="0"/>
+                        <a:ea typeface="Roboto Condensed" pitchFamily="2" charset="0"/>
+                      </a:rPr>
+                      <m:t>2</m:t>
+                    </m:r>
+                    <m:r>
+                      <a:rPr lang="en-US" b="0" i="1" smtClean="0">
+                        <a:solidFill>
+                          <a:schemeClr val="tx1">
+                            <a:lumMod val="50000"/>
+                            <a:lumOff val="50000"/>
+                          </a:schemeClr>
+                        </a:solidFill>
+                        <a:latin typeface="Cambria Math" panose="02040503050406030204" pitchFamily="18" charset="0"/>
+                        <a:ea typeface="Roboto Condensed" pitchFamily="2" charset="0"/>
+                      </a:rPr>
+                      <m:t>𝑛𝑅</m:t>
+                    </m:r>
+                  </m:oMath>
+                </a14:m>
+                <a:r>
+                  <a:rPr lang="en-US" dirty="0" smtClean="0">
+                    <a:solidFill>
+                      <a:schemeClr val="tx1">
+                        <a:lumMod val="50000"/>
+                        <a:lumOff val="50000"/>
+                      </a:schemeClr>
+                    </a:solidFill>
+                    <a:latin typeface="Roboto Condensed" pitchFamily="2" charset="0"/>
+                    <a:ea typeface="Roboto Condensed" pitchFamily="2" charset="0"/>
+                  </a:rPr>
+                  <a:t>, </a:t>
+                </a:r>
+                <a14:m>
+                  <m:oMath xmlns:m="http://schemas.openxmlformats.org/officeDocument/2006/math">
+                    <m:r>
+                      <a:rPr lang="en-US" b="0" i="1" smtClean="0">
+                        <a:solidFill>
+                          <a:schemeClr val="tx1">
+                            <a:lumMod val="50000"/>
+                            <a:lumOff val="50000"/>
+                          </a:schemeClr>
+                        </a:solidFill>
+                        <a:latin typeface="Cambria Math" panose="02040503050406030204" pitchFamily="18" charset="0"/>
+                        <a:ea typeface="Roboto Condensed" pitchFamily="2" charset="0"/>
+                      </a:rPr>
+                      <m:t>𝑛</m:t>
+                    </m:r>
+                    <m:r>
+                      <a:rPr lang="en-US" b="0" i="1" smtClean="0">
+                        <a:solidFill>
+                          <a:schemeClr val="tx1">
+                            <a:lumMod val="50000"/>
+                            <a:lumOff val="50000"/>
+                          </a:schemeClr>
+                        </a:solidFill>
+                        <a:latin typeface="Cambria Math" panose="02040503050406030204" pitchFamily="18" charset="0"/>
+                        <a:ea typeface="Cambria Math" panose="02040503050406030204" pitchFamily="18" charset="0"/>
+                      </a:rPr>
+                      <m:t>≡</m:t>
+                    </m:r>
+                    <m:r>
+                      <a:rPr lang="en-US" b="0" i="1" smtClean="0">
+                        <a:solidFill>
+                          <a:schemeClr val="tx1">
+                            <a:lumMod val="50000"/>
+                            <a:lumOff val="50000"/>
+                          </a:schemeClr>
+                        </a:solidFill>
+                        <a:latin typeface="Cambria Math" panose="02040503050406030204" pitchFamily="18" charset="0"/>
+                        <a:ea typeface="Cambria Math" panose="02040503050406030204" pitchFamily="18" charset="0"/>
+                      </a:rPr>
+                      <m:t>𝑐𝑜𝑢𝑛</m:t>
+                    </m:r>
+                    <m:sSub>
+                      <m:sSubPr>
+                        <m:ctrlPr>
+                          <a:rPr lang="en-US" b="0" i="1" smtClean="0">
+                            <a:solidFill>
+                              <a:schemeClr val="tx1">
+                                <a:lumMod val="50000"/>
+                                <a:lumOff val="50000"/>
+                              </a:schemeClr>
+                            </a:solidFill>
+                            <a:latin typeface="Cambria Math" panose="02040503050406030204" pitchFamily="18" charset="0"/>
+                            <a:ea typeface="Cambria Math" panose="02040503050406030204" pitchFamily="18" charset="0"/>
+                          </a:rPr>
+                        </m:ctrlPr>
+                      </m:sSubPr>
+                      <m:e>
+                        <m:r>
+                          <a:rPr lang="en-US" b="0" i="1" smtClean="0">
+                            <a:solidFill>
+                              <a:schemeClr val="tx1">
+                                <a:lumMod val="50000"/>
+                                <a:lumOff val="50000"/>
+                              </a:schemeClr>
+                            </a:solidFill>
+                            <a:latin typeface="Cambria Math" panose="02040503050406030204" pitchFamily="18" charset="0"/>
+                            <a:ea typeface="Cambria Math" panose="02040503050406030204" pitchFamily="18" charset="0"/>
+                          </a:rPr>
+                          <m:t>𝑡</m:t>
+                        </m:r>
+                      </m:e>
+                      <m:sub>
+                        <m:r>
+                          <a:rPr lang="en-US" b="0" i="1" smtClean="0">
+                            <a:solidFill>
+                              <a:schemeClr val="tx1">
+                                <a:lumMod val="50000"/>
+                                <a:lumOff val="50000"/>
+                              </a:schemeClr>
+                            </a:solidFill>
+                            <a:latin typeface="Cambria Math" panose="02040503050406030204" pitchFamily="18" charset="0"/>
+                            <a:ea typeface="Cambria Math" panose="02040503050406030204" pitchFamily="18" charset="0"/>
+                          </a:rPr>
+                          <m:t>𝑛𝑒𝑖𝑔h𝑏𝑜𝑟𝑠</m:t>
+                        </m:r>
+                      </m:sub>
+                    </m:sSub>
+                  </m:oMath>
+                </a14:m>
+                <a:endParaRPr lang="en-US" dirty="0" smtClean="0">
+                  <a:solidFill>
+                    <a:schemeClr val="tx1">
+                      <a:lumMod val="50000"/>
+                      <a:lumOff val="50000"/>
+                    </a:schemeClr>
+                  </a:solidFill>
+                  <a:latin typeface="Roboto Condensed" pitchFamily="2" charset="0"/>
+                  <a:ea typeface="Roboto Condensed" pitchFamily="2" charset="0"/>
+                </a:endParaRPr>
+              </a:p>
+            </p:txBody>
+          </p:sp>
+        </mc:Choice>
+        <mc:Fallback>
+          <p:sp>
+            <p:nvSpPr>
+              <p:cNvPr id="51" name="TextBox 50"/>
+              <p:cNvSpPr txBox="1">
+                <a:spLocks noRot="1" noChangeAspect="1" noMove="1" noResize="1" noEditPoints="1" noAdjustHandles="1" noChangeArrowheads="1" noChangeShapeType="1" noTextEdit="1"/>
+              </p:cNvSpPr>
+              <p:nvPr/>
+            </p:nvSpPr>
+            <p:spPr>
+              <a:xfrm>
+                <a:off x="304799" y="2203545"/>
+                <a:ext cx="8155913" cy="1705082"/>
+              </a:xfrm>
+              <a:prstGeom prst="rect">
+                <a:avLst/>
+              </a:prstGeom>
+              <a:blipFill rotWithShape="0">
+                <a:blip r:embed="rId3"/>
+                <a:stretch>
+                  <a:fillRect l="-448" t="-1786" b="-3214"/>
+                </a:stretch>
+              </a:blipFill>
+            </p:spPr>
+            <p:txBody>
+              <a:bodyPr/>
+              <a:lstStyle/>
+              <a:p>
+                <a:r>
+                  <a:rPr lang="en-US">
+                    <a:noFill/>
+                  </a:rPr>
+                  <a:t> </a:t>
+                </a:r>
+              </a:p>
+            </p:txBody>
+          </p:sp>
+        </mc:Fallback>
+      </mc:AlternateContent>
+      <p:sp>
+        <p:nvSpPr>
+          <p:cNvPr id="28" name="Rectangle 27"/>
+          <p:cNvSpPr/>
+          <p:nvPr/>
+        </p:nvSpPr>
+        <p:spPr>
+          <a:xfrm>
+            <a:off x="0" y="6324600"/>
+            <a:ext cx="9144000" cy="533400"/>
+          </a:xfrm>
+          <a:prstGeom prst="rect">
+            <a:avLst/>
+          </a:prstGeom>
+          <a:solidFill>
+            <a:srgbClr val="D1D1D1"/>
+          </a:solidFill>
+          <a:ln>
+            <a:noFill/>
+          </a:ln>
+        </p:spPr>
+        <p:style>
+          <a:lnRef idx="2">
+            <a:schemeClr val="accent1">
+              <a:shade val="50000"/>
+            </a:schemeClr>
+          </a:lnRef>
+          <a:fillRef idx="1">
+            <a:schemeClr val="accent1"/>
+          </a:fillRef>
+          <a:effectRef idx="0">
+            <a:schemeClr val="accent1"/>
+          </a:effectRef>
+          <a:fontRef idx="minor">
+            <a:schemeClr val="lt1"/>
+          </a:fontRef>
+        </p:style>
+        <p:txBody>
+          <a:bodyPr rtlCol="0" anchor="ctr"/>
+          <a:lstStyle/>
+          <a:p>
+            <a:pPr algn="ctr"/>
+            <a:endParaRPr lang="en-US"/>
+          </a:p>
+        </p:txBody>
+      </p:sp>
+      <p:sp>
+        <p:nvSpPr>
+          <p:cNvPr id="37" name="Rectangle 36"/>
+          <p:cNvSpPr/>
+          <p:nvPr/>
+        </p:nvSpPr>
+        <p:spPr>
+          <a:xfrm>
+            <a:off x="78289" y="6452800"/>
+            <a:ext cx="2767104" cy="261610"/>
+          </a:xfrm>
+          <a:prstGeom prst="rect">
+            <a:avLst/>
+          </a:prstGeom>
+        </p:spPr>
+        <p:txBody>
+          <a:bodyPr wrap="none">
+            <a:spAutoFit/>
+          </a:bodyPr>
+          <a:lstStyle/>
+          <a:p>
+            <a:r>
+              <a:rPr lang="en-US" sz="1100" cap="all" dirty="0" smtClean="0">
+                <a:solidFill>
+                  <a:schemeClr val="tx1">
+                    <a:lumMod val="75000"/>
+                    <a:lumOff val="25000"/>
+                  </a:schemeClr>
+                </a:solidFill>
+                <a:latin typeface="Calibri" panose="020F0502020204030204" pitchFamily="34" charset="0"/>
+                <a:ea typeface="Roboto Condensed" pitchFamily="2" charset="0"/>
+              </a:rPr>
+              <a:t>Embry-Riddle Aeronautical University</a:t>
+            </a:r>
+            <a:endParaRPr lang="en-US" sz="1100" cap="all" dirty="0">
+              <a:solidFill>
+                <a:schemeClr val="tx1">
+                  <a:lumMod val="75000"/>
+                  <a:lumOff val="25000"/>
+                </a:schemeClr>
+              </a:solidFill>
+              <a:latin typeface="Calibri" panose="020F0502020204030204" pitchFamily="34" charset="0"/>
+              <a:ea typeface="Roboto Condensed" pitchFamily="2" charset="0"/>
+            </a:endParaRPr>
+          </a:p>
+        </p:txBody>
+      </p:sp>
+      <p:sp>
+        <p:nvSpPr>
+          <p:cNvPr id="2" name="Slide Number Placeholder 1"/>
+          <p:cNvSpPr>
+            <a:spLocks noGrp="1"/>
+          </p:cNvSpPr>
+          <p:nvPr>
+            <p:ph type="sldNum" sz="quarter" idx="12"/>
+          </p:nvPr>
+        </p:nvSpPr>
+        <p:spPr>
+          <a:xfrm>
+            <a:off x="7010400" y="6408737"/>
+            <a:ext cx="2057400" cy="365125"/>
+          </a:xfrm>
+        </p:spPr>
+        <p:txBody>
+          <a:bodyPr/>
+          <a:lstStyle/>
+          <a:p>
+            <a:fld id="{79A9F26D-CCBE-47A9-B957-B1F36E881945}" type="slidenum">
+              <a:rPr lang="en-US" smtClean="0"/>
+              <a:t>12</a:t>
+            </a:fld>
+            <a:endParaRPr lang="en-US" dirty="0"/>
+          </a:p>
+        </p:txBody>
+      </p:sp>
+      <p:sp>
+        <p:nvSpPr>
+          <p:cNvPr id="13" name="TextBox 12"/>
+          <p:cNvSpPr txBox="1"/>
+          <p:nvPr/>
+        </p:nvSpPr>
+        <p:spPr>
+          <a:xfrm>
+            <a:off x="304799" y="4132559"/>
+            <a:ext cx="4015991" cy="461665"/>
+          </a:xfrm>
+          <a:prstGeom prst="rect">
+            <a:avLst/>
+          </a:prstGeom>
+          <a:noFill/>
+        </p:spPr>
+        <p:txBody>
+          <a:bodyPr wrap="square" rtlCol="0">
+            <a:spAutoFit/>
+          </a:bodyPr>
+          <a:lstStyle/>
+          <a:p>
+            <a:r>
+              <a:rPr lang="en-US" sz="2400" dirty="0" smtClean="0">
+                <a:solidFill>
+                  <a:srgbClr val="3A3A3A"/>
+                </a:solidFill>
+                <a:latin typeface="Roboto Condensed" pitchFamily="2" charset="0"/>
+                <a:ea typeface="Roboto Condensed" pitchFamily="2" charset="0"/>
+              </a:rPr>
+              <a:t>Simulation</a:t>
+            </a:r>
+            <a:endParaRPr lang="en-US" sz="2400" dirty="0">
+              <a:solidFill>
+                <a:srgbClr val="3A3A3A"/>
+              </a:solidFill>
+              <a:latin typeface="Roboto Condensed" pitchFamily="2" charset="0"/>
+              <a:ea typeface="Roboto Condensed" pitchFamily="2" charset="0"/>
+            </a:endParaRPr>
+          </a:p>
+        </p:txBody>
+      </p:sp>
+      <p:sp>
+        <p:nvSpPr>
+          <p:cNvPr id="14" name="TextBox 13"/>
+          <p:cNvSpPr txBox="1"/>
+          <p:nvPr/>
+        </p:nvSpPr>
+        <p:spPr>
+          <a:xfrm>
+            <a:off x="304799" y="4651987"/>
+            <a:ext cx="8155913" cy="1128514"/>
+          </a:xfrm>
+          <a:prstGeom prst="rect">
+            <a:avLst/>
+          </a:prstGeom>
+          <a:noFill/>
+        </p:spPr>
+        <p:txBody>
+          <a:bodyPr wrap="square" rtlCol="0">
+            <a:spAutoFit/>
+          </a:bodyPr>
+          <a:lstStyle/>
+          <a:p>
+            <a:pPr marL="342900" indent="-342900">
+              <a:spcAft>
+                <a:spcPts val="800"/>
+              </a:spcAft>
+              <a:buFont typeface="Arial" panose="020B0604020202020204" pitchFamily="34" charset="0"/>
+              <a:buChar char="•"/>
+            </a:pPr>
+            <a:r>
+              <a:rPr lang="en-US" dirty="0" smtClean="0">
+                <a:solidFill>
+                  <a:schemeClr val="tx1">
+                    <a:lumMod val="50000"/>
+                    <a:lumOff val="50000"/>
+                  </a:schemeClr>
+                </a:solidFill>
+                <a:latin typeface="Roboto Condensed" pitchFamily="2" charset="0"/>
+                <a:ea typeface="Roboto Condensed" pitchFamily="2" charset="0"/>
+              </a:rPr>
+              <a:t>For transactional databases, the transactions of write, update, etc. can be simulated</a:t>
+            </a:r>
+          </a:p>
+          <a:p>
+            <a:pPr marL="800100" lvl="1" indent="-342900">
+              <a:spcAft>
+                <a:spcPts val="800"/>
+              </a:spcAft>
+              <a:buFont typeface="Arial" panose="020B0604020202020204" pitchFamily="34" charset="0"/>
+              <a:buChar char="•"/>
+            </a:pPr>
+            <a:r>
+              <a:rPr lang="en-US" dirty="0" smtClean="0">
+                <a:solidFill>
+                  <a:schemeClr val="tx1">
+                    <a:lumMod val="50000"/>
+                    <a:lumOff val="50000"/>
+                  </a:schemeClr>
+                </a:solidFill>
+                <a:latin typeface="Roboto Condensed" pitchFamily="2" charset="0"/>
+                <a:ea typeface="Roboto Condensed" pitchFamily="2" charset="0"/>
+              </a:rPr>
+              <a:t>Test how well a database will operate in the deployment environment</a:t>
+            </a:r>
+          </a:p>
+          <a:p>
+            <a:pPr marL="800100" lvl="1" indent="-342900">
+              <a:spcAft>
+                <a:spcPts val="800"/>
+              </a:spcAft>
+              <a:buFont typeface="Arial" panose="020B0604020202020204" pitchFamily="34" charset="0"/>
+              <a:buChar char="•"/>
+            </a:pPr>
+            <a:r>
+              <a:rPr lang="en-US" dirty="0" smtClean="0">
+                <a:solidFill>
+                  <a:schemeClr val="tx1">
+                    <a:lumMod val="50000"/>
+                    <a:lumOff val="50000"/>
+                  </a:schemeClr>
+                </a:solidFill>
+                <a:latin typeface="Roboto Condensed" pitchFamily="2" charset="0"/>
+                <a:ea typeface="Roboto Condensed" pitchFamily="2" charset="0"/>
+              </a:rPr>
+              <a:t>Provide a base-line for </a:t>
+            </a:r>
+            <a:r>
+              <a:rPr lang="en-US" smtClean="0">
+                <a:solidFill>
+                  <a:schemeClr val="tx1">
+                    <a:lumMod val="50000"/>
+                    <a:lumOff val="50000"/>
+                  </a:schemeClr>
+                </a:solidFill>
+                <a:latin typeface="Roboto Condensed" pitchFamily="2" charset="0"/>
+                <a:ea typeface="Roboto Condensed" pitchFamily="2" charset="0"/>
+              </a:rPr>
+              <a:t>trade-off analysis </a:t>
+            </a:r>
+            <a:r>
+              <a:rPr lang="en-US" dirty="0" smtClean="0">
+                <a:solidFill>
+                  <a:schemeClr val="tx1">
+                    <a:lumMod val="50000"/>
+                    <a:lumOff val="50000"/>
+                  </a:schemeClr>
+                </a:solidFill>
+                <a:latin typeface="Roboto Condensed" pitchFamily="2" charset="0"/>
+                <a:ea typeface="Roboto Condensed" pitchFamily="2" charset="0"/>
+              </a:rPr>
+              <a:t>between transactional databases</a:t>
+            </a:r>
+            <a:endParaRPr lang="en-US" dirty="0" smtClean="0">
+              <a:solidFill>
+                <a:schemeClr val="tx1">
+                  <a:lumMod val="50000"/>
+                  <a:lumOff val="50000"/>
+                </a:schemeClr>
+              </a:solidFill>
+              <a:latin typeface="Roboto Condensed" pitchFamily="2" charset="0"/>
+              <a:ea typeface="Roboto Condensed" pitchFamily="2" charset="0"/>
+            </a:endParaRPr>
+          </a:p>
+        </p:txBody>
+      </p:sp>
+    </p:spTree>
+    <p:extLst>
+      <p:ext uri="{BB962C8B-B14F-4D97-AF65-F5344CB8AC3E}">
+        <p14:creationId xmlns:p14="http://schemas.microsoft.com/office/powerpoint/2010/main" val="4227539445"/>
       </p:ext>
     </p:extLst>
   </p:cSld>
@@ -9314,16 +10347,6 @@
               </a:rPr>
               <a:t>Steve Jones</a:t>
             </a:r>
-            <a:endParaRPr lang="en-US" sz="1600" dirty="0" smtClean="0">
-              <a:solidFill>
-                <a:schemeClr val="tx1">
-                  <a:lumMod val="50000"/>
-                  <a:lumOff val="50000"/>
-                </a:schemeClr>
-              </a:solidFill>
-              <a:latin typeface="Roboto Condensed" pitchFamily="2" charset="0"/>
-              <a:ea typeface="Roboto Condensed" pitchFamily="2" charset="0"/>
-            </a:endParaRPr>
           </a:p>
           <a:p>
             <a:r>
@@ -9339,16 +10362,6 @@
               </a:rPr>
               <a:t>Dominick Tournour</a:t>
             </a:r>
-            <a:endParaRPr lang="en-US" sz="1600" dirty="0" smtClean="0">
-              <a:solidFill>
-                <a:schemeClr val="tx1">
-                  <a:lumMod val="50000"/>
-                  <a:lumOff val="50000"/>
-                </a:schemeClr>
-              </a:solidFill>
-              <a:latin typeface="Roboto Condensed" pitchFamily="2" charset="0"/>
-              <a:ea typeface="Roboto Condensed" pitchFamily="2" charset="0"/>
-            </a:endParaRPr>
           </a:p>
         </p:txBody>
       </p:sp>
@@ -9562,11 +10575,6 @@
               </a:rPr>
               <a:t>Albano, Jones, Tournour</a:t>
             </a:r>
-            <a:endParaRPr lang="en-US" sz="1100" b="1" cap="all" dirty="0">
-              <a:solidFill>
-                <a:srgbClr val="252525"/>
-              </a:solidFill>
-            </a:endParaRPr>
           </a:p>
         </p:txBody>
       </p:sp>
@@ -9722,16 +10730,6 @@
               </a:rPr>
               <a:t>Background information</a:t>
             </a:r>
-            <a:endParaRPr lang="en-US" dirty="0" smtClean="0">
-              <a:solidFill>
-                <a:schemeClr val="tx1">
-                  <a:lumMod val="50000"/>
-                  <a:lumOff val="50000"/>
-                </a:schemeClr>
-              </a:solidFill>
-              <a:latin typeface="Roboto Condensed" pitchFamily="2" charset="0"/>
-              <a:ea typeface="Roboto Condensed" pitchFamily="2" charset="0"/>
-            </a:endParaRPr>
           </a:p>
         </p:txBody>
       </p:sp>
@@ -9819,16 +10817,6 @@
               </a:rPr>
               <a:t>Graph database</a:t>
             </a:r>
-            <a:endParaRPr lang="en-US" dirty="0" smtClean="0">
-              <a:solidFill>
-                <a:schemeClr val="tx1">
-                  <a:lumMod val="50000"/>
-                  <a:lumOff val="50000"/>
-                </a:schemeClr>
-              </a:solidFill>
-              <a:latin typeface="Roboto Condensed" pitchFamily="2" charset="0"/>
-              <a:ea typeface="Roboto Condensed" pitchFamily="2" charset="0"/>
-            </a:endParaRPr>
           </a:p>
           <a:p>
             <a:pPr marL="285750" indent="-285750">
@@ -9873,16 +10861,6 @@
               </a:rPr>
               <a:t>SQL database</a:t>
             </a:r>
-            <a:endParaRPr lang="en-US" dirty="0" smtClean="0">
-              <a:solidFill>
-                <a:schemeClr val="tx1">
-                  <a:lumMod val="50000"/>
-                  <a:lumOff val="50000"/>
-                </a:schemeClr>
-              </a:solidFill>
-              <a:latin typeface="Roboto Condensed" pitchFamily="2" charset="0"/>
-              <a:ea typeface="Roboto Condensed" pitchFamily="2" charset="0"/>
-            </a:endParaRPr>
           </a:p>
         </p:txBody>
       </p:sp>
@@ -9992,16 +10970,6 @@
               </a:rPr>
               <a:t>Alternative methods &amp; conclusions</a:t>
             </a:r>
-            <a:endParaRPr lang="en-US" dirty="0" smtClean="0">
-              <a:solidFill>
-                <a:schemeClr val="tx1">
-                  <a:lumMod val="50000"/>
-                  <a:lumOff val="50000"/>
-                </a:schemeClr>
-              </a:solidFill>
-              <a:latin typeface="Roboto Condensed" pitchFamily="2" charset="0"/>
-              <a:ea typeface="Roboto Condensed" pitchFamily="2" charset="0"/>
-            </a:endParaRPr>
           </a:p>
         </p:txBody>
       </p:sp>
@@ -10385,11 +11353,6 @@
               </a:rPr>
               <a:t>Albano, Jones, Tournour</a:t>
             </a:r>
-            <a:endParaRPr lang="en-US" sz="1100" b="1" cap="all" dirty="0">
-              <a:solidFill>
-                <a:srgbClr val="252525"/>
-              </a:solidFill>
-            </a:endParaRPr>
           </a:p>
         </p:txBody>
       </p:sp>
@@ -10545,16 +11508,6 @@
               </a:rPr>
               <a:t>Select the best from each group and then compare them head-to-head</a:t>
             </a:r>
-            <a:endParaRPr lang="en-US" dirty="0" smtClean="0">
-              <a:solidFill>
-                <a:schemeClr val="tx1">
-                  <a:lumMod val="50000"/>
-                  <a:lumOff val="50000"/>
-                </a:schemeClr>
-              </a:solidFill>
-              <a:latin typeface="Roboto Condensed" pitchFamily="2" charset="0"/>
-              <a:ea typeface="Roboto Condensed" pitchFamily="2" charset="0"/>
-            </a:endParaRPr>
           </a:p>
         </p:txBody>
       </p:sp>
@@ -11727,13 +12680,13 @@
   <p:clrMapOvr>
     <a:masterClrMapping/>
   </p:clrMapOvr>
-  <mc:AlternateContent xmlns:mc="http://schemas.openxmlformats.org/markup-compatibility/2006">
-    <mc:Choice xmlns:p14="http://schemas.microsoft.com/office/powerpoint/2010/main" Requires="p14">
+  <mc:AlternateContent xmlns:mc="http://schemas.openxmlformats.org/markup-compatibility/2006" xmlns:p14="http://schemas.microsoft.com/office/powerpoint/2010/main">
+    <mc:Choice Requires="p14">
       <p:transition spd="med" p14:dur="700">
         <p:fade/>
       </p:transition>
     </mc:Choice>
-    <mc:Fallback>
+    <mc:Fallback xmlns="">
       <p:transition spd="med">
         <p:fade/>
       </p:transition>
@@ -11976,11 +12929,6 @@
               </a:rPr>
               <a:t>Albano, Jones, Tournour</a:t>
             </a:r>
-            <a:endParaRPr lang="en-US" sz="1100" b="1" cap="all" dirty="0">
-              <a:solidFill>
-                <a:srgbClr val="252525"/>
-              </a:solidFill>
-            </a:endParaRPr>
           </a:p>
         </p:txBody>
       </p:sp>
@@ -12112,20 +13060,7 @@
                 <a:latin typeface="Roboto Condensed" pitchFamily="2" charset="0"/>
                 <a:ea typeface="Roboto Condensed" pitchFamily="2" charset="0"/>
               </a:rPr>
-              <a:t>The specifics of the analysi</a:t>
-            </a:r>
-            <a:r>
-              <a:rPr lang="en-US" dirty="0" smtClean="0">
-                <a:solidFill>
-                  <a:schemeClr val="tx1">
-                    <a:lumMod val="50000"/>
-                    <a:lumOff val="50000"/>
-                  </a:schemeClr>
-                </a:solidFill>
-                <a:latin typeface="Roboto Condensed" pitchFamily="2" charset="0"/>
-                <a:ea typeface="Roboto Condensed" pitchFamily="2" charset="0"/>
-              </a:rPr>
-              <a:t>s for each database category varied, but some commonalities exist:</a:t>
+              <a:t>The specifics of the analysis for each database category varied, but some commonalities exist:</a:t>
             </a:r>
           </a:p>
           <a:p>
@@ -12458,13 +13393,13 @@
   <p:clrMapOvr>
     <a:masterClrMapping/>
   </p:clrMapOvr>
-  <mc:AlternateContent xmlns:mc="http://schemas.openxmlformats.org/markup-compatibility/2006">
-    <mc:Choice xmlns:p14="http://schemas.microsoft.com/office/powerpoint/2010/main" Requires="p14">
+  <mc:AlternateContent xmlns:mc="http://schemas.openxmlformats.org/markup-compatibility/2006" xmlns:p14="http://schemas.microsoft.com/office/powerpoint/2010/main">
+    <mc:Choice Requires="p14">
       <p:transition spd="med" p14:dur="700">
         <p:fade/>
       </p:transition>
     </mc:Choice>
-    <mc:Fallback>
+    <mc:Fallback xmlns="">
       <p:transition spd="med">
         <p:fade/>
       </p:transition>
@@ -12707,11 +13642,6 @@
               </a:rPr>
               <a:t>Albano, Jones, Tournour</a:t>
             </a:r>
-            <a:endParaRPr lang="en-US" sz="1100" b="1" cap="all" dirty="0">
-              <a:solidFill>
-                <a:srgbClr val="252525"/>
-              </a:solidFill>
-            </a:endParaRPr>
           </a:p>
         </p:txBody>
       </p:sp>
@@ -13398,8 +14328,8 @@
           </a:p>
         </p:txBody>
       </p:sp>
-      <mc:AlternateContent xmlns:mc="http://schemas.openxmlformats.org/markup-compatibility/2006">
-        <mc:Choice xmlns:a14="http://schemas.microsoft.com/office/drawing/2010/main" Requires="a14">
+      <mc:AlternateContent xmlns:mc="http://schemas.openxmlformats.org/markup-compatibility/2006" xmlns:a14="http://schemas.microsoft.com/office/drawing/2010/main">
+        <mc:Choice Requires="a14">
           <p:sp>
             <p:nvSpPr>
               <p:cNvPr id="21" name="TextBox 20"/>
@@ -13616,7 +14546,7 @@
             </p:txBody>
           </p:sp>
         </mc:Choice>
-        <mc:Fallback>
+        <mc:Fallback xmlns="">
           <p:sp>
             <p:nvSpPr>
               <p:cNvPr id="21" name="TextBox 20"/>
@@ -13655,8 +14585,8 @@
           </p:sp>
         </mc:Fallback>
       </mc:AlternateContent>
-      <mc:AlternateContent xmlns:mc="http://schemas.openxmlformats.org/markup-compatibility/2006">
-        <mc:Choice xmlns:a14="http://schemas.microsoft.com/office/drawing/2010/main" Requires="a14">
+      <mc:AlternateContent xmlns:mc="http://schemas.openxmlformats.org/markup-compatibility/2006" xmlns:a14="http://schemas.microsoft.com/office/drawing/2010/main">
+        <mc:Choice Requires="a14">
           <p:sp>
             <p:nvSpPr>
               <p:cNvPr id="22" name="TextBox 21"/>
@@ -13873,7 +14803,7 @@
             </p:txBody>
           </p:sp>
         </mc:Choice>
-        <mc:Fallback>
+        <mc:Fallback xmlns="">
           <p:sp>
             <p:nvSpPr>
               <p:cNvPr id="22" name="TextBox 21"/>
@@ -13912,8 +14842,8 @@
           </p:sp>
         </mc:Fallback>
       </mc:AlternateContent>
-      <mc:AlternateContent xmlns:mc="http://schemas.openxmlformats.org/markup-compatibility/2006">
-        <mc:Choice xmlns:a14="http://schemas.microsoft.com/office/drawing/2010/main" Requires="a14">
+      <mc:AlternateContent xmlns:mc="http://schemas.openxmlformats.org/markup-compatibility/2006" xmlns:a14="http://schemas.microsoft.com/office/drawing/2010/main">
+        <mc:Choice Requires="a14">
           <p:sp>
             <p:nvSpPr>
               <p:cNvPr id="23" name="TextBox 22"/>
@@ -13975,7 +14905,7 @@
             </p:txBody>
           </p:sp>
         </mc:Choice>
-        <mc:Fallback>
+        <mc:Fallback xmlns="">
           <p:sp>
             <p:nvSpPr>
               <p:cNvPr id="23" name="TextBox 22"/>
@@ -14152,13 +15082,6 @@
               </a:rPr>
               <a:t>Relationships are named and directed, originating and terminating at a node</a:t>
             </a:r>
-            <a:endParaRPr lang="en-US" dirty="0">
-              <a:solidFill>
-                <a:srgbClr val="6F6F6F"/>
-              </a:solidFill>
-              <a:latin typeface="Roboto Condensed" pitchFamily="2" charset="0"/>
-              <a:ea typeface="Roboto Condensed" pitchFamily="2" charset="0"/>
-            </a:endParaRPr>
           </a:p>
         </p:txBody>
       </p:sp>
@@ -14172,13 +15095,13 @@
   <p:clrMapOvr>
     <a:masterClrMapping/>
   </p:clrMapOvr>
-  <mc:AlternateContent xmlns:mc="http://schemas.openxmlformats.org/markup-compatibility/2006">
-    <mc:Choice xmlns:p14="http://schemas.microsoft.com/office/powerpoint/2010/main" Requires="p14">
+  <mc:AlternateContent xmlns:mc="http://schemas.openxmlformats.org/markup-compatibility/2006" xmlns:p14="http://schemas.microsoft.com/office/powerpoint/2010/main">
+    <mc:Choice Requires="p14">
       <p:transition spd="med" p14:dur="700">
         <p:fade/>
       </p:transition>
     </mc:Choice>
-    <mc:Fallback>
+    <mc:Fallback xmlns="">
       <p:transition spd="med">
         <p:fade/>
       </p:transition>
@@ -14461,11 +15384,6 @@
               </a:rPr>
               <a:t>Albano, Jones, Tournour</a:t>
             </a:r>
-            <a:endParaRPr lang="en-US" sz="1100" b="1" cap="all" dirty="0">
-              <a:solidFill>
-                <a:srgbClr val="252525"/>
-              </a:solidFill>
-            </a:endParaRPr>
           </a:p>
         </p:txBody>
       </p:sp>
@@ -15275,13 +16193,13 @@
   <p:clrMapOvr>
     <a:masterClrMapping/>
   </p:clrMapOvr>
-  <mc:AlternateContent xmlns:mc="http://schemas.openxmlformats.org/markup-compatibility/2006">
-    <mc:Choice xmlns:p14="http://schemas.microsoft.com/office/powerpoint/2010/main" Requires="p14">
+  <mc:AlternateContent xmlns:mc="http://schemas.openxmlformats.org/markup-compatibility/2006" xmlns:p14="http://schemas.microsoft.com/office/powerpoint/2010/main">
+    <mc:Choice Requires="p14">
       <p:transition spd="med" p14:dur="700">
         <p:fade/>
       </p:transition>
     </mc:Choice>
-    <mc:Fallback>
+    <mc:Fallback xmlns="">
       <p:transition spd="med">
         <p:fade/>
       </p:transition>
@@ -15524,11 +16442,6 @@
               </a:rPr>
               <a:t>Albano, Jones, Tournour</a:t>
             </a:r>
-            <a:endParaRPr lang="en-US" sz="1100" b="1" cap="all" dirty="0">
-              <a:solidFill>
-                <a:srgbClr val="252525"/>
-              </a:solidFill>
-            </a:endParaRPr>
           </a:p>
         </p:txBody>
       </p:sp>
@@ -16665,20 +17578,7 @@
                   <a:latin typeface="Roboto Condensed" panose="02000000000000000000" pitchFamily="2" charset="0"/>
                   <a:ea typeface="Roboto Condensed" panose="02000000000000000000" pitchFamily="2" charset="0"/>
                 </a:rPr>
-                <a:t>Implementation-</a:t>
-              </a:r>
-              <a:r>
-                <a:rPr lang="en-US" dirty="0" smtClean="0">
-                  <a:solidFill>
-                    <a:schemeClr val="tx1">
-                      <a:lumMod val="75000"/>
-                      <a:lumOff val="25000"/>
-                    </a:schemeClr>
-                  </a:solidFill>
-                  <a:latin typeface="Roboto Condensed" panose="02000000000000000000" pitchFamily="2" charset="0"/>
-                  <a:ea typeface="Roboto Condensed" panose="02000000000000000000" pitchFamily="2" charset="0"/>
-                </a:rPr>
-                <a:t>agnostic data set</a:t>
+                <a:t>Implementation-agnostic data set</a:t>
               </a:r>
               <a:endParaRPr lang="en-US" dirty="0">
                 <a:solidFill>
@@ -16745,13 +17645,13 @@
   <p:clrMapOvr>
     <a:masterClrMapping/>
   </p:clrMapOvr>
-  <mc:AlternateContent xmlns:mc="http://schemas.openxmlformats.org/markup-compatibility/2006">
-    <mc:Choice xmlns:p14="http://schemas.microsoft.com/office/powerpoint/2010/main" Requires="p14">
+  <mc:AlternateContent xmlns:mc="http://schemas.openxmlformats.org/markup-compatibility/2006" xmlns:p14="http://schemas.microsoft.com/office/powerpoint/2010/main">
+    <mc:Choice Requires="p14">
       <p:transition spd="med" p14:dur="700">
         <p:fade/>
       </p:transition>
     </mc:Choice>
-    <mc:Fallback>
+    <mc:Fallback xmlns="">
       <p:transition spd="med">
         <p:fade/>
       </p:transition>
@@ -16994,11 +17894,6 @@
               </a:rPr>
               <a:t>Albano, Jones, Tournour</a:t>
             </a:r>
-            <a:endParaRPr lang="en-US" sz="1100" b="1" cap="all" dirty="0">
-              <a:solidFill>
-                <a:srgbClr val="252525"/>
-              </a:solidFill>
-            </a:endParaRPr>
           </a:p>
         </p:txBody>
       </p:sp>
@@ -17310,13 +18205,13 @@
   <p:clrMapOvr>
     <a:masterClrMapping/>
   </p:clrMapOvr>
-  <mc:AlternateContent xmlns:mc="http://schemas.openxmlformats.org/markup-compatibility/2006">
-    <mc:Choice xmlns:p14="http://schemas.microsoft.com/office/powerpoint/2010/main" Requires="p14">
+  <mc:AlternateContent xmlns:mc="http://schemas.openxmlformats.org/markup-compatibility/2006" xmlns:p14="http://schemas.microsoft.com/office/powerpoint/2010/main">
+    <mc:Choice Requires="p14">
       <p:transition spd="med" p14:dur="700">
         <p:fade/>
       </p:transition>
     </mc:Choice>
-    <mc:Fallback>
+    <mc:Fallback xmlns="">
       <p:transition spd="med">
         <p:fade/>
       </p:transition>
@@ -17559,11 +18454,6 @@
               </a:rPr>
               <a:t>Albano, Jones, Tournour</a:t>
             </a:r>
-            <a:endParaRPr lang="en-US" sz="1100" b="1" cap="all" dirty="0">
-              <a:solidFill>
-                <a:srgbClr val="252525"/>
-              </a:solidFill>
-            </a:endParaRPr>
           </a:p>
         </p:txBody>
       </p:sp>
@@ -17920,8 +18810,8 @@
           </a:p>
         </p:txBody>
       </p:sp>
-      <mc:AlternateContent xmlns:mc="http://schemas.openxmlformats.org/markup-compatibility/2006">
-        <mc:Choice xmlns:a14="http://schemas.microsoft.com/office/drawing/2010/main" Requires="a14">
+      <mc:AlternateContent xmlns:mc="http://schemas.openxmlformats.org/markup-compatibility/2006" xmlns:a14="http://schemas.microsoft.com/office/drawing/2010/main">
+        <mc:Choice Requires="a14">
           <p:sp>
             <p:nvSpPr>
               <p:cNvPr id="3" name="Rectangle 2"/>
@@ -17943,6 +18833,7 @@
               </a:bodyPr>
               <a:lstStyle/>
               <a:p>
+                <a:pPr/>
                 <a14:m>
                   <m:oMathPara xmlns:m="http://schemas.openxmlformats.org/officeDocument/2006/math">
                     <m:oMathParaPr>
@@ -17952,7 +18843,7 @@
                       <m:d>
                         <m:dPr>
                           <m:ctrlPr>
-                            <a:rPr lang="en-US" smtClean="0">
+                            <a:rPr lang="en-US" i="1" smtClean="0">
                               <a:solidFill>
                                 <a:schemeClr val="tx1">
                                   <a:lumMod val="75000"/>
@@ -17967,7 +18858,7 @@
                           <m:sSub>
                             <m:sSubPr>
                               <m:ctrlPr>
-                                <a:rPr lang="en-US">
+                                <a:rPr lang="en-US" i="1">
                                   <a:solidFill>
                                     <a:schemeClr val="tx1">
                                       <a:lumMod val="75000"/>
@@ -18281,7 +19172,7 @@
             </p:txBody>
           </p:sp>
         </mc:Choice>
-        <mc:Fallback>
+        <mc:Fallback xmlns="">
           <p:sp>
             <p:nvSpPr>
               <p:cNvPr id="3" name="Rectangle 2"/>
@@ -18439,13 +19330,13 @@
   <p:clrMapOvr>
     <a:masterClrMapping/>
   </p:clrMapOvr>
-  <mc:AlternateContent xmlns:mc="http://schemas.openxmlformats.org/markup-compatibility/2006">
-    <mc:Choice xmlns:p14="http://schemas.microsoft.com/office/powerpoint/2010/main" Requires="p14">
+  <mc:AlternateContent xmlns:mc="http://schemas.openxmlformats.org/markup-compatibility/2006" xmlns:p14="http://schemas.microsoft.com/office/powerpoint/2010/main">
+    <mc:Choice Requires="p14">
       <p:transition spd="med" p14:dur="700">
         <p:fade/>
       </p:transition>
     </mc:Choice>
-    <mc:Fallback>
+    <mc:Fallback xmlns="">
       <p:transition spd="med">
         <p:fade/>
       </p:transition>

</xml_diff>

<commit_message>
Powerpoint update and save powerpoint at PDF
</commit_message>
<xml_diff>
--- a/docs/In_class_presentation.pptx
+++ b/docs/In_class_presentation.pptx
@@ -53,32 +53,6 @@
   </p:sldIdLst>
   <p:sldSz cx="9144000" cy="6858000" type="screen4x3"/>
   <p:notesSz cx="6858000" cy="9144000"/>
-  <p:embeddedFontLst>
-    <p:embeddedFont>
-      <p:font typeface="MS Mincho" panose="02020609040205080304" pitchFamily="49" charset="-128"/>
-      <p:regular r:id="rId45"/>
-    </p:embeddedFont>
-    <p:embeddedFont>
-      <p:font typeface="Calibri" panose="020F0502020204030204" pitchFamily="34" charset="0"/>
-      <p:regular r:id="rId46"/>
-      <p:bold r:id="rId47"/>
-      <p:italic r:id="rId48"/>
-      <p:boldItalic r:id="rId49"/>
-    </p:embeddedFont>
-    <p:embeddedFont>
-      <p:font typeface="SimSun-ExtB" panose="02010609060101010101" pitchFamily="49" charset="-122"/>
-      <p:regular r:id="rId50"/>
-    </p:embeddedFont>
-    <p:embeddedFont>
-      <p:font typeface="Cambria Math" panose="02040503050406030204" pitchFamily="18" charset="0"/>
-      <p:regular r:id="rId51"/>
-    </p:embeddedFont>
-    <p:embeddedFont>
-      <p:font typeface="Calibri Light" panose="020F0302020204030204" pitchFamily="34" charset="0"/>
-      <p:regular r:id="rId52"/>
-      <p:italic r:id="rId53"/>
-    </p:embeddedFont>
-  </p:embeddedFontLst>
   <p:defaultTextStyle>
     <a:defPPr>
       <a:defRPr lang="en-US"/>
@@ -254,7 +228,7 @@
       </p14:sectionLst>
     </p:ext>
     <p:ext uri="{EFAFB233-063F-42B5-8137-9DF3F51BA10A}">
-      <p15:sldGuideLst xmlns:p15="http://schemas.microsoft.com/office/powerpoint/2012/main">
+      <p15:sldGuideLst xmlns:p15="http://schemas.microsoft.com/office/powerpoint/2012/main" xmlns="">
         <p15:guide id="1" orient="horz" pos="2160">
           <p15:clr>
             <a:srgbClr val="A4A3A4"/>
@@ -293,9 +267,9 @@
           <c:xMode val="edge"/>
           <c:yMode val="edge"/>
           <c:x val="0.116621417084024"/>
-          <c:y val="5.5649809057231998E-2"/>
-          <c:w val="0.87320519550305697"/>
-          <c:h val="0.80993949775093999"/>
+          <c:y val="0.055649809057232"/>
+          <c:w val="0.873205195503057"/>
+          <c:h val="0.80993949775094"/>
         </c:manualLayout>
       </c:layout>
       <c:barChart>
@@ -412,7 +386,7 @@
                 <c:formatCode>General</c:formatCode>
                 <c:ptCount val="4"/>
                 <c:pt idx="0">
-                  <c:v>20.100000000000001</c:v>
+                  <c:v>20.1</c:v>
                 </c:pt>
                 <c:pt idx="1">
                   <c:v>120.9</c:v>
@@ -421,7 +395,7 @@
                   <c:v>2.1</c:v>
                 </c:pt>
                 <c:pt idx="3">
-                  <c:v>4.4000000000000004</c:v>
+                  <c:v>4.4</c:v>
                 </c:pt>
               </c:numCache>
             </c:numRef>
@@ -563,11 +537,11 @@
         </c:dLbls>
         <c:gapWidth val="150"/>
         <c:overlap val="-13"/>
-        <c:axId val="167202960"/>
-        <c:axId val="167359280"/>
+        <c:axId val="2122541160"/>
+        <c:axId val="2122537544"/>
       </c:barChart>
       <c:catAx>
-        <c:axId val="167202960"/>
+        <c:axId val="2122541160"/>
         <c:scaling>
           <c:orientation val="minMax"/>
         </c:scaling>
@@ -610,7 +584,7 @@
             <a:endParaRPr lang="en-US"/>
           </a:p>
         </c:txPr>
-        <c:crossAx val="167359280"/>
+        <c:crossAx val="2122537544"/>
         <c:crosses val="autoZero"/>
         <c:auto val="1"/>
         <c:lblAlgn val="ctr"/>
@@ -618,7 +592,7 @@
         <c:noMultiLvlLbl val="0"/>
       </c:catAx>
       <c:valAx>
-        <c:axId val="167359280"/>
+        <c:axId val="2122537544"/>
         <c:scaling>
           <c:orientation val="minMax"/>
         </c:scaling>
@@ -677,8 +651,8 @@
             <c:manualLayout>
               <c:xMode val="edge"/>
               <c:yMode val="edge"/>
-              <c:x val="2.98723737075304E-3"/>
-              <c:y val="0.26671321931279302"/>
+              <c:x val="0.00298723737075304"/>
+              <c:y val="0.266713219312793"/>
             </c:manualLayout>
           </c:layout>
           <c:overlay val="0"/>
@@ -689,26 +663,6 @@
             </a:ln>
             <a:effectLst/>
           </c:spPr>
-          <c:txPr>
-            <a:bodyPr rot="-5400000" spcFirstLastPara="1" vertOverflow="ellipsis" vert="horz" wrap="square" anchor="ctr" anchorCtr="1"/>
-            <a:lstStyle/>
-            <a:p>
-              <a:pPr>
-                <a:defRPr sz="1000" b="0" i="0" u="none" strike="noStrike" kern="1200" baseline="0">
-                  <a:solidFill>
-                    <a:schemeClr val="tx1">
-                      <a:lumMod val="65000"/>
-                      <a:lumOff val="35000"/>
-                    </a:schemeClr>
-                  </a:solidFill>
-                  <a:latin typeface="+mn-lt"/>
-                  <a:ea typeface="+mn-ea"/>
-                  <a:cs typeface="+mn-cs"/>
-                </a:defRPr>
-              </a:pPr>
-              <a:endParaRPr lang="en-US"/>
-            </a:p>
-          </c:txPr>
         </c:title>
         <c:numFmt formatCode="General" sourceLinked="1"/>
         <c:majorTickMark val="none"/>
@@ -741,7 +695,7 @@
             <a:endParaRPr lang="en-US"/>
           </a:p>
         </c:txPr>
-        <c:crossAx val="167202960"/>
+        <c:crossAx val="2122541160"/>
         <c:crosses val="autoZero"/>
         <c:crossBetween val="between"/>
       </c:valAx>
@@ -759,10 +713,10 @@
         <c:manualLayout>
           <c:xMode val="edge"/>
           <c:yMode val="edge"/>
-          <c:x val="0.81265355197488798"/>
+          <c:x val="0.812653551974888"/>
           <c:y val="0.100606383985706"/>
           <c:w val="0.158956239469107"/>
-          <c:h val="0.22861836773593699"/>
+          <c:h val="0.228618367735937"/>
         </c:manualLayout>
       </c:layout>
       <c:overlay val="0"/>
@@ -818,7 +772,7 @@
       <a:endParaRPr lang="en-US"/>
     </a:p>
   </c:txPr>
-  <c:externalData r:id="rId3">
+  <c:externalData r:id="rId1">
     <c:autoUpdate val="0"/>
   </c:externalData>
 </c:chartSpace>
@@ -876,16 +830,16 @@
                 <c:formatCode>General</c:formatCode>
                 <c:ptCount val="4"/>
                 <c:pt idx="0">
-                  <c:v>1000</c:v>
+                  <c:v>1000.0</c:v>
                 </c:pt>
                 <c:pt idx="1">
-                  <c:v>10000</c:v>
+                  <c:v>10000.0</c:v>
                 </c:pt>
                 <c:pt idx="2">
-                  <c:v>100000</c:v>
+                  <c:v>100000.0</c:v>
                 </c:pt>
                 <c:pt idx="3">
-                  <c:v>1000000</c:v>
+                  <c:v>1.0E6</c:v>
                 </c:pt>
               </c:numCache>
             </c:numRef>
@@ -897,13 +851,13 @@
                 <c:formatCode>General</c:formatCode>
                 <c:ptCount val="4"/>
                 <c:pt idx="0">
-                  <c:v>0.31116666666666698</c:v>
+                  <c:v>0.311166666666667</c:v>
                 </c:pt>
                 <c:pt idx="1">
                   <c:v>1.163866666666667</c:v>
                 </c:pt>
                 <c:pt idx="2">
-                  <c:v>9.5800999999999998</c:v>
+                  <c:v>9.580100000000001</c:v>
                 </c:pt>
                 <c:pt idx="3">
                   <c:v>128.172</c:v>
@@ -926,16 +880,16 @@
                 <c:formatCode>General</c:formatCode>
                 <c:ptCount val="4"/>
                 <c:pt idx="0">
-                  <c:v>1000</c:v>
+                  <c:v>1000.0</c:v>
                 </c:pt>
                 <c:pt idx="1">
-                  <c:v>10000</c:v>
+                  <c:v>10000.0</c:v>
                 </c:pt>
                 <c:pt idx="2">
-                  <c:v>100000</c:v>
+                  <c:v>100000.0</c:v>
                 </c:pt>
                 <c:pt idx="3">
-                  <c:v>1000000</c:v>
+                  <c:v>1.0E6</c:v>
                 </c:pt>
               </c:numCache>
             </c:numRef>
@@ -947,13 +901,13 @@
                 <c:formatCode>General</c:formatCode>
                 <c:ptCount val="4"/>
                 <c:pt idx="0">
-                  <c:v>1.7188666666666661</c:v>
+                  <c:v>1.718866666666666</c:v>
                 </c:pt>
                 <c:pt idx="1">
                   <c:v>4.200433333333331</c:v>
                 </c:pt>
                 <c:pt idx="2">
-                  <c:v>34.676299999999998</c:v>
+                  <c:v>34.6763</c:v>
                 </c:pt>
                 <c:pt idx="3">
                   <c:v>109.2299666666666</c:v>
@@ -973,11 +927,11 @@
         </c:dLbls>
         <c:marker val="1"/>
         <c:smooth val="0"/>
-        <c:axId val="167582128"/>
-        <c:axId val="167582688"/>
+        <c:axId val="2124690008"/>
+        <c:axId val="2124687016"/>
       </c:lineChart>
       <c:catAx>
-        <c:axId val="167582128"/>
+        <c:axId val="2124690008"/>
         <c:scaling>
           <c:orientation val="minMax"/>
         </c:scaling>
@@ -987,7 +941,7 @@
         <c:majorTickMark val="none"/>
         <c:minorTickMark val="none"/>
         <c:tickLblPos val="nextTo"/>
-        <c:crossAx val="167582688"/>
+        <c:crossAx val="2124687016"/>
         <c:crosses val="autoZero"/>
         <c:auto val="1"/>
         <c:lblAlgn val="ctr"/>
@@ -995,10 +949,10 @@
         <c:noMultiLvlLbl val="0"/>
       </c:catAx>
       <c:valAx>
-        <c:axId val="167582688"/>
+        <c:axId val="2124687016"/>
         <c:scaling>
           <c:orientation val="minMax"/>
-          <c:min val="0"/>
+          <c:min val="0.0"/>
         </c:scaling>
         <c:delete val="0"/>
         <c:axPos val="l"/>
@@ -1031,7 +985,7 @@
         <c:majorTickMark val="none"/>
         <c:minorTickMark val="none"/>
         <c:tickLblPos val="nextTo"/>
-        <c:crossAx val="167582128"/>
+        <c:crossAx val="2124690008"/>
         <c:crosses val="autoZero"/>
         <c:crossBetween val="between"/>
       </c:valAx>
@@ -1110,16 +1064,16 @@
                 <c:formatCode>General</c:formatCode>
                 <c:ptCount val="4"/>
                 <c:pt idx="0">
-                  <c:v>1000</c:v>
+                  <c:v>1000.0</c:v>
                 </c:pt>
                 <c:pt idx="1">
-                  <c:v>10000</c:v>
+                  <c:v>10000.0</c:v>
                 </c:pt>
                 <c:pt idx="2">
-                  <c:v>100000</c:v>
+                  <c:v>100000.0</c:v>
                 </c:pt>
                 <c:pt idx="3">
-                  <c:v>1000000</c:v>
+                  <c:v>1.0E6</c:v>
                 </c:pt>
               </c:numCache>
             </c:numRef>
@@ -1131,16 +1085,16 @@
                 <c:formatCode>General</c:formatCode>
                 <c:ptCount val="4"/>
                 <c:pt idx="0">
-                  <c:v>5.3240666666666527</c:v>
+                  <c:v>5.324066666666651</c:v>
                 </c:pt>
                 <c:pt idx="1">
-                  <c:v>43.385100000000001</c:v>
+                  <c:v>43.3851</c:v>
                 </c:pt>
                 <c:pt idx="2">
-                  <c:v>577.22216666666657</c:v>
+                  <c:v>577.2221666666666</c:v>
                 </c:pt>
                 <c:pt idx="3">
-                  <c:v>6919.2949333333336</c:v>
+                  <c:v>6919.294933333334</c:v>
                 </c:pt>
               </c:numCache>
             </c:numRef>
@@ -1160,16 +1114,16 @@
                 <c:formatCode>General</c:formatCode>
                 <c:ptCount val="4"/>
                 <c:pt idx="0">
-                  <c:v>1000</c:v>
+                  <c:v>1000.0</c:v>
                 </c:pt>
                 <c:pt idx="1">
-                  <c:v>10000</c:v>
+                  <c:v>10000.0</c:v>
                 </c:pt>
                 <c:pt idx="2">
-                  <c:v>100000</c:v>
+                  <c:v>100000.0</c:v>
                 </c:pt>
                 <c:pt idx="3">
-                  <c:v>1000000</c:v>
+                  <c:v>1.0E6</c:v>
                 </c:pt>
               </c:numCache>
             </c:numRef>
@@ -1181,13 +1135,13 @@
                 <c:formatCode>General</c:formatCode>
                 <c:ptCount val="4"/>
                 <c:pt idx="0">
-                  <c:v>4.3544666666666636</c:v>
+                  <c:v>4.354466666666663</c:v>
                 </c:pt>
                 <c:pt idx="1">
-                  <c:v>23.355799999999981</c:v>
+                  <c:v>23.35579999999998</c:v>
                 </c:pt>
                 <c:pt idx="2">
-                  <c:v>332.84976666666648</c:v>
+                  <c:v>332.8497666666665</c:v>
                 </c:pt>
                 <c:pt idx="3">
                   <c:v>3070.222233333333</c:v>
@@ -1207,11 +1161,11 @@
         </c:dLbls>
         <c:marker val="1"/>
         <c:smooth val="0"/>
-        <c:axId val="168717232"/>
-        <c:axId val="168717792"/>
+        <c:axId val="2124656840"/>
+        <c:axId val="2124653848"/>
       </c:lineChart>
       <c:catAx>
-        <c:axId val="168717232"/>
+        <c:axId val="2124656840"/>
         <c:scaling>
           <c:orientation val="minMax"/>
         </c:scaling>
@@ -1221,7 +1175,7 @@
         <c:majorTickMark val="none"/>
         <c:minorTickMark val="none"/>
         <c:tickLblPos val="nextTo"/>
-        <c:crossAx val="168717792"/>
+        <c:crossAx val="2124653848"/>
         <c:crosses val="autoZero"/>
         <c:auto val="1"/>
         <c:lblAlgn val="ctr"/>
@@ -1229,10 +1183,10 @@
         <c:noMultiLvlLbl val="0"/>
       </c:catAx>
       <c:valAx>
-        <c:axId val="168717792"/>
+        <c:axId val="2124653848"/>
         <c:scaling>
           <c:orientation val="minMax"/>
-          <c:max val="7000"/>
+          <c:max val="7000.0"/>
         </c:scaling>
         <c:delete val="0"/>
         <c:axPos val="l"/>
@@ -1260,7 +1214,7 @@
         <c:majorTickMark val="none"/>
         <c:minorTickMark val="none"/>
         <c:tickLblPos val="nextTo"/>
-        <c:crossAx val="168717232"/>
+        <c:crossAx val="2124656840"/>
         <c:crosses val="autoZero"/>
         <c:crossBetween val="between"/>
       </c:valAx>
@@ -1344,16 +1298,16 @@
                 <c:formatCode>General</c:formatCode>
                 <c:ptCount val="4"/>
                 <c:pt idx="0">
-                  <c:v>1000</c:v>
+                  <c:v>1000.0</c:v>
                 </c:pt>
                 <c:pt idx="1">
-                  <c:v>10000</c:v>
+                  <c:v>10000.0</c:v>
                 </c:pt>
                 <c:pt idx="2">
-                  <c:v>100000</c:v>
+                  <c:v>100000.0</c:v>
                 </c:pt>
                 <c:pt idx="3">
-                  <c:v>1000000</c:v>
+                  <c:v>1.0E6</c:v>
                 </c:pt>
               </c:numCache>
             </c:numRef>
@@ -1365,7 +1319,7 @@
                 <c:formatCode>General</c:formatCode>
                 <c:ptCount val="4"/>
                 <c:pt idx="0">
-                  <c:v>0.41703333333333298</c:v>
+                  <c:v>0.417033333333333</c:v>
                 </c:pt>
                 <c:pt idx="1">
                   <c:v>1.687433333333334</c:v>
@@ -1374,7 +1328,7 @@
                   <c:v>13.33123333333333</c:v>
                 </c:pt>
                 <c:pt idx="3">
-                  <c:v>129.73436666666669</c:v>
+                  <c:v>129.7343666666667</c:v>
                 </c:pt>
               </c:numCache>
             </c:numRef>
@@ -1394,16 +1348,16 @@
                 <c:formatCode>General</c:formatCode>
                 <c:ptCount val="4"/>
                 <c:pt idx="0">
-                  <c:v>1000</c:v>
+                  <c:v>1000.0</c:v>
                 </c:pt>
                 <c:pt idx="1">
-                  <c:v>10000</c:v>
+                  <c:v>10000.0</c:v>
                 </c:pt>
                 <c:pt idx="2">
-                  <c:v>100000</c:v>
+                  <c:v>100000.0</c:v>
                 </c:pt>
                 <c:pt idx="3">
-                  <c:v>1000000</c:v>
+                  <c:v>1.0E6</c:v>
                 </c:pt>
               </c:numCache>
             </c:numRef>
@@ -1415,13 +1369,13 @@
                 <c:formatCode>General</c:formatCode>
                 <c:ptCount val="4"/>
                 <c:pt idx="0">
-                  <c:v>2.0575666666666659</c:v>
+                  <c:v>2.057566666666666</c:v>
                 </c:pt>
                 <c:pt idx="1">
-                  <c:v>7.8891999999999998</c:v>
+                  <c:v>7.8892</c:v>
                 </c:pt>
                 <c:pt idx="2">
-                  <c:v>32.316133333333298</c:v>
+                  <c:v>32.3161333333333</c:v>
                 </c:pt>
                 <c:pt idx="3">
                   <c:v>103.0397</c:v>
@@ -1441,11 +1395,11 @@
         </c:dLbls>
         <c:marker val="1"/>
         <c:smooth val="0"/>
-        <c:axId val="168720592"/>
-        <c:axId val="168721152"/>
+        <c:axId val="2126132536"/>
+        <c:axId val="2126135512"/>
       </c:lineChart>
       <c:catAx>
-        <c:axId val="168720592"/>
+        <c:axId val="2126132536"/>
         <c:scaling>
           <c:orientation val="minMax"/>
         </c:scaling>
@@ -1455,7 +1409,7 @@
         <c:majorTickMark val="none"/>
         <c:minorTickMark val="none"/>
         <c:tickLblPos val="nextTo"/>
-        <c:crossAx val="168721152"/>
+        <c:crossAx val="2126135512"/>
         <c:crosses val="autoZero"/>
         <c:auto val="1"/>
         <c:lblAlgn val="ctr"/>
@@ -1463,7 +1417,7 @@
         <c:noMultiLvlLbl val="0"/>
       </c:catAx>
       <c:valAx>
-        <c:axId val="168721152"/>
+        <c:axId val="2126135512"/>
         <c:scaling>
           <c:orientation val="minMax"/>
         </c:scaling>
@@ -1493,7 +1447,7 @@
         <c:majorTickMark val="none"/>
         <c:minorTickMark val="none"/>
         <c:tickLblPos val="nextTo"/>
-        <c:crossAx val="168720592"/>
+        <c:crossAx val="2126132536"/>
         <c:crosses val="autoZero"/>
         <c:crossBetween val="between"/>
       </c:valAx>
@@ -1560,7 +1514,7 @@
           <c:xMode val="edge"/>
           <c:yMode val="edge"/>
           <c:x val="0.198556867891513"/>
-          <c:y val="3.7037037037037E-2"/>
+          <c:y val="0.037037037037037"/>
         </c:manualLayout>
       </c:layout>
       <c:overlay val="0"/>
@@ -1584,16 +1538,16 @@
                 <c:formatCode>General</c:formatCode>
                 <c:ptCount val="4"/>
                 <c:pt idx="0">
-                  <c:v>1000</c:v>
+                  <c:v>1000.0</c:v>
                 </c:pt>
                 <c:pt idx="1">
-                  <c:v>10000</c:v>
+                  <c:v>10000.0</c:v>
                 </c:pt>
                 <c:pt idx="2">
-                  <c:v>100000</c:v>
+                  <c:v>100000.0</c:v>
                 </c:pt>
                 <c:pt idx="3">
-                  <c:v>1000000</c:v>
+                  <c:v>1.0E6</c:v>
                 </c:pt>
               </c:numCache>
             </c:numRef>
@@ -1605,7 +1559,7 @@
                 <c:formatCode>General</c:formatCode>
                 <c:ptCount val="4"/>
                 <c:pt idx="0">
-                  <c:v>1.8028999999999999</c:v>
+                  <c:v>1.8029</c:v>
                 </c:pt>
                 <c:pt idx="1">
                   <c:v>14.88473333333333</c:v>
@@ -1614,7 +1568,7 @@
                   <c:v>140.8356666666667</c:v>
                 </c:pt>
                 <c:pt idx="3">
-                  <c:v>1921.3449000000001</c:v>
+                  <c:v>1921.3449</c:v>
                 </c:pt>
               </c:numCache>
             </c:numRef>
@@ -1634,16 +1588,16 @@
                 <c:formatCode>General</c:formatCode>
                 <c:ptCount val="4"/>
                 <c:pt idx="0">
-                  <c:v>1000</c:v>
+                  <c:v>1000.0</c:v>
                 </c:pt>
                 <c:pt idx="1">
-                  <c:v>10000</c:v>
+                  <c:v>10000.0</c:v>
                 </c:pt>
                 <c:pt idx="2">
-                  <c:v>100000</c:v>
+                  <c:v>100000.0</c:v>
                 </c:pt>
                 <c:pt idx="3">
-                  <c:v>1000000</c:v>
+                  <c:v>1.0E6</c:v>
                 </c:pt>
               </c:numCache>
             </c:numRef>
@@ -1655,13 +1609,13 @@
                 <c:formatCode>General</c:formatCode>
                 <c:ptCount val="4"/>
                 <c:pt idx="0">
-                  <c:v>6.8869333333333316</c:v>
+                  <c:v>6.886933333333332</c:v>
                 </c:pt>
                 <c:pt idx="1">
-                  <c:v>54.049266666666441</c:v>
+                  <c:v>54.04926666666643</c:v>
                 </c:pt>
                 <c:pt idx="2">
-                  <c:v>702.75356666666698</c:v>
+                  <c:v>702.753566666667</c:v>
                 </c:pt>
                 <c:pt idx="3">
                   <c:v>11682.47279999999</c:v>
@@ -1681,11 +1635,11 @@
         </c:dLbls>
         <c:marker val="1"/>
         <c:smooth val="0"/>
-        <c:axId val="168723952"/>
-        <c:axId val="168724512"/>
+        <c:axId val="2126166200"/>
+        <c:axId val="2126169176"/>
       </c:lineChart>
       <c:catAx>
-        <c:axId val="168723952"/>
+        <c:axId val="2126166200"/>
         <c:scaling>
           <c:orientation val="minMax"/>
         </c:scaling>
@@ -1695,7 +1649,7 @@
         <c:majorTickMark val="none"/>
         <c:minorTickMark val="none"/>
         <c:tickLblPos val="nextTo"/>
-        <c:crossAx val="168724512"/>
+        <c:crossAx val="2126169176"/>
         <c:crosses val="autoZero"/>
         <c:auto val="1"/>
         <c:lblAlgn val="ctr"/>
@@ -1703,10 +1657,10 @@
         <c:noMultiLvlLbl val="0"/>
       </c:catAx>
       <c:valAx>
-        <c:axId val="168724512"/>
+        <c:axId val="2126169176"/>
         <c:scaling>
           <c:orientation val="minMax"/>
-          <c:max val="12000"/>
+          <c:max val="12000.0"/>
         </c:scaling>
         <c:delete val="0"/>
         <c:axPos val="l"/>
@@ -1731,8 +1685,8 @@
             <c:manualLayout>
               <c:xMode val="edge"/>
               <c:yMode val="edge"/>
-              <c:x val="3.6111111111111101E-2"/>
-              <c:y val="0.31421551472732601"/>
+              <c:x val="0.0361111111111111"/>
+              <c:y val="0.314215514727326"/>
             </c:manualLayout>
           </c:layout>
           <c:overlay val="0"/>
@@ -1741,7 +1695,7 @@
         <c:majorTickMark val="none"/>
         <c:minorTickMark val="none"/>
         <c:tickLblPos val="nextTo"/>
-        <c:crossAx val="168723952"/>
+        <c:crossAx val="2126166200"/>
         <c:crosses val="autoZero"/>
         <c:crossBetween val="between"/>
       </c:valAx>
@@ -1839,10 +1793,10 @@
           <c:layoutTarget val="inner"/>
           <c:xMode val="edge"/>
           <c:yMode val="edge"/>
-          <c:x val="0.11280852943203799"/>
-          <c:y val="0.12820459942507201"/>
-          <c:w val="0.84891914178078798"/>
-          <c:h val="0.72395138107736501"/>
+          <c:x val="0.112808529432038"/>
+          <c:y val="0.128204599425072"/>
+          <c:w val="0.848919141780788"/>
+          <c:h val="0.723951381077365"/>
         </c:manualLayout>
       </c:layout>
       <c:barChart>
@@ -2217,11 +2171,11 @@
         </c:dLbls>
         <c:gapWidth val="219"/>
         <c:overlap val="-27"/>
-        <c:axId val="202928704"/>
-        <c:axId val="202929264"/>
+        <c:axId val="-2145544184"/>
+        <c:axId val="-2145887944"/>
       </c:barChart>
       <c:catAx>
-        <c:axId val="202928704"/>
+        <c:axId val="-2145544184"/>
         <c:scaling>
           <c:orientation val="minMax"/>
         </c:scaling>
@@ -2261,7 +2215,7 @@
             <a:endParaRPr lang="en-US"/>
           </a:p>
         </c:txPr>
-        <c:crossAx val="202929264"/>
+        <c:crossAx val="-2145887944"/>
         <c:crosses val="autoZero"/>
         <c:auto val="1"/>
         <c:lblAlgn val="ctr"/>
@@ -2269,9 +2223,9 @@
         <c:noMultiLvlLbl val="0"/>
       </c:catAx>
       <c:valAx>
-        <c:axId val="202929264"/>
+        <c:axId val="-2145887944"/>
         <c:scaling>
-          <c:logBase val="10"/>
+          <c:logBase val="10.0"/>
           <c:orientation val="minMax"/>
         </c:scaling>
         <c:delete val="0"/>
@@ -2324,8 +2278,8 @@
             <c:manualLayout>
               <c:xMode val="edge"/>
               <c:yMode val="edge"/>
-              <c:x val="1.5130228034151099E-2"/>
-              <c:y val="0.54783902012248498"/>
+              <c:x val="0.0151302280341511"/>
+              <c:y val="0.547839020122485"/>
             </c:manualLayout>
           </c:layout>
           <c:overlay val="0"/>
@@ -2365,7 +2319,7 @@
             <a:endParaRPr lang="en-US"/>
           </a:p>
         </c:txPr>
-        <c:crossAx val="202928704"/>
+        <c:crossAx val="-2145544184"/>
         <c:crosses val="autoZero"/>
         <c:crossBetween val="between"/>
       </c:valAx>
@@ -2383,9 +2337,9 @@
         <c:manualLayout>
           <c:xMode val="edge"/>
           <c:yMode val="edge"/>
-          <c:x val="0.87094630300791998"/>
-          <c:y val="4.6537307836520402E-2"/>
-          <c:w val="8.9985371843649797E-2"/>
+          <c:x val="0.87094630300792"/>
+          <c:y val="0.0465373078365204"/>
+          <c:w val="0.0899853718436498"/>
           <c:h val="0.200894263217098"/>
         </c:manualLayout>
       </c:layout>
@@ -2570,7 +2524,7 @@
                 <c:formatCode>General</c:formatCode>
                 <c:ptCount val="1"/>
                 <c:pt idx="0">
-                  <c:v>981</c:v>
+                  <c:v>981.0</c:v>
                 </c:pt>
               </c:numCache>
             </c:numRef>
@@ -2677,7 +2631,7 @@
                 <c:formatCode>General</c:formatCode>
                 <c:ptCount val="1"/>
                 <c:pt idx="0">
-                  <c:v>78</c:v>
+                  <c:v>78.0</c:v>
                 </c:pt>
               </c:numCache>
             </c:numRef>
@@ -2725,7 +2679,7 @@
                 <c:formatCode>General</c:formatCode>
                 <c:ptCount val="1"/>
                 <c:pt idx="0">
-                  <c:v>117</c:v>
+                  <c:v>117.0</c:v>
                 </c:pt>
               </c:numCache>
             </c:numRef>
@@ -2773,7 +2727,7 @@
                 <c:formatCode>General</c:formatCode>
                 <c:ptCount val="1"/>
                 <c:pt idx="0">
-                  <c:v>92</c:v>
+                  <c:v>92.0</c:v>
                 </c:pt>
               </c:numCache>
             </c:numRef>
@@ -2821,7 +2775,7 @@
                 <c:formatCode>General</c:formatCode>
                 <c:ptCount val="1"/>
                 <c:pt idx="0">
-                  <c:v>106</c:v>
+                  <c:v>106.0</c:v>
                 </c:pt>
               </c:numCache>
             </c:numRef>
@@ -2869,7 +2823,7 @@
                 <c:formatCode>General</c:formatCode>
                 <c:ptCount val="1"/>
                 <c:pt idx="0">
-                  <c:v>78</c:v>
+                  <c:v>78.0</c:v>
                 </c:pt>
               </c:numCache>
             </c:numRef>
@@ -2917,7 +2871,7 @@
                 <c:formatCode>General</c:formatCode>
                 <c:ptCount val="1"/>
                 <c:pt idx="0">
-                  <c:v>105</c:v>
+                  <c:v>105.0</c:v>
                 </c:pt>
               </c:numCache>
             </c:numRef>
@@ -2965,7 +2919,7 @@
                 <c:formatCode>General</c:formatCode>
                 <c:ptCount val="1"/>
                 <c:pt idx="0">
-                  <c:v>95</c:v>
+                  <c:v>95.0</c:v>
                 </c:pt>
               </c:numCache>
             </c:numRef>
@@ -3013,7 +2967,7 @@
                 <c:formatCode>General</c:formatCode>
                 <c:ptCount val="1"/>
                 <c:pt idx="0">
-                  <c:v>109</c:v>
+                  <c:v>109.0</c:v>
                 </c:pt>
               </c:numCache>
             </c:numRef>
@@ -3061,7 +3015,7 @@
                 <c:formatCode>General</c:formatCode>
                 <c:ptCount val="1"/>
                 <c:pt idx="0">
-                  <c:v>93</c:v>
+                  <c:v>93.0</c:v>
                 </c:pt>
               </c:numCache>
             </c:numRef>
@@ -3109,7 +3063,7 @@
                 <c:formatCode>General</c:formatCode>
                 <c:ptCount val="1"/>
                 <c:pt idx="0">
-                  <c:v>102</c:v>
+                  <c:v>102.0</c:v>
                 </c:pt>
               </c:numCache>
             </c:numRef>
@@ -3157,7 +3111,7 @@
                 <c:formatCode>General</c:formatCode>
                 <c:ptCount val="1"/>
                 <c:pt idx="0">
-                  <c:v>86</c:v>
+                  <c:v>86.0</c:v>
                 </c:pt>
               </c:numCache>
             </c:numRef>
@@ -3205,7 +3159,7 @@
                 <c:formatCode>General</c:formatCode>
                 <c:ptCount val="1"/>
                 <c:pt idx="0">
-                  <c:v>97</c:v>
+                  <c:v>97.0</c:v>
                 </c:pt>
               </c:numCache>
             </c:numRef>
@@ -3253,7 +3207,7 @@
                 <c:formatCode>General</c:formatCode>
                 <c:ptCount val="1"/>
                 <c:pt idx="0">
-                  <c:v>78</c:v>
+                  <c:v>78.0</c:v>
                 </c:pt>
               </c:numCache>
             </c:numRef>
@@ -3301,7 +3255,7 @@
                 <c:formatCode>General</c:formatCode>
                 <c:ptCount val="1"/>
                 <c:pt idx="0">
-                  <c:v>105</c:v>
+                  <c:v>105.0</c:v>
                 </c:pt>
               </c:numCache>
             </c:numRef>
@@ -3349,7 +3303,7 @@
                 <c:formatCode>General</c:formatCode>
                 <c:ptCount val="1"/>
                 <c:pt idx="0">
-                  <c:v>86</c:v>
+                  <c:v>86.0</c:v>
                 </c:pt>
               </c:numCache>
             </c:numRef>
@@ -3397,7 +3351,7 @@
                 <c:formatCode>General</c:formatCode>
                 <c:ptCount val="1"/>
                 <c:pt idx="0">
-                  <c:v>89</c:v>
+                  <c:v>89.0</c:v>
                 </c:pt>
               </c:numCache>
             </c:numRef>
@@ -3445,7 +3399,7 @@
                 <c:formatCode>General</c:formatCode>
                 <c:ptCount val="1"/>
                 <c:pt idx="0">
-                  <c:v>78</c:v>
+                  <c:v>78.0</c:v>
                 </c:pt>
               </c:numCache>
             </c:numRef>
@@ -3493,7 +3447,7 @@
                 <c:formatCode>General</c:formatCode>
                 <c:ptCount val="1"/>
                 <c:pt idx="0">
-                  <c:v>86</c:v>
+                  <c:v>86.0</c:v>
                 </c:pt>
               </c:numCache>
             </c:numRef>
@@ -3541,7 +3495,7 @@
                 <c:formatCode>General</c:formatCode>
                 <c:ptCount val="1"/>
                 <c:pt idx="0">
-                  <c:v>93</c:v>
+                  <c:v>93.0</c:v>
                 </c:pt>
               </c:numCache>
             </c:numRef>
@@ -3589,7 +3543,7 @@
                 <c:formatCode>General</c:formatCode>
                 <c:ptCount val="1"/>
                 <c:pt idx="0">
-                  <c:v>86</c:v>
+                  <c:v>86.0</c:v>
                 </c:pt>
               </c:numCache>
             </c:numRef>
@@ -3637,7 +3591,7 @@
                 <c:formatCode>General</c:formatCode>
                 <c:ptCount val="1"/>
                 <c:pt idx="0">
-                  <c:v>81</c:v>
+                  <c:v>81.0</c:v>
                 </c:pt>
               </c:numCache>
             </c:numRef>
@@ -3685,7 +3639,7 @@
                 <c:formatCode>General</c:formatCode>
                 <c:ptCount val="1"/>
                 <c:pt idx="0">
-                  <c:v>94</c:v>
+                  <c:v>94.0</c:v>
                 </c:pt>
               </c:numCache>
             </c:numRef>
@@ -3733,7 +3687,7 @@
                 <c:formatCode>General</c:formatCode>
                 <c:ptCount val="1"/>
                 <c:pt idx="0">
-                  <c:v>86</c:v>
+                  <c:v>86.0</c:v>
                 </c:pt>
               </c:numCache>
             </c:numRef>
@@ -3781,7 +3735,7 @@
                 <c:formatCode>General</c:formatCode>
                 <c:ptCount val="1"/>
                 <c:pt idx="0">
-                  <c:v>80</c:v>
+                  <c:v>80.0</c:v>
                 </c:pt>
               </c:numCache>
             </c:numRef>
@@ -3829,7 +3783,7 @@
                 <c:formatCode>General</c:formatCode>
                 <c:ptCount val="1"/>
                 <c:pt idx="0">
-                  <c:v>83</c:v>
+                  <c:v>83.0</c:v>
                 </c:pt>
               </c:numCache>
             </c:numRef>
@@ -3877,7 +3831,7 @@
                 <c:formatCode>General</c:formatCode>
                 <c:ptCount val="1"/>
                 <c:pt idx="0">
-                  <c:v>94</c:v>
+                  <c:v>94.0</c:v>
                 </c:pt>
               </c:numCache>
             </c:numRef>
@@ -3925,7 +3879,7 @@
                 <c:formatCode>General</c:formatCode>
                 <c:ptCount val="1"/>
                 <c:pt idx="0">
-                  <c:v>90</c:v>
+                  <c:v>90.0</c:v>
                 </c:pt>
               </c:numCache>
             </c:numRef>
@@ -3973,7 +3927,7 @@
                 <c:formatCode>General</c:formatCode>
                 <c:ptCount val="1"/>
                 <c:pt idx="0">
-                  <c:v>94</c:v>
+                  <c:v>94.0</c:v>
                 </c:pt>
               </c:numCache>
             </c:numRef>
@@ -4021,7 +3975,7 @@
                 <c:formatCode>General</c:formatCode>
                 <c:ptCount val="1"/>
                 <c:pt idx="0">
-                  <c:v>85</c:v>
+                  <c:v>85.0</c:v>
                 </c:pt>
               </c:numCache>
             </c:numRef>
@@ -4037,11 +3991,11 @@
         </c:dLbls>
         <c:gapWidth val="219"/>
         <c:overlap val="-27"/>
-        <c:axId val="172624704"/>
-        <c:axId val="172625264"/>
+        <c:axId val="2124393240"/>
+        <c:axId val="2124396872"/>
       </c:barChart>
       <c:catAx>
-        <c:axId val="172624704"/>
+        <c:axId val="2124393240"/>
         <c:scaling>
           <c:orientation val="minMax"/>
         </c:scaling>
@@ -4084,7 +4038,7 @@
             <a:endParaRPr lang="en-US"/>
           </a:p>
         </c:txPr>
-        <c:crossAx val="172625264"/>
+        <c:crossAx val="2124396872"/>
         <c:crosses val="autoZero"/>
         <c:auto val="1"/>
         <c:lblAlgn val="ctr"/>
@@ -4092,7 +4046,7 @@
         <c:noMultiLvlLbl val="0"/>
       </c:catAx>
       <c:valAx>
-        <c:axId val="172625264"/>
+        <c:axId val="2124396872"/>
         <c:scaling>
           <c:orientation val="minMax"/>
         </c:scaling>
@@ -4156,26 +4110,6 @@
             </a:ln>
             <a:effectLst/>
           </c:spPr>
-          <c:txPr>
-            <a:bodyPr rot="-5400000" spcFirstLastPara="1" vertOverflow="ellipsis" vert="horz" wrap="square" anchor="ctr" anchorCtr="1"/>
-            <a:lstStyle/>
-            <a:p>
-              <a:pPr>
-                <a:defRPr sz="1400" b="0" i="0" u="none" strike="noStrike" kern="1200" baseline="0">
-                  <a:solidFill>
-                    <a:schemeClr val="tx1">
-                      <a:lumMod val="50000"/>
-                      <a:lumOff val="50000"/>
-                    </a:schemeClr>
-                  </a:solidFill>
-                  <a:latin typeface="Roboto Condensed" panose="02000000000000000000" pitchFamily="2" charset="0"/>
-                  <a:ea typeface="Roboto Condensed" panose="02000000000000000000" pitchFamily="2" charset="0"/>
-                  <a:cs typeface="+mn-cs"/>
-                </a:defRPr>
-              </a:pPr>
-              <a:endParaRPr lang="en-US"/>
-            </a:p>
-          </c:txPr>
         </c:title>
         <c:numFmt formatCode="General" sourceLinked="1"/>
         <c:majorTickMark val="none"/>
@@ -4208,7 +4142,7 @@
             <a:endParaRPr lang="en-US"/>
           </a:p>
         </c:txPr>
-        <c:crossAx val="172624704"/>
+        <c:crossAx val="2124393240"/>
         <c:crosses val="autoZero"/>
         <c:crossBetween val="between"/>
       </c:valAx>
@@ -4244,7 +4178,7 @@
       <a:endParaRPr lang="en-US"/>
     </a:p>
   </c:txPr>
-  <c:externalData r:id="rId3">
+  <c:externalData r:id="rId1">
     <c:autoUpdate val="0"/>
   </c:externalData>
 </c:chartSpace>
@@ -4300,25 +4234,25 @@
                   <c:v>239.7</c:v>
                 </c:pt>
                 <c:pt idx="2">
-                  <c:v>288.93333333333328</c:v>
+                  <c:v>288.9333333333333</c:v>
                 </c:pt>
                 <c:pt idx="3">
-                  <c:v>236.43333333333339</c:v>
+                  <c:v>236.4333333333334</c:v>
                 </c:pt>
                 <c:pt idx="4">
                   <c:v>232.8</c:v>
                 </c:pt>
                 <c:pt idx="5">
-                  <c:v>286.33333333333331</c:v>
+                  <c:v>286.3333333333333</c:v>
                 </c:pt>
                 <c:pt idx="6">
-                  <c:v>878.53333333333353</c:v>
+                  <c:v>878.5333333333335</c:v>
                 </c:pt>
                 <c:pt idx="7">
-                  <c:v>851.53333333333353</c:v>
+                  <c:v>851.5333333333335</c:v>
                 </c:pt>
                 <c:pt idx="8">
-                  <c:v>1209.0999999999999</c:v>
+                  <c:v>1209.1</c:v>
                 </c:pt>
               </c:numCache>
             </c:numRef>
@@ -4347,25 +4281,25 @@
                 <c:formatCode>General</c:formatCode>
                 <c:ptCount val="9"/>
                 <c:pt idx="0">
-                  <c:v>559.26666666666665</c:v>
+                  <c:v>559.2666666666666</c:v>
                 </c:pt>
                 <c:pt idx="1">
                   <c:v>493.4666666666667</c:v>
                 </c:pt>
                 <c:pt idx="2">
-                  <c:v>644.63333333333355</c:v>
+                  <c:v>644.6333333333335</c:v>
                 </c:pt>
                 <c:pt idx="3">
-                  <c:v>570.53333333333353</c:v>
+                  <c:v>570.5333333333335</c:v>
                 </c:pt>
                 <c:pt idx="4">
                   <c:v>498.9666666666667</c:v>
                 </c:pt>
                 <c:pt idx="5">
-                  <c:v>649.26666666666665</c:v>
+                  <c:v>649.2666666666666</c:v>
                 </c:pt>
                 <c:pt idx="6">
-                  <c:v>1974.2666666666671</c:v>
+                  <c:v>1974.266666666667</c:v>
                 </c:pt>
                 <c:pt idx="7">
                   <c:v>1523.6</c:v>
@@ -4387,11 +4321,11 @@
         </c:dLbls>
         <c:gapWidth val="110"/>
         <c:overlap val="-27"/>
-        <c:axId val="330004704"/>
-        <c:axId val="270280368"/>
+        <c:axId val="2125894632"/>
+        <c:axId val="2125901128"/>
       </c:barChart>
       <c:catAx>
-        <c:axId val="330004704"/>
+        <c:axId val="2125894632"/>
         <c:scaling>
           <c:orientation val="minMax"/>
         </c:scaling>
@@ -4432,26 +4366,6 @@
             </a:ln>
             <a:effectLst/>
           </c:spPr>
-          <c:txPr>
-            <a:bodyPr rot="0" spcFirstLastPara="1" vertOverflow="ellipsis" vert="horz" wrap="square" anchor="ctr" anchorCtr="1"/>
-            <a:lstStyle/>
-            <a:p>
-              <a:pPr>
-                <a:defRPr sz="1000" b="0" i="0" u="none" strike="noStrike" kern="1200" baseline="0">
-                  <a:solidFill>
-                    <a:schemeClr val="tx1">
-                      <a:lumMod val="65000"/>
-                      <a:lumOff val="35000"/>
-                    </a:schemeClr>
-                  </a:solidFill>
-                  <a:latin typeface="+mn-lt"/>
-                  <a:ea typeface="+mn-ea"/>
-                  <a:cs typeface="+mn-cs"/>
-                </a:defRPr>
-              </a:pPr>
-              <a:endParaRPr lang="en-US"/>
-            </a:p>
-          </c:txPr>
         </c:title>
         <c:majorTickMark val="none"/>
         <c:minorTickMark val="none"/>
@@ -4489,7 +4403,7 @@
             <a:endParaRPr lang="en-US"/>
           </a:p>
         </c:txPr>
-        <c:crossAx val="270280368"/>
+        <c:crossAx val="2125901128"/>
         <c:crosses val="autoZero"/>
         <c:auto val="1"/>
         <c:lblAlgn val="ctr"/>
@@ -4497,10 +4411,10 @@
         <c:noMultiLvlLbl val="0"/>
       </c:catAx>
       <c:valAx>
-        <c:axId val="270280368"/>
+        <c:axId val="2125901128"/>
         <c:scaling>
           <c:orientation val="minMax"/>
-          <c:max val="2500"/>
+          <c:max val="2500.0"/>
         </c:scaling>
         <c:delete val="0"/>
         <c:axPos val="l"/>
@@ -4553,26 +4467,6 @@
             </a:ln>
             <a:effectLst/>
           </c:spPr>
-          <c:txPr>
-            <a:bodyPr rot="-5400000" spcFirstLastPara="1" vertOverflow="ellipsis" vert="horz" wrap="square" anchor="ctr" anchorCtr="1"/>
-            <a:lstStyle/>
-            <a:p>
-              <a:pPr>
-                <a:defRPr sz="1400" b="0" i="0" u="none" strike="noStrike" kern="1200" baseline="0">
-                  <a:solidFill>
-                    <a:schemeClr val="tx1">
-                      <a:lumMod val="65000"/>
-                      <a:lumOff val="35000"/>
-                    </a:schemeClr>
-                  </a:solidFill>
-                  <a:latin typeface="+mn-lt"/>
-                  <a:ea typeface="+mn-ea"/>
-                  <a:cs typeface="+mn-cs"/>
-                </a:defRPr>
-              </a:pPr>
-              <a:endParaRPr lang="en-US"/>
-            </a:p>
-          </c:txPr>
         </c:title>
         <c:numFmt formatCode="General" sourceLinked="1"/>
         <c:majorTickMark val="none"/>
@@ -4605,7 +4499,7 @@
             <a:endParaRPr lang="en-US"/>
           </a:p>
         </c:txPr>
-        <c:crossAx val="330004704"/>
+        <c:crossAx val="2125894632"/>
         <c:crosses val="autoZero"/>
         <c:crossBetween val="between"/>
       </c:valAx>
@@ -4623,10 +4517,10 @@
         <c:manualLayout>
           <c:xMode val="edge"/>
           <c:yMode val="edge"/>
-          <c:x val="0.78714838802951304"/>
-          <c:y val="6.4169645577317885E-2"/>
-          <c:w val="0.11659282589676299"/>
-          <c:h val="0.12500087489063899"/>
+          <c:x val="0.787148388029513"/>
+          <c:y val="0.0641696455773179"/>
+          <c:w val="0.116592825896763"/>
+          <c:h val="0.125000874890639"/>
         </c:manualLayout>
       </c:layout>
       <c:overlay val="1"/>
@@ -4679,10 +4573,10 @@
       <a:endParaRPr lang="en-US"/>
     </a:p>
   </c:txPr>
-  <c:externalData r:id="rId3">
+  <c:externalData r:id="rId1">
     <c:autoUpdate val="0"/>
   </c:externalData>
-  <c:userShapes r:id="rId4"/>
+  <c:userShapes r:id="rId2"/>
 </c:chartSpace>
 </file>
 
@@ -4740,26 +4634,6 @@
         </a:ln>
         <a:effectLst/>
       </c:spPr>
-      <c:txPr>
-        <a:bodyPr rot="0" spcFirstLastPara="1" vertOverflow="ellipsis" vert="horz" wrap="square" anchor="ctr" anchorCtr="1"/>
-        <a:lstStyle/>
-        <a:p>
-          <a:pPr>
-            <a:defRPr sz="1600" b="0" i="0" u="none" strike="noStrike" kern="1200" spc="0" baseline="0">
-              <a:solidFill>
-                <a:schemeClr val="tx1">
-                  <a:lumMod val="65000"/>
-                  <a:lumOff val="35000"/>
-                </a:schemeClr>
-              </a:solidFill>
-              <a:latin typeface="+mn-lt"/>
-              <a:ea typeface="+mn-ea"/>
-              <a:cs typeface="+mn-cs"/>
-            </a:defRPr>
-          </a:pPr>
-          <a:endParaRPr lang="en-US"/>
-        </a:p>
-      </c:txPr>
     </c:title>
     <c:autoTitleDeleted val="0"/>
     <c:plotArea>
@@ -4788,94 +4662,94 @@
                 <c:formatCode>General</c:formatCode>
                 <c:ptCount val="30"/>
                 <c:pt idx="0">
-                  <c:v>14283</c:v>
+                  <c:v>14283.0</c:v>
                 </c:pt>
                 <c:pt idx="1">
-                  <c:v>13797</c:v>
+                  <c:v>13797.0</c:v>
                 </c:pt>
                 <c:pt idx="2">
-                  <c:v>10101</c:v>
+                  <c:v>10101.0</c:v>
                 </c:pt>
                 <c:pt idx="3">
-                  <c:v>8899</c:v>
+                  <c:v>8899.0</c:v>
                 </c:pt>
                 <c:pt idx="4">
-                  <c:v>8847</c:v>
+                  <c:v>8847.0</c:v>
                 </c:pt>
                 <c:pt idx="5">
-                  <c:v>8779</c:v>
+                  <c:v>8779.0</c:v>
                 </c:pt>
                 <c:pt idx="6">
-                  <c:v>8801</c:v>
+                  <c:v>8801.0</c:v>
                 </c:pt>
                 <c:pt idx="7">
-                  <c:v>8706</c:v>
+                  <c:v>8706.0</c:v>
                 </c:pt>
                 <c:pt idx="8">
-                  <c:v>8735</c:v>
+                  <c:v>8735.0</c:v>
                 </c:pt>
                 <c:pt idx="9">
-                  <c:v>13375</c:v>
+                  <c:v>13375.0</c:v>
                 </c:pt>
                 <c:pt idx="10">
-                  <c:v>13482</c:v>
+                  <c:v>13482.0</c:v>
                 </c:pt>
                 <c:pt idx="11">
-                  <c:v>13507</c:v>
+                  <c:v>13507.0</c:v>
                 </c:pt>
                 <c:pt idx="12">
-                  <c:v>13475</c:v>
+                  <c:v>13475.0</c:v>
                 </c:pt>
                 <c:pt idx="13">
-                  <c:v>12429</c:v>
+                  <c:v>12429.0</c:v>
                 </c:pt>
                 <c:pt idx="14">
-                  <c:v>8759</c:v>
+                  <c:v>8759.0</c:v>
                 </c:pt>
                 <c:pt idx="15">
-                  <c:v>8621</c:v>
+                  <c:v>8621.0</c:v>
                 </c:pt>
                 <c:pt idx="16">
-                  <c:v>8753</c:v>
+                  <c:v>8753.0</c:v>
                 </c:pt>
                 <c:pt idx="17">
-                  <c:v>8713</c:v>
+                  <c:v>8713.0</c:v>
                 </c:pt>
                 <c:pt idx="18">
-                  <c:v>8568</c:v>
+                  <c:v>8568.0</c:v>
                 </c:pt>
                 <c:pt idx="19">
-                  <c:v>8696</c:v>
+                  <c:v>8696.0</c:v>
                 </c:pt>
                 <c:pt idx="20">
-                  <c:v>10148</c:v>
+                  <c:v>10148.0</c:v>
                 </c:pt>
                 <c:pt idx="21">
-                  <c:v>13586</c:v>
+                  <c:v>13586.0</c:v>
                 </c:pt>
                 <c:pt idx="22">
-                  <c:v>13762</c:v>
+                  <c:v>13762.0</c:v>
                 </c:pt>
                 <c:pt idx="23">
-                  <c:v>13559</c:v>
+                  <c:v>13559.0</c:v>
                 </c:pt>
                 <c:pt idx="24">
-                  <c:v>13935</c:v>
+                  <c:v>13935.0</c:v>
                 </c:pt>
                 <c:pt idx="25">
-                  <c:v>10506</c:v>
+                  <c:v>10506.0</c:v>
                 </c:pt>
                 <c:pt idx="26">
-                  <c:v>8689</c:v>
+                  <c:v>8689.0</c:v>
                 </c:pt>
                 <c:pt idx="27">
-                  <c:v>8670</c:v>
+                  <c:v>8670.0</c:v>
                 </c:pt>
                 <c:pt idx="28">
-                  <c:v>8494</c:v>
+                  <c:v>8494.0</c:v>
                 </c:pt>
                 <c:pt idx="29">
-                  <c:v>8724</c:v>
+                  <c:v>8724.0</c:v>
                 </c:pt>
               </c:numCache>
             </c:numRef>
@@ -4891,11 +4765,11 @@
         </c:dLbls>
         <c:gapWidth val="75"/>
         <c:overlap val="-27"/>
-        <c:axId val="407150640"/>
-        <c:axId val="407147280"/>
+        <c:axId val="2125833960"/>
+        <c:axId val="2125828456"/>
       </c:barChart>
       <c:catAx>
-        <c:axId val="407150640"/>
+        <c:axId val="2125833960"/>
         <c:scaling>
           <c:orientation val="minMax"/>
         </c:scaling>
@@ -4941,26 +4815,6 @@
             </a:ln>
             <a:effectLst/>
           </c:spPr>
-          <c:txPr>
-            <a:bodyPr rot="0" spcFirstLastPara="1" vertOverflow="ellipsis" vert="horz" wrap="square" anchor="ctr" anchorCtr="1"/>
-            <a:lstStyle/>
-            <a:p>
-              <a:pPr>
-                <a:defRPr sz="1600" b="0" i="0" u="none" strike="noStrike" kern="1200" baseline="0">
-                  <a:solidFill>
-                    <a:schemeClr val="tx1">
-                      <a:lumMod val="65000"/>
-                      <a:lumOff val="35000"/>
-                    </a:schemeClr>
-                  </a:solidFill>
-                  <a:latin typeface="+mn-lt"/>
-                  <a:ea typeface="+mn-ea"/>
-                  <a:cs typeface="+mn-cs"/>
-                </a:defRPr>
-              </a:pPr>
-              <a:endParaRPr lang="en-US"/>
-            </a:p>
-          </c:txPr>
         </c:title>
         <c:majorTickMark val="none"/>
         <c:minorTickMark val="none"/>
@@ -4998,7 +4852,7 @@
             <a:endParaRPr lang="en-US"/>
           </a:p>
         </c:txPr>
-        <c:crossAx val="407147280"/>
+        <c:crossAx val="2125828456"/>
         <c:crosses val="autoZero"/>
         <c:auto val="1"/>
         <c:lblAlgn val="ctr"/>
@@ -5006,7 +4860,7 @@
         <c:noMultiLvlLbl val="0"/>
       </c:catAx>
       <c:valAx>
-        <c:axId val="407147280"/>
+        <c:axId val="2125828456"/>
         <c:scaling>
           <c:orientation val="minMax"/>
         </c:scaling>
@@ -5061,26 +4915,6 @@
             </a:ln>
             <a:effectLst/>
           </c:spPr>
-          <c:txPr>
-            <a:bodyPr rot="-5400000" spcFirstLastPara="1" vertOverflow="ellipsis" vert="horz" wrap="square" anchor="ctr" anchorCtr="1"/>
-            <a:lstStyle/>
-            <a:p>
-              <a:pPr>
-                <a:defRPr sz="1600" b="0" i="0" u="none" strike="noStrike" kern="1200" baseline="0">
-                  <a:solidFill>
-                    <a:schemeClr val="tx1">
-                      <a:lumMod val="65000"/>
-                      <a:lumOff val="35000"/>
-                    </a:schemeClr>
-                  </a:solidFill>
-                  <a:latin typeface="+mn-lt"/>
-                  <a:ea typeface="+mn-ea"/>
-                  <a:cs typeface="+mn-cs"/>
-                </a:defRPr>
-              </a:pPr>
-              <a:endParaRPr lang="en-US"/>
-            </a:p>
-          </c:txPr>
         </c:title>
         <c:numFmt formatCode="General" sourceLinked="1"/>
         <c:majorTickMark val="none"/>
@@ -5113,7 +4947,7 @@
             <a:endParaRPr lang="en-US"/>
           </a:p>
         </c:txPr>
-        <c:crossAx val="407150640"/>
+        <c:crossAx val="2125833960"/>
         <c:crosses val="autoZero"/>
         <c:crossBetween val="between"/>
       </c:valAx>
@@ -5146,7 +4980,7 @@
       <a:endParaRPr lang="en-US"/>
     </a:p>
   </c:txPr>
-  <c:externalData r:id="rId3">
+  <c:externalData r:id="rId1">
     <c:autoUpdate val="0"/>
   </c:externalData>
 </c:chartSpace>
@@ -5193,9 +5027,9 @@
           <c:xMode val="edge"/>
           <c:yMode val="edge"/>
           <c:x val="0.135497976895952"/>
-          <c:y val="0.29567207396955397"/>
+          <c:y val="0.295672073969554"/>
           <c:w val="0.51103208303059"/>
-          <c:h val="0.62412116669346396"/>
+          <c:h val="0.624121166693464"/>
         </c:manualLayout>
       </c:layout>
       <c:radarChart>
@@ -5237,16 +5071,16 @@
                 <c:formatCode>General</c:formatCode>
                 <c:ptCount val="5"/>
                 <c:pt idx="0">
-                  <c:v>0.31116666666666698</c:v>
+                  <c:v>0.311166666666667</c:v>
                 </c:pt>
                 <c:pt idx="1">
-                  <c:v>5.3240666666666412</c:v>
+                  <c:v>5.324066666666639</c:v>
                 </c:pt>
                 <c:pt idx="2">
-                  <c:v>0.41703333333333298</c:v>
+                  <c:v>0.417033333333333</c:v>
                 </c:pt>
                 <c:pt idx="3">
-                  <c:v>1.8028999999999999</c:v>
+                  <c:v>1.8029</c:v>
                 </c:pt>
                 <c:pt idx="4">
                   <c:v>2.437533333333334</c:v>
@@ -5291,19 +5125,19 @@
                 <c:formatCode>General</c:formatCode>
                 <c:ptCount val="5"/>
                 <c:pt idx="0">
-                  <c:v>1.7188666666666661</c:v>
+                  <c:v>1.718866666666666</c:v>
                 </c:pt>
                 <c:pt idx="1">
-                  <c:v>4.3544666666666476</c:v>
+                  <c:v>4.354466666666647</c:v>
                 </c:pt>
                 <c:pt idx="2">
-                  <c:v>2.0575666666666659</c:v>
+                  <c:v>2.057566666666666</c:v>
                 </c:pt>
                 <c:pt idx="3">
-                  <c:v>6.8869333333333316</c:v>
+                  <c:v>6.886933333333332</c:v>
                 </c:pt>
                 <c:pt idx="4">
-                  <c:v>3.9569333333333301</c:v>
+                  <c:v>3.95693333333333</c:v>
                 </c:pt>
               </c:numCache>
             </c:numRef>
@@ -5317,11 +5151,11 @@
           <c:showPercent val="0"/>
           <c:showBubbleSize val="0"/>
         </c:dLbls>
-        <c:axId val="167362080"/>
-        <c:axId val="167362640"/>
+        <c:axId val="2125045928"/>
+        <c:axId val="2125049176"/>
       </c:radarChart>
       <c:catAx>
-        <c:axId val="167362080"/>
+        <c:axId val="2125045928"/>
         <c:scaling>
           <c:orientation val="minMax"/>
         </c:scaling>
@@ -5337,7 +5171,7 @@
             <a:noFill/>
           </a:ln>
         </c:spPr>
-        <c:crossAx val="167362640"/>
+        <c:crossAx val="2125049176"/>
         <c:crosses val="autoZero"/>
         <c:auto val="1"/>
         <c:lblAlgn val="ctr"/>
@@ -5345,7 +5179,7 @@
         <c:noMultiLvlLbl val="0"/>
       </c:catAx>
       <c:valAx>
-        <c:axId val="167362640"/>
+        <c:axId val="2125049176"/>
         <c:scaling>
           <c:orientation val="minMax"/>
         </c:scaling>
@@ -5356,7 +5190,7 @@
         <c:majorTickMark val="none"/>
         <c:minorTickMark val="none"/>
         <c:tickLblPos val="nextTo"/>
-        <c:crossAx val="167362080"/>
+        <c:crossAx val="2125045928"/>
         <c:crosses val="autoZero"/>
         <c:crossBetween val="between"/>
       </c:valAx>
@@ -5367,10 +5201,10 @@
         <c:manualLayout>
           <c:xMode val="edge"/>
           <c:yMode val="edge"/>
-          <c:x val="0.73979758484514602"/>
-          <c:y val="0.40892857713976499"/>
-          <c:w val="0.22185962865752901"/>
-          <c:h val="0.30545099358191702"/>
+          <c:x val="0.739797584845146"/>
+          <c:y val="0.408928577139765"/>
+          <c:w val="0.221859628657529"/>
+          <c:h val="0.305450993581917"/>
         </c:manualLayout>
       </c:layout>
       <c:overlay val="0"/>
@@ -5425,10 +5259,10 @@
           <c:layoutTarget val="inner"/>
           <c:xMode val="edge"/>
           <c:yMode val="edge"/>
-          <c:x val="9.9136873882410506E-2"/>
-          <c:y val="0.24485084045345401"/>
+          <c:x val="0.0991368738824105"/>
+          <c:y val="0.244850840453454"/>
           <c:w val="0.48494709733538"/>
-          <c:h val="0.69828914247844698"/>
+          <c:h val="0.698289142478447"/>
         </c:manualLayout>
       </c:layout>
       <c:radarChart>
@@ -5473,7 +5307,7 @@
                   <c:v>1.163866666666667</c:v>
                 </c:pt>
                 <c:pt idx="1">
-                  <c:v>43.385100000000001</c:v>
+                  <c:v>43.3851</c:v>
                 </c:pt>
                 <c:pt idx="2">
                   <c:v>1.687433333333334</c:v>
@@ -5482,7 +5316,7 @@
                   <c:v>14.88473333333333</c:v>
                 </c:pt>
                 <c:pt idx="4">
-                  <c:v>25.785066666666669</c:v>
+                  <c:v>25.78506666666667</c:v>
                 </c:pt>
               </c:numCache>
             </c:numRef>
@@ -5527,13 +5361,13 @@
                   <c:v>4.200433333333331</c:v>
                 </c:pt>
                 <c:pt idx="1">
-                  <c:v>23.355799999999981</c:v>
+                  <c:v>23.35579999999998</c:v>
                 </c:pt>
                 <c:pt idx="2">
-                  <c:v>7.8891999999999998</c:v>
+                  <c:v>7.8892</c:v>
                 </c:pt>
                 <c:pt idx="3">
-                  <c:v>54.049266666666341</c:v>
+                  <c:v>54.04926666666633</c:v>
                 </c:pt>
                 <c:pt idx="4">
                   <c:v>10.9564</c:v>
@@ -5550,11 +5384,11 @@
           <c:showPercent val="0"/>
           <c:showBubbleSize val="0"/>
         </c:dLbls>
-        <c:axId val="167365440"/>
-        <c:axId val="167366000"/>
+        <c:axId val="2125076696"/>
+        <c:axId val="2125079944"/>
       </c:radarChart>
       <c:catAx>
-        <c:axId val="167365440"/>
+        <c:axId val="2125076696"/>
         <c:scaling>
           <c:orientation val="minMax"/>
         </c:scaling>
@@ -5570,7 +5404,7 @@
             <a:noFill/>
           </a:ln>
         </c:spPr>
-        <c:crossAx val="167366000"/>
+        <c:crossAx val="2125079944"/>
         <c:crosses val="autoZero"/>
         <c:auto val="1"/>
         <c:lblAlgn val="ctr"/>
@@ -5578,7 +5412,7 @@
         <c:noMultiLvlLbl val="0"/>
       </c:catAx>
       <c:valAx>
-        <c:axId val="167366000"/>
+        <c:axId val="2125079944"/>
         <c:scaling>
           <c:orientation val="minMax"/>
         </c:scaling>
@@ -5589,7 +5423,7 @@
         <c:majorTickMark val="none"/>
         <c:minorTickMark val="none"/>
         <c:tickLblPos val="nextTo"/>
-        <c:crossAx val="167365440"/>
+        <c:crossAx val="2125076696"/>
         <c:crosses val="autoZero"/>
         <c:crossBetween val="between"/>
       </c:valAx>
@@ -5600,10 +5434,10 @@
         <c:manualLayout>
           <c:xMode val="edge"/>
           <c:yMode val="edge"/>
-          <c:x val="0.67909197196012006"/>
-          <c:y val="0.54551718384138104"/>
-          <c:w val="0.23299484116209601"/>
-          <c:h val="0.21902808957391001"/>
+          <c:x val="0.67909197196012"/>
+          <c:y val="0.545517183841381"/>
+          <c:w val="0.232994841162096"/>
+          <c:h val="0.21902808957391"/>
         </c:manualLayout>
       </c:layout>
       <c:overlay val="0"/>
@@ -5658,10 +5492,10 @@
           <c:layoutTarget val="inner"/>
           <c:xMode val="edge"/>
           <c:yMode val="edge"/>
-          <c:x val="0.14468932371002399"/>
-          <c:y val="0.26789547526626101"/>
-          <c:w val="0.49027742976372402"/>
-          <c:h val="0.63525871926588195"/>
+          <c:x val="0.144689323710024"/>
+          <c:y val="0.267895475266261"/>
+          <c:w val="0.490277429763724"/>
+          <c:h val="0.635258719265882"/>
         </c:manualLayout>
       </c:layout>
       <c:radarChart>
@@ -5703,10 +5537,10 @@
                 <c:formatCode>General</c:formatCode>
                 <c:ptCount val="5"/>
                 <c:pt idx="0">
-                  <c:v>9.5801000000000016</c:v>
+                  <c:v>9.580100000000001</c:v>
                 </c:pt>
                 <c:pt idx="1">
-                  <c:v>577.22216666666657</c:v>
+                  <c:v>577.2221666666666</c:v>
                 </c:pt>
                 <c:pt idx="2">
                   <c:v>13.33123333333333</c:v>
@@ -5737,19 +5571,19 @@
                 <c:formatCode>General</c:formatCode>
                 <c:ptCount val="5"/>
                 <c:pt idx="0">
-                  <c:v>34.676299999999998</c:v>
+                  <c:v>34.6763</c:v>
                 </c:pt>
                 <c:pt idx="1">
-                  <c:v>332.84976666666648</c:v>
+                  <c:v>332.8497666666665</c:v>
                 </c:pt>
                 <c:pt idx="2">
-                  <c:v>32.316133333333298</c:v>
+                  <c:v>32.3161333333333</c:v>
                 </c:pt>
                 <c:pt idx="3">
-                  <c:v>702.75356666666698</c:v>
+                  <c:v>702.753566666667</c:v>
                 </c:pt>
                 <c:pt idx="4">
-                  <c:v>75.779899999999998</c:v>
+                  <c:v>75.7799</c:v>
                 </c:pt>
               </c:numCache>
             </c:numRef>
@@ -5763,11 +5597,11 @@
           <c:showPercent val="0"/>
           <c:showBubbleSize val="0"/>
         </c:dLbls>
-        <c:axId val="167860944"/>
-        <c:axId val="167861504"/>
+        <c:axId val="2125147320"/>
+        <c:axId val="2125150504"/>
       </c:radarChart>
       <c:catAx>
-        <c:axId val="167860944"/>
+        <c:axId val="2125147320"/>
         <c:scaling>
           <c:orientation val="minMax"/>
         </c:scaling>
@@ -5783,7 +5617,7 @@
             <a:noFill/>
           </a:ln>
         </c:spPr>
-        <c:crossAx val="167861504"/>
+        <c:crossAx val="2125150504"/>
         <c:crosses val="autoZero"/>
         <c:auto val="1"/>
         <c:lblAlgn val="ctr"/>
@@ -5791,7 +5625,7 @@
         <c:noMultiLvlLbl val="0"/>
       </c:catAx>
       <c:valAx>
-        <c:axId val="167861504"/>
+        <c:axId val="2125150504"/>
         <c:scaling>
           <c:orientation val="minMax"/>
         </c:scaling>
@@ -5802,7 +5636,7 @@
         <c:majorTickMark val="none"/>
         <c:minorTickMark val="none"/>
         <c:tickLblPos val="nextTo"/>
-        <c:crossAx val="167860944"/>
+        <c:crossAx val="2125147320"/>
         <c:crosses val="autoZero"/>
         <c:crossBetween val="between"/>
       </c:valAx>
@@ -5813,10 +5647,10 @@
         <c:manualLayout>
           <c:xMode val="edge"/>
           <c:yMode val="edge"/>
-          <c:x val="0.69635919334534602"/>
+          <c:x val="0.696359193345346"/>
           <c:y val="0.519204180201017"/>
-          <c:w val="0.22443067657295199"/>
-          <c:h val="0.23791006955664001"/>
+          <c:w val="0.224430676572952"/>
+          <c:h val="0.23791006955664"/>
         </c:manualLayout>
       </c:layout>
       <c:overlay val="0"/>
@@ -5874,8 +5708,8 @@
           <c:yMode val="edge"/>
           <c:x val="0.124351598594812"/>
           <c:y val="0.256551216842067"/>
-          <c:w val="0.49247196618183497"/>
-          <c:h val="0.66826948577588896"/>
+          <c:w val="0.492471966181835"/>
+          <c:h val="0.668269485775889"/>
         </c:manualLayout>
       </c:layout>
       <c:radarChart>
@@ -5922,13 +5756,13 @@
                   <c:v>128.172</c:v>
                 </c:pt>
                 <c:pt idx="1">
-                  <c:v>6919.2949333333336</c:v>
+                  <c:v>6919.294933333334</c:v>
                 </c:pt>
                 <c:pt idx="2">
-                  <c:v>129.73436666666669</c:v>
+                  <c:v>129.7343666666667</c:v>
                 </c:pt>
                 <c:pt idx="3">
-                  <c:v>1921.3449000000001</c:v>
+                  <c:v>1921.3449</c:v>
                 </c:pt>
                 <c:pt idx="4">
                   <c:v>2855.033333333336</c:v>
@@ -5965,7 +5799,7 @@
                   <c:v>11682.47279999999</c:v>
                 </c:pt>
                 <c:pt idx="4">
-                  <c:v>478.16996666666648</c:v>
+                  <c:v>478.1699666666665</c:v>
                 </c:pt>
               </c:numCache>
             </c:numRef>
@@ -5979,11 +5813,11 @@
           <c:showPercent val="0"/>
           <c:showBubbleSize val="0"/>
         </c:dLbls>
-        <c:axId val="167864304"/>
-        <c:axId val="167864864"/>
+        <c:axId val="2125178488"/>
+        <c:axId val="2125181688"/>
       </c:radarChart>
       <c:catAx>
-        <c:axId val="167864304"/>
+        <c:axId val="2125178488"/>
         <c:scaling>
           <c:orientation val="minMax"/>
         </c:scaling>
@@ -5999,7 +5833,7 @@
             <a:noFill/>
           </a:ln>
         </c:spPr>
-        <c:crossAx val="167864864"/>
+        <c:crossAx val="2125181688"/>
         <c:crosses val="autoZero"/>
         <c:auto val="1"/>
         <c:lblAlgn val="ctr"/>
@@ -6007,7 +5841,7 @@
         <c:noMultiLvlLbl val="0"/>
       </c:catAx>
       <c:valAx>
-        <c:axId val="167864864"/>
+        <c:axId val="2125181688"/>
         <c:scaling>
           <c:orientation val="minMax"/>
         </c:scaling>
@@ -6018,7 +5852,7 @@
         <c:majorTickMark val="none"/>
         <c:minorTickMark val="none"/>
         <c:tickLblPos val="nextTo"/>
-        <c:crossAx val="167864304"/>
+        <c:crossAx val="2125178488"/>
         <c:crosses val="autoZero"/>
         <c:crossBetween val="between"/>
       </c:valAx>
@@ -6029,10 +5863,10 @@
         <c:manualLayout>
           <c:xMode val="edge"/>
           <c:yMode val="edge"/>
-          <c:x val="0.67255505796667903"/>
-          <c:y val="0.47433255053644602"/>
-          <c:w val="0.20246336616829799"/>
-          <c:h val="0.18011581511952299"/>
+          <c:x val="0.672555057966679"/>
+          <c:y val="0.474332550536446"/>
+          <c:w val="0.202463366168298"/>
+          <c:h val="0.180115815119523"/>
         </c:manualLayout>
       </c:layout>
       <c:overlay val="0"/>
@@ -6099,16 +5933,16 @@
                 <c:formatCode>General</c:formatCode>
                 <c:ptCount val="4"/>
                 <c:pt idx="0">
-                  <c:v>1000</c:v>
+                  <c:v>1000.0</c:v>
                 </c:pt>
                 <c:pt idx="1">
-                  <c:v>10000</c:v>
+                  <c:v>10000.0</c:v>
                 </c:pt>
                 <c:pt idx="2">
-                  <c:v>100000</c:v>
+                  <c:v>100000.0</c:v>
                 </c:pt>
                 <c:pt idx="3">
-                  <c:v>1000000</c:v>
+                  <c:v>1.0E6</c:v>
                 </c:pt>
               </c:numCache>
             </c:numRef>
@@ -6123,7 +5957,7 @@
                   <c:v>2.437533333333334</c:v>
                 </c:pt>
                 <c:pt idx="1">
-                  <c:v>25.785066666666669</c:v>
+                  <c:v>25.78506666666667</c:v>
                 </c:pt>
                 <c:pt idx="2">
                   <c:v>245.6928333333334</c:v>
@@ -6149,16 +5983,16 @@
                 <c:formatCode>General</c:formatCode>
                 <c:ptCount val="4"/>
                 <c:pt idx="0">
-                  <c:v>1000</c:v>
+                  <c:v>1000.0</c:v>
                 </c:pt>
                 <c:pt idx="1">
-                  <c:v>10000</c:v>
+                  <c:v>10000.0</c:v>
                 </c:pt>
                 <c:pt idx="2">
-                  <c:v>100000</c:v>
+                  <c:v>100000.0</c:v>
                 </c:pt>
                 <c:pt idx="3">
-                  <c:v>1000000</c:v>
+                  <c:v>1.0E6</c:v>
                 </c:pt>
               </c:numCache>
             </c:numRef>
@@ -6170,16 +6004,16 @@
                 <c:formatCode>General</c:formatCode>
                 <c:ptCount val="4"/>
                 <c:pt idx="0">
-                  <c:v>3.9569333333333301</c:v>
+                  <c:v>3.95693333333333</c:v>
                 </c:pt>
                 <c:pt idx="1">
                   <c:v>10.9564</c:v>
                 </c:pt>
                 <c:pt idx="2">
-                  <c:v>75.779899999999998</c:v>
+                  <c:v>75.7799</c:v>
                 </c:pt>
                 <c:pt idx="3">
-                  <c:v>478.16996666666648</c:v>
+                  <c:v>478.1699666666665</c:v>
                 </c:pt>
               </c:numCache>
             </c:numRef>
@@ -6196,11 +6030,11 @@
         </c:dLbls>
         <c:marker val="1"/>
         <c:smooth val="0"/>
-        <c:axId val="167578208"/>
-        <c:axId val="167578768"/>
+        <c:axId val="2125387368"/>
+        <c:axId val="2125390344"/>
       </c:lineChart>
       <c:catAx>
-        <c:axId val="167578208"/>
+        <c:axId val="2125387368"/>
         <c:scaling>
           <c:orientation val="minMax"/>
         </c:scaling>
@@ -6210,7 +6044,7 @@
         <c:majorTickMark val="none"/>
         <c:minorTickMark val="none"/>
         <c:tickLblPos val="nextTo"/>
-        <c:crossAx val="167578768"/>
+        <c:crossAx val="2125390344"/>
         <c:crosses val="autoZero"/>
         <c:auto val="1"/>
         <c:lblAlgn val="ctr"/>
@@ -6218,7 +6052,7 @@
         <c:noMultiLvlLbl val="0"/>
       </c:catAx>
       <c:valAx>
-        <c:axId val="167578768"/>
+        <c:axId val="2125390344"/>
         <c:scaling>
           <c:orientation val="minMax"/>
         </c:scaling>
@@ -6248,7 +6082,7 @@
         <c:majorTickMark val="none"/>
         <c:minorTickMark val="none"/>
         <c:tickLblPos val="nextTo"/>
-        <c:crossAx val="167578208"/>
+        <c:crossAx val="2125387368"/>
         <c:crosses val="autoZero"/>
         <c:crossBetween val="between"/>
       </c:valAx>
@@ -9553,7 +9387,7 @@
           <a:p>
             <a:fld id="{A3BFE250-D821-4DA3-BEB3-32FB0787C8F3}" type="datetimeFigureOut">
               <a:rPr lang="en-US" smtClean="0"/>
-              <a:t>4/20/2015</a:t>
+              <a:t>4/20/15</a:t>
             </a:fld>
             <a:endParaRPr lang="en-US"/>
           </a:p>
@@ -13438,7 +13272,7 @@
           <a:p>
             <a:fld id="{67E91C90-18AE-45D1-A9AB-89459A33ACA2}" type="datetime1">
               <a:rPr lang="en-US" smtClean="0"/>
-              <a:t>4/20/2015</a:t>
+              <a:t>4/20/15</a:t>
             </a:fld>
             <a:endParaRPr lang="en-US"/>
           </a:p>
@@ -13608,7 +13442,7 @@
           <a:p>
             <a:fld id="{19B275A2-BBBD-4644-B69E-2525BDF44711}" type="datetime1">
               <a:rPr lang="en-US" smtClean="0"/>
-              <a:t>4/20/2015</a:t>
+              <a:t>4/20/15</a:t>
             </a:fld>
             <a:endParaRPr lang="en-US"/>
           </a:p>
@@ -13788,7 +13622,7 @@
           <a:p>
             <a:fld id="{7D403FD5-6B37-4524-8589-AC5C6406ED24}" type="datetime1">
               <a:rPr lang="en-US" smtClean="0"/>
-              <a:t>4/20/2015</a:t>
+              <a:t>4/20/15</a:t>
             </a:fld>
             <a:endParaRPr lang="en-US"/>
           </a:p>
@@ -13958,7 +13792,7 @@
           <a:p>
             <a:fld id="{A6309C2A-F073-416B-9704-FEF00B67AB58}" type="datetime1">
               <a:rPr lang="en-US" smtClean="0"/>
-              <a:t>4/20/2015</a:t>
+              <a:t>4/20/15</a:t>
             </a:fld>
             <a:endParaRPr lang="en-US"/>
           </a:p>
@@ -14202,7 +14036,7 @@
           <a:p>
             <a:fld id="{0DB4366B-823D-46F1-B4E2-77E643BCE048}" type="datetime1">
               <a:rPr lang="en-US" smtClean="0"/>
-              <a:t>4/20/2015</a:t>
+              <a:t>4/20/15</a:t>
             </a:fld>
             <a:endParaRPr lang="en-US"/>
           </a:p>
@@ -14434,7 +14268,7 @@
           <a:p>
             <a:fld id="{9E11D3E0-45FE-42C5-B6CA-4CFB0C1A93BB}" type="datetime1">
               <a:rPr lang="en-US" smtClean="0"/>
-              <a:t>4/20/2015</a:t>
+              <a:t>4/20/15</a:t>
             </a:fld>
             <a:endParaRPr lang="en-US"/>
           </a:p>
@@ -14801,7 +14635,7 @@
           <a:p>
             <a:fld id="{E100C0EC-2AF5-4EFC-B9E5-8F9F65222854}" type="datetime1">
               <a:rPr lang="en-US" smtClean="0"/>
-              <a:t>4/20/2015</a:t>
+              <a:t>4/20/15</a:t>
             </a:fld>
             <a:endParaRPr lang="en-US"/>
           </a:p>
@@ -14919,7 +14753,7 @@
           <a:p>
             <a:fld id="{5E03BEEA-7F33-4937-A47D-9059B374CDE2}" type="datetime1">
               <a:rPr lang="en-US" smtClean="0"/>
-              <a:t>4/20/2015</a:t>
+              <a:t>4/20/15</a:t>
             </a:fld>
             <a:endParaRPr lang="en-US"/>
           </a:p>
@@ -15014,7 +14848,7 @@
           <a:p>
             <a:fld id="{481886B9-3780-4C60-8A32-5E6CE0AFB25E}" type="datetime1">
               <a:rPr lang="en-US" smtClean="0"/>
-              <a:t>4/20/2015</a:t>
+              <a:t>4/20/15</a:t>
             </a:fld>
             <a:endParaRPr lang="en-US"/>
           </a:p>
@@ -15291,7 +15125,7 @@
           <a:p>
             <a:fld id="{EDD6E08E-BAA0-4DB7-810C-D540BE557D46}" type="datetime1">
               <a:rPr lang="en-US" smtClean="0"/>
-              <a:t>4/20/2015</a:t>
+              <a:t>4/20/15</a:t>
             </a:fld>
             <a:endParaRPr lang="en-US"/>
           </a:p>
@@ -15548,7 +15382,7 @@
           <a:p>
             <a:fld id="{B46E7A41-2D2E-41B1-8F9A-BA0D3E0DD5F1}" type="datetime1">
               <a:rPr lang="en-US" smtClean="0"/>
-              <a:t>4/20/2015</a:t>
+              <a:t>4/20/15</a:t>
             </a:fld>
             <a:endParaRPr lang="en-US"/>
           </a:p>
@@ -15761,7 +15595,7 @@
           <a:p>
             <a:fld id="{18C502F7-23D9-40E9-A6B2-EE015524757A}" type="datetime1">
               <a:rPr lang="en-US" smtClean="0"/>
-              <a:t>4/20/2015</a:t>
+              <a:t>4/20/15</a:t>
             </a:fld>
             <a:endParaRPr lang="en-US"/>
           </a:p>
@@ -16197,7 +16031,7 @@
           <a:noFill/>
           <a:extLst>
             <a:ext uri="{909E8E84-426E-40dd-AFC4-6F175D3DCCD1}">
-              <a14:hiddenFill xmlns:a14="http://schemas.microsoft.com/office/drawing/2010/main" xmlns="">
+              <a14:hiddenFill xmlns:a14="http://schemas.microsoft.com/office/drawing/2010/main">
                 <a:solidFill>
                   <a:srgbClr val="FFFFFF"/>
                 </a:solidFill>
@@ -16214,7 +16048,7 @@
         </p:nvSpPr>
         <p:spPr>
           <a:xfrm>
-            <a:off x="452094" y="4579000"/>
+            <a:off x="344001" y="620578"/>
             <a:ext cx="8239812" cy="1200329"/>
           </a:xfrm>
           <a:prstGeom prst="rect">
@@ -16311,27 +16145,7 @@
                 <a:latin typeface="Roboto Condensed" panose="02000000000000000000" pitchFamily="2" charset="0"/>
                 <a:ea typeface="Roboto Condensed" panose="02000000000000000000" pitchFamily="2" charset="0"/>
               </a:rPr>
-              <a:t>JUSTIN ALBANO   •   </a:t>
-            </a:r>
-            <a:r>
-              <a:rPr lang="en-US" dirty="0" smtClean="0">
-                <a:solidFill>
-                  <a:srgbClr val="5BC4FF"/>
-                </a:solidFill>
-                <a:latin typeface="Roboto Condensed" panose="02000000000000000000" pitchFamily="2" charset="0"/>
-                <a:ea typeface="Roboto Condensed" panose="02000000000000000000" pitchFamily="2" charset="0"/>
-              </a:rPr>
-              <a:t>STEPHEN </a:t>
-            </a:r>
-            <a:r>
-              <a:rPr lang="en-US" dirty="0" smtClean="0">
-                <a:solidFill>
-                  <a:srgbClr val="5BC4FF"/>
-                </a:solidFill>
-                <a:latin typeface="Roboto Condensed" panose="02000000000000000000" pitchFamily="2" charset="0"/>
-                <a:ea typeface="Roboto Condensed" panose="02000000000000000000" pitchFamily="2" charset="0"/>
-              </a:rPr>
-              <a:t>JONES</a:t>
+              <a:t>JUSTIN ALBANO   •   STEPHEN JONES</a:t>
             </a:r>
             <a:r>
               <a:rPr lang="en-US" dirty="0">
@@ -16351,17 +16165,7 @@
                 <a:latin typeface="Roboto Condensed" panose="02000000000000000000" pitchFamily="2" charset="0"/>
                 <a:ea typeface="Roboto Condensed" panose="02000000000000000000" pitchFamily="2" charset="0"/>
               </a:rPr>
-              <a:t>  •    </a:t>
-            </a:r>
-            <a:r>
-              <a:rPr lang="en-US" dirty="0" smtClean="0">
-                <a:solidFill>
-                  <a:srgbClr val="5BC4FF"/>
-                </a:solidFill>
-                <a:latin typeface="Roboto Condensed" panose="02000000000000000000" pitchFamily="2" charset="0"/>
-                <a:ea typeface="Roboto Condensed" panose="02000000000000000000" pitchFamily="2" charset="0"/>
-              </a:rPr>
-              <a:t>DOMINICK TOURNOUR</a:t>
+              <a:t>  •    DOMINICK TOURNOUR</a:t>
             </a:r>
             <a:endParaRPr lang="en-US" sz="4000" dirty="0">
               <a:solidFill>
@@ -16469,7 +16273,7 @@
   <p:timing>
     <p:tnLst>
       <p:par>
-        <p:cTn id="1" dur="indefinite" restart="never" nodeType="tmRoot"/>
+        <p:cTn xmlns:p14="http://schemas.microsoft.com/office/powerpoint/2010/main" id="1" dur="indefinite" restart="never" nodeType="tmRoot"/>
       </p:par>
     </p:tnLst>
   </p:timing>
@@ -17002,7 +16806,7 @@
   <p:timing>
     <p:tnLst>
       <p:par>
-        <p:cTn id="1" dur="indefinite" restart="never" nodeType="tmRoot"/>
+        <p:cTn xmlns:p14="http://schemas.microsoft.com/office/powerpoint/2010/main" id="1" dur="indefinite" restart="never" nodeType="tmRoot"/>
       </p:par>
     </p:tnLst>
   </p:timing>
@@ -17614,7 +17418,7 @@
   <p:timing>
     <p:tnLst>
       <p:par>
-        <p:cTn id="1" dur="indefinite" restart="never" nodeType="tmRoot"/>
+        <p:cTn xmlns:p14="http://schemas.microsoft.com/office/powerpoint/2010/main" id="1" dur="indefinite" restart="never" nodeType="tmRoot"/>
       </p:par>
     </p:tnLst>
   </p:timing>
@@ -18223,7 +18027,7 @@
         <p:spPr>
           <a:xfrm>
             <a:off x="3413164" y="4468422"/>
-            <a:ext cx="2895600" cy="461665"/>
+            <a:ext cx="3734492" cy="461665"/>
           </a:xfrm>
           <a:prstGeom prst="rect">
             <a:avLst/>
@@ -18264,7 +18068,7 @@
         </p:nvSpPr>
         <p:spPr>
           <a:xfrm>
-            <a:off x="3413164" y="4930087"/>
+            <a:off x="3413164" y="4943597"/>
             <a:ext cx="4267202" cy="748923"/>
           </a:xfrm>
           <a:prstGeom prst="rect">
@@ -18450,17 +18254,7 @@
                 <a:latin typeface="Roboto Condensed" pitchFamily="2" charset="0"/>
                 <a:ea typeface="Roboto Condensed" pitchFamily="2" charset="0"/>
               </a:rPr>
-              <a:t>Do not typically make ACID guarantees; instead focus on availability through </a:t>
-            </a:r>
-            <a:r>
-              <a:rPr lang="en-US" dirty="0" smtClean="0">
-                <a:solidFill>
-                  <a:srgbClr val="6F6F6F"/>
-                </a:solidFill>
-                <a:latin typeface="Roboto Condensed" pitchFamily="2" charset="0"/>
-                <a:ea typeface="Roboto Condensed" pitchFamily="2" charset="0"/>
-              </a:rPr>
-              <a:t>BASE</a:t>
+              <a:t>Do not typically make ACID guarantees; instead focus on availability through BASE</a:t>
             </a:r>
             <a:endParaRPr lang="en-US" dirty="0">
               <a:solidFill>
@@ -18630,13 +18424,13 @@
   <p:clrMapOvr>
     <a:masterClrMapping/>
   </p:clrMapOvr>
-  <mc:AlternateContent xmlns:mc="http://schemas.openxmlformats.org/markup-compatibility/2006">
-    <mc:Choice xmlns:p14="http://schemas.microsoft.com/office/powerpoint/2010/main" Requires="p14">
+  <mc:AlternateContent xmlns:mc="http://schemas.openxmlformats.org/markup-compatibility/2006" xmlns:p14="http://schemas.microsoft.com/office/powerpoint/2010/main">
+    <mc:Choice Requires="p14">
       <p:transition spd="med" p14:dur="700">
         <p:fade/>
       </p:transition>
     </mc:Choice>
-    <mc:Fallback>
+    <mc:Fallback xmlns="">
       <p:transition spd="med">
         <p:fade/>
       </p:transition>
@@ -18645,7 +18439,7 @@
   <p:timing>
     <p:tnLst>
       <p:par>
-        <p:cTn id="1" dur="indefinite" restart="never" nodeType="tmRoot"/>
+        <p:cTn xmlns:p14="http://schemas.microsoft.com/office/powerpoint/2010/main" id="1" dur="indefinite" restart="never" nodeType="tmRoot"/>
       </p:par>
     </p:tnLst>
   </p:timing>
@@ -19416,13 +19210,13 @@
   <p:clrMapOvr>
     <a:masterClrMapping/>
   </p:clrMapOvr>
-  <mc:AlternateContent xmlns:mc="http://schemas.openxmlformats.org/markup-compatibility/2006">
-    <mc:Choice xmlns:p14="http://schemas.microsoft.com/office/powerpoint/2010/main" Requires="p14">
+  <mc:AlternateContent xmlns:mc="http://schemas.openxmlformats.org/markup-compatibility/2006" xmlns:p14="http://schemas.microsoft.com/office/powerpoint/2010/main">
+    <mc:Choice Requires="p14">
       <p:transition spd="med" p14:dur="700">
         <p:fade/>
       </p:transition>
     </mc:Choice>
-    <mc:Fallback>
+    <mc:Fallback xmlns="">
       <p:transition spd="med">
         <p:fade/>
       </p:transition>
@@ -19431,7 +19225,7 @@
   <p:timing>
     <p:tnLst>
       <p:par>
-        <p:cTn id="1" dur="indefinite" restart="never" nodeType="tmRoot"/>
+        <p:cTn xmlns:p14="http://schemas.microsoft.com/office/powerpoint/2010/main" id="1" dur="indefinite" restart="never" nodeType="tmRoot"/>
       </p:par>
     </p:tnLst>
   </p:timing>
@@ -19744,17 +19538,7 @@
                 <a:latin typeface="Roboto Condensed" pitchFamily="2" charset="0"/>
                 <a:ea typeface="Roboto Condensed" pitchFamily="2" charset="0"/>
               </a:rPr>
-              <a:t>Selected </a:t>
-            </a:r>
-            <a:r>
-              <a:rPr lang="en-US" sz="2400" dirty="0" smtClean="0">
-                <a:solidFill>
-                  <a:srgbClr val="3A3A3A"/>
-                </a:solidFill>
-                <a:latin typeface="Roboto Condensed" pitchFamily="2" charset="0"/>
-                <a:ea typeface="Roboto Condensed" pitchFamily="2" charset="0"/>
-              </a:rPr>
-              <a:t>Workloads</a:t>
+              <a:t>Selected Workloads</a:t>
             </a:r>
             <a:endParaRPr lang="en-US" sz="2400" dirty="0">
               <a:solidFill>
@@ -20366,16 +20150,6 @@
               </a:rPr>
               <a:t>Core YCSB Workloads A, B and F</a:t>
             </a:r>
-            <a:endParaRPr lang="en-US" dirty="0" smtClean="0">
-              <a:solidFill>
-                <a:schemeClr val="tx1">
-                  <a:lumMod val="50000"/>
-                  <a:lumOff val="50000"/>
-                </a:schemeClr>
-              </a:solidFill>
-              <a:latin typeface="Roboto Condensed" pitchFamily="2" charset="0"/>
-              <a:ea typeface="Roboto Condensed" pitchFamily="2" charset="0"/>
-            </a:endParaRPr>
           </a:p>
         </p:txBody>
       </p:sp>
@@ -20389,13 +20163,13 @@
   <p:clrMapOvr>
     <a:masterClrMapping/>
   </p:clrMapOvr>
-  <mc:AlternateContent xmlns:mc="http://schemas.openxmlformats.org/markup-compatibility/2006">
-    <mc:Choice xmlns:p14="http://schemas.microsoft.com/office/powerpoint/2010/main" Requires="p14">
+  <mc:AlternateContent xmlns:mc="http://schemas.openxmlformats.org/markup-compatibility/2006" xmlns:p14="http://schemas.microsoft.com/office/powerpoint/2010/main">
+    <mc:Choice Requires="p14">
       <p:transition spd="med" p14:dur="700">
         <p:fade/>
       </p:transition>
     </mc:Choice>
-    <mc:Fallback>
+    <mc:Fallback xmlns="">
       <p:transition spd="med">
         <p:fade/>
       </p:transition>
@@ -20404,7 +20178,7 @@
   <p:timing>
     <p:tnLst>
       <p:par>
-        <p:cTn id="1" dur="indefinite" restart="never" nodeType="tmRoot"/>
+        <p:cTn xmlns:p14="http://schemas.microsoft.com/office/powerpoint/2010/main" id="1" dur="indefinite" restart="never" nodeType="tmRoot"/>
       </p:par>
     </p:tnLst>
   </p:timing>
@@ -21858,13 +21632,13 @@
   <p:clrMapOvr>
     <a:masterClrMapping/>
   </p:clrMapOvr>
-  <mc:AlternateContent xmlns:mc="http://schemas.openxmlformats.org/markup-compatibility/2006">
-    <mc:Choice xmlns:p14="http://schemas.microsoft.com/office/powerpoint/2010/main" Requires="p14">
+  <mc:AlternateContent xmlns:mc="http://schemas.openxmlformats.org/markup-compatibility/2006" xmlns:p14="http://schemas.microsoft.com/office/powerpoint/2010/main">
+    <mc:Choice Requires="p14">
       <p:transition spd="med" p14:dur="700">
         <p:fade/>
       </p:transition>
     </mc:Choice>
-    <mc:Fallback>
+    <mc:Fallback xmlns="">
       <p:transition spd="med">
         <p:fade/>
       </p:transition>
@@ -21873,7 +21647,7 @@
   <p:timing>
     <p:tnLst>
       <p:par>
-        <p:cTn id="1" dur="indefinite" restart="never" nodeType="tmRoot"/>
+        <p:cTn xmlns:p14="http://schemas.microsoft.com/office/powerpoint/2010/main" id="1" dur="indefinite" restart="never" nodeType="tmRoot"/>
       </p:par>
     </p:tnLst>
   </p:timing>
@@ -22164,8 +21938,8 @@
         </p:nvSpPr>
         <p:spPr>
           <a:xfrm>
-            <a:off x="457199" y="1684116"/>
-            <a:ext cx="3739416" cy="461665"/>
+            <a:off x="457198" y="1684116"/>
+            <a:ext cx="4434013" cy="461665"/>
           </a:xfrm>
           <a:prstGeom prst="rect">
             <a:avLst/>
@@ -22472,13 +22246,13 @@
   <p:clrMapOvr>
     <a:masterClrMapping/>
   </p:clrMapOvr>
-  <mc:AlternateContent xmlns:mc="http://schemas.openxmlformats.org/markup-compatibility/2006">
-    <mc:Choice xmlns:p14="http://schemas.microsoft.com/office/powerpoint/2010/main" Requires="p14">
+  <mc:AlternateContent xmlns:mc="http://schemas.openxmlformats.org/markup-compatibility/2006" xmlns:p14="http://schemas.microsoft.com/office/powerpoint/2010/main">
+    <mc:Choice Requires="p14">
       <p:transition spd="med" p14:dur="700">
         <p:fade/>
       </p:transition>
     </mc:Choice>
-    <mc:Fallback>
+    <mc:Fallback xmlns="">
       <p:transition spd="med">
         <p:fade/>
       </p:transition>
@@ -22487,7 +22261,7 @@
   <p:timing>
     <p:tnLst>
       <p:par>
-        <p:cTn id="1" dur="indefinite" restart="never" nodeType="tmRoot"/>
+        <p:cTn xmlns:p14="http://schemas.microsoft.com/office/powerpoint/2010/main" id="1" dur="indefinite" restart="never" nodeType="tmRoot"/>
       </p:par>
     </p:tnLst>
   </p:timing>
@@ -22867,16 +22641,6 @@
               </a:rPr>
               <a:t> completed all workloads in approx. 50% of the time MongoDB required</a:t>
             </a:r>
-            <a:endParaRPr lang="en-US" dirty="0" smtClean="0">
-              <a:solidFill>
-                <a:schemeClr val="tx1">
-                  <a:lumMod val="50000"/>
-                  <a:lumOff val="50000"/>
-                </a:schemeClr>
-              </a:solidFill>
-              <a:latin typeface="Roboto Condensed" pitchFamily="2" charset="0"/>
-              <a:ea typeface="Roboto Condensed" pitchFamily="2" charset="0"/>
-            </a:endParaRPr>
           </a:p>
           <a:p>
             <a:pPr marL="342900" indent="-342900">
@@ -22899,16 +22663,6 @@
               </a:rPr>
               <a:t>MongoDB could not load the largest data set size</a:t>
             </a:r>
-            <a:endParaRPr lang="en-US" dirty="0" smtClean="0">
-              <a:solidFill>
-                <a:schemeClr val="tx1">
-                  <a:lumMod val="50000"/>
-                  <a:lumOff val="50000"/>
-                </a:schemeClr>
-              </a:solidFill>
-              <a:latin typeface="Roboto Condensed" pitchFamily="2" charset="0"/>
-              <a:ea typeface="Roboto Condensed" pitchFamily="2" charset="0"/>
-            </a:endParaRPr>
           </a:p>
         </p:txBody>
       </p:sp>
@@ -23065,13 +22819,13 @@
   <p:clrMapOvr>
     <a:masterClrMapping/>
   </p:clrMapOvr>
-  <mc:AlternateContent xmlns:mc="http://schemas.openxmlformats.org/markup-compatibility/2006">
-    <mc:Choice xmlns:p14="http://schemas.microsoft.com/office/powerpoint/2010/main" Requires="p14">
+  <mc:AlternateContent xmlns:mc="http://schemas.openxmlformats.org/markup-compatibility/2006" xmlns:p14="http://schemas.microsoft.com/office/powerpoint/2010/main">
+    <mc:Choice Requires="p14">
       <p:transition spd="med" p14:dur="700">
         <p:fade/>
       </p:transition>
     </mc:Choice>
-    <mc:Fallback>
+    <mc:Fallback xmlns="">
       <p:transition spd="med">
         <p:fade/>
       </p:transition>
@@ -23080,7 +22834,7 @@
   <p:timing>
     <p:tnLst>
       <p:par>
-        <p:cTn id="1" dur="indefinite" restart="never" nodeType="tmRoot"/>
+        <p:cTn xmlns:p14="http://schemas.microsoft.com/office/powerpoint/2010/main" id="1" dur="indefinite" restart="never" nodeType="tmRoot"/>
       </p:par>
     </p:tnLst>
   </p:timing>
@@ -23469,16 +23223,6 @@
               </a:rPr>
               <a:t>Difference of means method for comparing alternatives was conducted:</a:t>
             </a:r>
-            <a:endParaRPr lang="en-US" dirty="0" smtClean="0">
-              <a:solidFill>
-                <a:schemeClr val="tx1">
-                  <a:lumMod val="50000"/>
-                  <a:lumOff val="50000"/>
-                </a:schemeClr>
-              </a:solidFill>
-              <a:latin typeface="Roboto Condensed" pitchFamily="2" charset="0"/>
-              <a:ea typeface="Roboto Condensed" pitchFamily="2" charset="0"/>
-            </a:endParaRPr>
           </a:p>
           <a:p>
             <a:pPr marL="800100" lvl="1" indent="-342900">
@@ -23554,31 +23298,8 @@
                 <a:latin typeface="Roboto Condensed" pitchFamily="2" charset="0"/>
                 <a:ea typeface="Roboto Condensed" pitchFamily="2" charset="0"/>
               </a:rPr>
-              <a:t>All resulting confidence intervals did not contain the value </a:t>
-            </a:r>
-            <a:r>
-              <a:rPr lang="en-US" dirty="0" smtClean="0">
-                <a:solidFill>
-                  <a:schemeClr val="tx1">
-                    <a:lumMod val="50000"/>
-                    <a:lumOff val="50000"/>
-                  </a:schemeClr>
-                </a:solidFill>
-                <a:latin typeface="Roboto Condensed" pitchFamily="2" charset="0"/>
-                <a:ea typeface="Roboto Condensed" pitchFamily="2" charset="0"/>
-              </a:rPr>
-              <a:t>0, thus no evidence to suggest that the difference is not statistically significant</a:t>
-            </a:r>
-            <a:endParaRPr lang="en-US" dirty="0" smtClean="0">
-              <a:solidFill>
-                <a:schemeClr val="tx1">
-                  <a:lumMod val="50000"/>
-                  <a:lumOff val="50000"/>
-                </a:schemeClr>
-              </a:solidFill>
-              <a:latin typeface="Roboto Condensed" pitchFamily="2" charset="0"/>
-              <a:ea typeface="Roboto Condensed" pitchFamily="2" charset="0"/>
-            </a:endParaRPr>
+              <a:t>All resulting confidence intervals did not contain the value 0, thus no evidence to suggest that the difference is not statistically significant</a:t>
+            </a:r>
           </a:p>
         </p:txBody>
       </p:sp>
@@ -23703,8 +23424,8 @@
           </a:p>
         </p:txBody>
       </p:sp>
-      <mc:AlternateContent xmlns:mc="http://schemas.openxmlformats.org/markup-compatibility/2006">
-        <mc:Choice xmlns:a14="http://schemas.microsoft.com/office/drawing/2010/main" Requires="a14">
+      <mc:AlternateContent xmlns:mc="http://schemas.openxmlformats.org/markup-compatibility/2006" xmlns:a14="http://schemas.microsoft.com/office/drawing/2010/main">
+        <mc:Choice Requires="a14">
           <p:sp>
             <p:nvSpPr>
               <p:cNvPr id="3" name="Rectangle 2"/>
@@ -23726,9 +23447,8 @@
               </a:bodyPr>
               <a:lstStyle/>
               <a:p>
-                <a:pPr/>
                 <a14:m>
-                  <m:oMathPara xmlns:m="http://schemas.openxmlformats.org/officeDocument/2006/math">
+                  <m:oMathPara xmlns:m="http://schemas.openxmlformats.org/officeDocument/2006/math" xmlns="">
                     <m:oMathParaPr>
                       <m:jc m:val="centerGroup"/>
                     </m:oMathParaPr>
@@ -23869,7 +23589,7 @@
             </p:txBody>
           </p:sp>
         </mc:Choice>
-        <mc:Fallback>
+        <mc:Fallback xmlns="">
           <p:sp>
             <p:nvSpPr>
               <p:cNvPr id="3" name="Rectangle 2"/>
@@ -23938,17 +23658,7 @@
                 <a:latin typeface="Roboto Condensed" pitchFamily="2" charset="0"/>
                 <a:ea typeface="Roboto Condensed" pitchFamily="2" charset="0"/>
               </a:rPr>
-              <a:t>Effect </a:t>
-            </a:r>
-            <a:r>
-              <a:rPr lang="en-US" sz="2400" dirty="0" smtClean="0">
-                <a:solidFill>
-                  <a:srgbClr val="3A3A3A"/>
-                </a:solidFill>
-                <a:latin typeface="Roboto Condensed" pitchFamily="2" charset="0"/>
-                <a:ea typeface="Roboto Condensed" pitchFamily="2" charset="0"/>
-              </a:rPr>
-              <a:t>of </a:t>
+              <a:t>Effect of </a:t>
             </a:r>
             <a:r>
               <a:rPr lang="en-US" sz="2400" dirty="0" err="1" smtClean="0">
@@ -24048,16 +23758,6 @@
               </a:rPr>
               <a:t> regularly backed up data to HDD, which affected execution time </a:t>
             </a:r>
-            <a:endParaRPr lang="en-US" dirty="0" smtClean="0">
-              <a:solidFill>
-                <a:schemeClr val="tx1">
-                  <a:lumMod val="50000"/>
-                  <a:lumOff val="50000"/>
-                </a:schemeClr>
-              </a:solidFill>
-              <a:latin typeface="Roboto Condensed" pitchFamily="2" charset="0"/>
-              <a:ea typeface="Roboto Condensed" pitchFamily="2" charset="0"/>
-            </a:endParaRPr>
           </a:p>
           <a:p>
             <a:pPr marL="342900" indent="-342900">
@@ -24093,176 +23793,20 @@
             </p:nvSpPr>
             <p:spPr>
               <a:xfrm>
-                <a:off x="1651239" y="3042018"/>
-                <a:ext cx="1771639" cy="910699"/>
+                <a:off x="1043216" y="3339238"/>
+                <a:ext cx="3658834" cy="369332"/>
               </a:xfrm>
               <a:prstGeom prst="rect">
                 <a:avLst/>
               </a:prstGeom>
             </p:spPr>
             <p:txBody>
-              <a:bodyPr wrap="none">
+              <a:bodyPr wrap="square">
                 <a:spAutoFit/>
               </a:bodyPr>
               <a:lstStyle/>
               <a:p>
-                <a14:m>
-                  <m:oMathPara xmlns:m="http://schemas.openxmlformats.org/officeDocument/2006/math">
-                    <m:oMathParaPr>
-                      <m:jc m:val="centerGroup"/>
-                    </m:oMathParaPr>
-                    <m:oMath xmlns:m="http://schemas.openxmlformats.org/officeDocument/2006/math">
-                      <m:sSub>
-                        <m:sSubPr>
-                          <m:ctrlPr>
-                            <a:rPr lang="en-US" i="1"/>
-                          </m:ctrlPr>
-                        </m:sSubPr>
-                        <m:e>
-                          <m:r>
-                            <a:rPr lang="en-US" i="1"/>
-                            <m:t>𝑠</m:t>
-                          </m:r>
-                        </m:e>
-                        <m:sub>
-                          <m:r>
-                            <a:rPr lang="en-US" i="1"/>
-                            <m:t>𝑥</m:t>
-                          </m:r>
-                        </m:sub>
-                      </m:sSub>
-                      <m:r>
-                        <a:rPr lang="en-US" i="1"/>
-                        <m:t>= </m:t>
-                      </m:r>
-                      <m:rad>
-                        <m:radPr>
-                          <m:degHide m:val="on"/>
-                          <m:ctrlPr>
-                            <a:rPr lang="en-US" i="1"/>
-                          </m:ctrlPr>
-                        </m:radPr>
-                        <m:deg/>
-                        <m:e>
-                          <m:f>
-                            <m:fPr>
-                              <m:ctrlPr>
-                                <a:rPr lang="en-US" i="1"/>
-                              </m:ctrlPr>
-                            </m:fPr>
-                            <m:num>
-                              <m:sSubSup>
-                                <m:sSubSupPr>
-                                  <m:ctrlPr>
-                                    <a:rPr lang="en-US" i="1"/>
-                                  </m:ctrlPr>
-                                </m:sSubSupPr>
-                                <m:e>
-                                  <m:r>
-                                    <a:rPr lang="en-US" i="1"/>
-                                    <m:t>𝑠</m:t>
-                                  </m:r>
-                                </m:e>
-                                <m:sub>
-                                  <m:r>
-                                    <a:rPr lang="en-US" i="1"/>
-                                    <m:t>1</m:t>
-                                  </m:r>
-                                </m:sub>
-                                <m:sup>
-                                  <m:r>
-                                    <a:rPr lang="en-US" i="1"/>
-                                    <m:t>2</m:t>
-                                  </m:r>
-                                </m:sup>
-                              </m:sSubSup>
-                            </m:num>
-                            <m:den>
-                              <m:sSub>
-                                <m:sSubPr>
-                                  <m:ctrlPr>
-                                    <a:rPr lang="en-US" i="1"/>
-                                  </m:ctrlPr>
-                                </m:sSubPr>
-                                <m:e>
-                                  <m:r>
-                                    <a:rPr lang="en-US" i="1"/>
-                                    <m:t>𝑛</m:t>
-                                  </m:r>
-                                </m:e>
-                                <m:sub>
-                                  <m:r>
-                                    <a:rPr lang="en-US" i="1"/>
-                                    <m:t>1</m:t>
-                                  </m:r>
-                                </m:sub>
-                              </m:sSub>
-                            </m:den>
-                          </m:f>
-                          <m:r>
-                            <a:rPr lang="en-US" i="1"/>
-                            <m:t>+ </m:t>
-                          </m:r>
-                          <m:f>
-                            <m:fPr>
-                              <m:ctrlPr>
-                                <a:rPr lang="en-US" i="1"/>
-                              </m:ctrlPr>
-                            </m:fPr>
-                            <m:num>
-                              <m:sSubSup>
-                                <m:sSubSupPr>
-                                  <m:ctrlPr>
-                                    <a:rPr lang="en-US" i="1"/>
-                                  </m:ctrlPr>
-                                </m:sSubSupPr>
-                                <m:e>
-                                  <m:r>
-                                    <a:rPr lang="en-US" i="1"/>
-                                    <m:t>𝑠</m:t>
-                                  </m:r>
-                                </m:e>
-                                <m:sub>
-                                  <m:r>
-                                    <a:rPr lang="en-US" i="1"/>
-                                    <m:t>2</m:t>
-                                  </m:r>
-                                </m:sub>
-                                <m:sup>
-                                  <m:r>
-                                    <a:rPr lang="en-US" i="1"/>
-                                    <m:t>2</m:t>
-                                  </m:r>
-                                </m:sup>
-                              </m:sSubSup>
-                            </m:num>
-                            <m:den>
-                              <m:sSub>
-                                <m:sSubPr>
-                                  <m:ctrlPr>
-                                    <a:rPr lang="en-US" i="1"/>
-                                  </m:ctrlPr>
-                                </m:sSubPr>
-                                <m:e>
-                                  <m:r>
-                                    <a:rPr lang="en-US" i="1"/>
-                                    <m:t>𝑛</m:t>
-                                  </m:r>
-                                </m:e>
-                                <m:sub>
-                                  <m:r>
-                                    <a:rPr lang="en-US" i="1"/>
-                                    <m:t>2</m:t>
-                                  </m:r>
-                                </m:sub>
-                              </m:sSub>
-                            </m:den>
-                          </m:f>
-                        </m:e>
-                      </m:rad>
-                    </m:oMath>
-                  </m:oMathPara>
-                </a14:m>
+                <a14:m/>
                 <a:endParaRPr lang="en-US" dirty="0"/>
               </a:p>
             </p:txBody>
@@ -24279,13 +23823,13 @@
             </p:nvSpPr>
             <p:spPr>
               <a:xfrm>
-                <a:off x="1651239" y="3042018"/>
-                <a:ext cx="1771639" cy="910699"/>
+                <a:off x="1043216" y="3339238"/>
+                <a:ext cx="3658834" cy="369332"/>
               </a:xfrm>
               <a:prstGeom prst="rect">
                 <a:avLst/>
               </a:prstGeom>
-              <a:blipFill rotWithShape="0">
+              <a:blipFill rotWithShape="1">
                 <a:blip r:embed="rId4"/>
                 <a:stretch>
                   <a:fillRect/>
@@ -24317,13 +23861,13 @@
   <p:clrMapOvr>
     <a:masterClrMapping/>
   </p:clrMapOvr>
-  <mc:AlternateContent xmlns:mc="http://schemas.openxmlformats.org/markup-compatibility/2006">
-    <mc:Choice xmlns:p14="http://schemas.microsoft.com/office/powerpoint/2010/main" Requires="p14">
+  <mc:AlternateContent xmlns:mc="http://schemas.openxmlformats.org/markup-compatibility/2006" xmlns:p14="http://schemas.microsoft.com/office/powerpoint/2010/main">
+    <mc:Choice Requires="p14">
       <p:transition spd="med" p14:dur="700">
         <p:fade/>
       </p:transition>
     </mc:Choice>
-    <mc:Fallback>
+    <mc:Fallback xmlns="">
       <p:transition spd="med">
         <p:fade/>
       </p:transition>
@@ -24332,7 +23876,7 @@
   <p:timing>
     <p:tnLst>
       <p:par>
-        <p:cTn id="1" dur="indefinite" restart="never" nodeType="tmRoot"/>
+        <p:cTn xmlns:p14="http://schemas.microsoft.com/office/powerpoint/2010/main" id="1" dur="indefinite" restart="never" nodeType="tmRoot"/>
       </p:par>
     </p:tnLst>
   </p:timing>
@@ -24645,17 +24189,7 @@
                 <a:latin typeface="Roboto Condensed" pitchFamily="2" charset="0"/>
                 <a:ea typeface="Roboto Condensed" pitchFamily="2" charset="0"/>
               </a:rPr>
-              <a:t>Effect </a:t>
-            </a:r>
-            <a:r>
-              <a:rPr lang="en-US" sz="2400" dirty="0" smtClean="0">
-                <a:solidFill>
-                  <a:srgbClr val="3A3A3A"/>
-                </a:solidFill>
-                <a:latin typeface="Roboto Condensed" pitchFamily="2" charset="0"/>
-                <a:ea typeface="Roboto Condensed" pitchFamily="2" charset="0"/>
-              </a:rPr>
-              <a:t>of </a:t>
+              <a:t>Effect of </a:t>
             </a:r>
             <a:r>
               <a:rPr lang="en-US" sz="2400" dirty="0" err="1" smtClean="0">
@@ -24840,13 +24374,13 @@
   <p:clrMapOvr>
     <a:masterClrMapping/>
   </p:clrMapOvr>
-  <mc:AlternateContent xmlns:mc="http://schemas.openxmlformats.org/markup-compatibility/2006">
-    <mc:Choice xmlns:p14="http://schemas.microsoft.com/office/powerpoint/2010/main" Requires="p14">
+  <mc:AlternateContent xmlns:mc="http://schemas.openxmlformats.org/markup-compatibility/2006" xmlns:p14="http://schemas.microsoft.com/office/powerpoint/2010/main">
+    <mc:Choice Requires="p14">
       <p:transition spd="med" p14:dur="700">
         <p:fade/>
       </p:transition>
     </mc:Choice>
-    <mc:Fallback>
+    <mc:Fallback xmlns="">
       <p:transition spd="med">
         <p:fade/>
       </p:transition>
@@ -24855,7 +24389,7 @@
   <p:timing>
     <p:tnLst>
       <p:par>
-        <p:cTn id="1" dur="indefinite" restart="never" nodeType="tmRoot"/>
+        <p:cTn xmlns:p14="http://schemas.microsoft.com/office/powerpoint/2010/main" id="1" dur="indefinite" restart="never" nodeType="tmRoot"/>
       </p:par>
     </p:tnLst>
   </p:timing>
@@ -25023,20 +24557,7 @@
                 <a:latin typeface="Roboto Condensed" pitchFamily="2" charset="0"/>
                 <a:ea typeface="Roboto Condensed" pitchFamily="2" charset="0"/>
               </a:rPr>
-              <a:t>Stephen </a:t>
-            </a:r>
-            <a:r>
-              <a:rPr lang="en-US" sz="1600" dirty="0" smtClean="0">
-                <a:solidFill>
-                  <a:schemeClr val="tx1">
-                    <a:lumMod val="50000"/>
-                    <a:lumOff val="50000"/>
-                  </a:schemeClr>
-                </a:solidFill>
-                <a:latin typeface="Roboto Condensed" pitchFamily="2" charset="0"/>
-                <a:ea typeface="Roboto Condensed" pitchFamily="2" charset="0"/>
-              </a:rPr>
-              <a:t>Jones</a:t>
+              <a:t>Stephen Jones</a:t>
             </a:r>
           </a:p>
           <a:p>
@@ -25810,7 +25331,7 @@
   <p:timing>
     <p:tnLst>
       <p:par>
-        <p:cTn id="1" dur="indefinite" restart="never" nodeType="tmRoot"/>
+        <p:cTn xmlns:p14="http://schemas.microsoft.com/office/powerpoint/2010/main" id="1" dur="indefinite" restart="never" nodeType="tmRoot"/>
       </p:par>
     </p:tnLst>
   </p:timing>
@@ -26466,13 +25987,13 @@
   <p:clrMapOvr>
     <a:masterClrMapping/>
   </p:clrMapOvr>
-  <mc:AlternateContent xmlns:mc="http://schemas.openxmlformats.org/markup-compatibility/2006">
-    <mc:Choice xmlns:p14="http://schemas.microsoft.com/office/powerpoint/2010/main" Requires="p14">
+  <mc:AlternateContent xmlns:mc="http://schemas.openxmlformats.org/markup-compatibility/2006" xmlns:p14="http://schemas.microsoft.com/office/powerpoint/2010/main">
+    <mc:Choice Requires="p14">
       <p:transition spd="med" p14:dur="700">
         <p:fade/>
       </p:transition>
     </mc:Choice>
-    <mc:Fallback>
+    <mc:Fallback xmlns="">
       <p:transition spd="med">
         <p:fade/>
       </p:transition>
@@ -26481,7 +26002,7 @@
   <p:timing>
     <p:tnLst>
       <p:par>
-        <p:cTn id="1" dur="indefinite" restart="never" nodeType="tmRoot"/>
+        <p:cTn xmlns:p14="http://schemas.microsoft.com/office/powerpoint/2010/main" id="1" dur="indefinite" restart="never" nodeType="tmRoot"/>
       </p:par>
     </p:tnLst>
   </p:timing>
@@ -27223,7 +26744,7 @@
   <p:timing>
     <p:tnLst>
       <p:par>
-        <p:cTn id="1" dur="indefinite" restart="never" nodeType="tmRoot"/>
+        <p:cTn xmlns:p14="http://schemas.microsoft.com/office/powerpoint/2010/main" id="1" dur="indefinite" restart="never" nodeType="tmRoot"/>
       </p:par>
     </p:tnLst>
   </p:timing>
@@ -27649,12 +27170,12 @@
           <a:graphicData uri="http://schemas.openxmlformats.org/presentationml/2006/ole">
             <mc:AlternateContent xmlns:mc="http://schemas.openxmlformats.org/markup-compatibility/2006">
               <mc:Choice xmlns:v="urn:schemas-microsoft-com:vml" Requires="v">
-                <p:oleObj spid="_x0000_s1050" name="Document" r:id="rId4" imgW="6096000" imgH="2590800" progId="Word.Document.12">
+                <p:oleObj spid="_x0000_s1052" name="Document" r:id="rId5" imgW="6096000" imgH="2590800" progId="Word.Document.12">
                   <p:embed/>
                 </p:oleObj>
               </mc:Choice>
               <mc:Fallback>
-                <p:oleObj name="Document" r:id="rId4" imgW="6096000" imgH="2590800" progId="Word.Document.12">
+                <p:oleObj name="Document" r:id="rId5" imgW="6096000" imgH="2590800" progId="Word.Document.12">
                   <p:embed/>
                   <p:pic>
                     <p:nvPicPr>
@@ -27663,7 +27184,7 @@
                       <p:nvPr/>
                     </p:nvPicPr>
                     <p:blipFill>
-                      <a:blip r:embed="rId5"/>
+                      <a:blip r:embed="rId6"/>
                       <a:stretch>
                         <a:fillRect/>
                       </a:stretch>
@@ -27709,7 +27230,7 @@
   <p:timing>
     <p:tnLst>
       <p:par>
-        <p:cTn id="1" dur="indefinite" restart="never" nodeType="tmRoot"/>
+        <p:cTn xmlns:p14="http://schemas.microsoft.com/office/powerpoint/2010/main" id="1" dur="indefinite" restart="never" nodeType="tmRoot"/>
       </p:par>
     </p:tnLst>
   </p:timing>
@@ -28243,12 +27764,12 @@
           <a:graphicData uri="http://schemas.openxmlformats.org/presentationml/2006/ole">
             <mc:AlternateContent xmlns:mc="http://schemas.openxmlformats.org/markup-compatibility/2006">
               <mc:Choice xmlns:v="urn:schemas-microsoft-com:vml" Requires="v">
-                <p:oleObj spid="_x0000_s2071" name="Document" r:id="rId4" imgW="6096000" imgH="1333500" progId="Word.Document.12">
+                <p:oleObj spid="_x0000_s2073" name="Document" r:id="rId5" imgW="6096000" imgH="1333500" progId="Word.Document.12">
                   <p:embed/>
                 </p:oleObj>
               </mc:Choice>
               <mc:Fallback>
-                <p:oleObj name="Document" r:id="rId4" imgW="6096000" imgH="1333500" progId="Word.Document.12">
+                <p:oleObj name="Document" r:id="rId5" imgW="6096000" imgH="1333500" progId="Word.Document.12">
                   <p:embed/>
                   <p:pic>
                     <p:nvPicPr>
@@ -28257,7 +27778,7 @@
                       <p:nvPr/>
                     </p:nvPicPr>
                     <p:blipFill>
-                      <a:blip r:embed="rId5"/>
+                      <a:blip r:embed="rId6"/>
                       <a:stretch>
                         <a:fillRect/>
                       </a:stretch>
@@ -28303,7 +27824,7 @@
   <p:timing>
     <p:tnLst>
       <p:par>
-        <p:cTn id="1" dur="indefinite" restart="never" nodeType="tmRoot"/>
+        <p:cTn xmlns:p14="http://schemas.microsoft.com/office/powerpoint/2010/main" id="1" dur="indefinite" restart="never" nodeType="tmRoot"/>
       </p:par>
     </p:tnLst>
   </p:timing>
@@ -28930,7 +28451,7 @@
   <p:timing>
     <p:tnLst>
       <p:par>
-        <p:cTn id="1" dur="indefinite" restart="never" nodeType="tmRoot"/>
+        <p:cTn xmlns:p14="http://schemas.microsoft.com/office/powerpoint/2010/main" id="1" dur="indefinite" restart="never" nodeType="tmRoot"/>
       </p:par>
     </p:tnLst>
   </p:timing>
@@ -29445,7 +28966,7 @@
   <p:timing>
     <p:tnLst>
       <p:par>
-        <p:cTn id="1" dur="indefinite" restart="never" nodeType="tmRoot"/>
+        <p:cTn xmlns:p14="http://schemas.microsoft.com/office/powerpoint/2010/main" id="1" dur="indefinite" restart="never" nodeType="tmRoot"/>
       </p:par>
     </p:tnLst>
   </p:timing>
@@ -29960,7 +29481,7 @@
   <p:timing>
     <p:tnLst>
       <p:par>
-        <p:cTn id="1" dur="indefinite" restart="never" nodeType="tmRoot"/>
+        <p:cTn xmlns:p14="http://schemas.microsoft.com/office/powerpoint/2010/main" id="1" dur="indefinite" restart="never" nodeType="tmRoot"/>
       </p:par>
     </p:tnLst>
   </p:timing>
@@ -30428,12 +29949,12 @@
           <a:graphicData uri="http://schemas.openxmlformats.org/presentationml/2006/ole">
             <mc:AlternateContent xmlns:mc="http://schemas.openxmlformats.org/markup-compatibility/2006">
               <mc:Choice xmlns:v="urn:schemas-microsoft-com:vml" Requires="v">
-                <p:oleObj spid="_x0000_s3092" name="Document" r:id="rId4" imgW="6096000" imgH="2197100" progId="Word.Document.12">
+                <p:oleObj spid="_x0000_s3094" name="Document" r:id="rId5" imgW="6096000" imgH="2197100" progId="Word.Document.12">
                   <p:embed/>
                 </p:oleObj>
               </mc:Choice>
               <mc:Fallback>
-                <p:oleObj name="Document" r:id="rId4" imgW="6096000" imgH="2197100" progId="Word.Document.12">
+                <p:oleObj name="Document" r:id="rId5" imgW="6096000" imgH="2197100" progId="Word.Document.12">
                   <p:embed/>
                   <p:pic>
                     <p:nvPicPr>
@@ -30442,7 +29963,7 @@
                       <p:nvPr/>
                     </p:nvPicPr>
                     <p:blipFill>
-                      <a:blip r:embed="rId5"/>
+                      <a:blip r:embed="rId6"/>
                       <a:stretch>
                         <a:fillRect/>
                       </a:stretch>
@@ -30488,7 +30009,7 @@
   <p:timing>
     <p:tnLst>
       <p:par>
-        <p:cTn id="1" dur="indefinite" restart="never" nodeType="tmRoot"/>
+        <p:cTn xmlns:p14="http://schemas.microsoft.com/office/powerpoint/2010/main" id="1" dur="indefinite" restart="never" nodeType="tmRoot"/>
       </p:par>
     </p:tnLst>
   </p:timing>
@@ -30956,12 +30477,12 @@
           <a:graphicData uri="http://schemas.openxmlformats.org/presentationml/2006/ole">
             <mc:AlternateContent xmlns:mc="http://schemas.openxmlformats.org/markup-compatibility/2006">
               <mc:Choice xmlns:v="urn:schemas-microsoft-com:vml" Requires="v">
-                <p:oleObj spid="_x0000_s4116" name="Document" r:id="rId4" imgW="6096000" imgH="3378200" progId="Word.Document.12">
+                <p:oleObj spid="_x0000_s4118" name="Document" r:id="rId5" imgW="6096000" imgH="3378200" progId="Word.Document.12">
                   <p:embed/>
                 </p:oleObj>
               </mc:Choice>
               <mc:Fallback>
-                <p:oleObj name="Document" r:id="rId4" imgW="6096000" imgH="3378200" progId="Word.Document.12">
+                <p:oleObj name="Document" r:id="rId5" imgW="6096000" imgH="3378200" progId="Word.Document.12">
                   <p:embed/>
                   <p:pic>
                     <p:nvPicPr>
@@ -30970,7 +30491,7 @@
                       <p:nvPr/>
                     </p:nvPicPr>
                     <p:blipFill>
-                      <a:blip r:embed="rId5"/>
+                      <a:blip r:embed="rId6"/>
                       <a:stretch>
                         <a:fillRect/>
                       </a:stretch>
@@ -31016,7 +30537,7 @@
   <p:timing>
     <p:tnLst>
       <p:par>
-        <p:cTn id="1" dur="indefinite" restart="never" nodeType="tmRoot"/>
+        <p:cTn xmlns:p14="http://schemas.microsoft.com/office/powerpoint/2010/main" id="1" dur="indefinite" restart="never" nodeType="tmRoot"/>
       </p:par>
     </p:tnLst>
   </p:timing>
@@ -31595,7 +31116,7 @@
   <p:timing>
     <p:tnLst>
       <p:par>
-        <p:cTn id="1" dur="indefinite" restart="never" nodeType="tmRoot"/>
+        <p:cTn xmlns:p14="http://schemas.microsoft.com/office/powerpoint/2010/main" id="1" dur="indefinite" restart="never" nodeType="tmRoot"/>
       </p:par>
     </p:tnLst>
   </p:timing>
@@ -33171,7 +32692,7 @@
   <p:timing>
     <p:tnLst>
       <p:par>
-        <p:cTn id="1" dur="indefinite" restart="never" nodeType="tmRoot"/>
+        <p:cTn xmlns:p14="http://schemas.microsoft.com/office/powerpoint/2010/main" id="1" dur="indefinite" restart="never" nodeType="tmRoot"/>
       </p:par>
     </p:tnLst>
   </p:timing>
@@ -33664,7 +33185,7 @@
   <p:timing>
     <p:tnLst>
       <p:par>
-        <p:cTn id="1" dur="indefinite" restart="never" nodeType="tmRoot"/>
+        <p:cTn xmlns:p14="http://schemas.microsoft.com/office/powerpoint/2010/main" id="1" dur="indefinite" restart="never" nodeType="tmRoot"/>
       </p:par>
     </p:tnLst>
   </p:timing>
@@ -34179,7 +33700,7 @@
   <p:timing>
     <p:tnLst>
       <p:par>
-        <p:cTn id="1" dur="indefinite" restart="never" nodeType="tmRoot"/>
+        <p:cTn xmlns:p14="http://schemas.microsoft.com/office/powerpoint/2010/main" id="1" dur="indefinite" restart="never" nodeType="tmRoot"/>
       </p:par>
     </p:tnLst>
   </p:timing>
@@ -34694,7 +34215,7 @@
   <p:timing>
     <p:tnLst>
       <p:par>
-        <p:cTn id="1" dur="indefinite" restart="never" nodeType="tmRoot"/>
+        <p:cTn xmlns:p14="http://schemas.microsoft.com/office/powerpoint/2010/main" id="1" dur="indefinite" restart="never" nodeType="tmRoot"/>
       </p:par>
     </p:tnLst>
   </p:timing>
@@ -35367,7 +34888,7 @@
   <p:timing>
     <p:tnLst>
       <p:par>
-        <p:cTn id="1" dur="indefinite" restart="never" nodeType="tmRoot"/>
+        <p:cTn xmlns:p14="http://schemas.microsoft.com/office/powerpoint/2010/main" id="1" dur="indefinite" restart="never" nodeType="tmRoot"/>
       </p:par>
     </p:tnLst>
   </p:timing>
@@ -35959,7 +35480,7 @@
   <p:timing>
     <p:tnLst>
       <p:par>
-        <p:cTn id="1" dur="indefinite" restart="never" nodeType="tmRoot"/>
+        <p:cTn xmlns:p14="http://schemas.microsoft.com/office/powerpoint/2010/main" id="1" dur="indefinite" restart="never" nodeType="tmRoot"/>
       </p:par>
     </p:tnLst>
   </p:timing>
@@ -36607,7 +36128,7 @@
   <p:timing>
     <p:tnLst>
       <p:par>
-        <p:cTn id="1" dur="indefinite" restart="never" nodeType="tmRoot"/>
+        <p:cTn xmlns:p14="http://schemas.microsoft.com/office/powerpoint/2010/main" id="1" dur="indefinite" restart="never" nodeType="tmRoot"/>
       </p:par>
     </p:tnLst>
   </p:timing>
@@ -37064,7 +36585,7 @@
   <p:timing>
     <p:tnLst>
       <p:par>
-        <p:cTn id="1" dur="indefinite" restart="never" nodeType="tmRoot"/>
+        <p:cTn xmlns:p14="http://schemas.microsoft.com/office/powerpoint/2010/main" id="1" dur="indefinite" restart="never" nodeType="tmRoot"/>
       </p:par>
     </p:tnLst>
   </p:timing>
@@ -37724,7 +37245,7 @@
   <p:timing>
     <p:tnLst>
       <p:par>
-        <p:cTn id="1" dur="indefinite" restart="never" nodeType="tmRoot"/>
+        <p:cTn xmlns:p14="http://schemas.microsoft.com/office/powerpoint/2010/main" id="1" dur="indefinite" restart="never" nodeType="tmRoot"/>
       </p:par>
     </p:tnLst>
   </p:timing>
@@ -38376,7 +37897,7 @@
   <p:timing>
     <p:tnLst>
       <p:par>
-        <p:cTn id="1" dur="indefinite" restart="never" nodeType="tmRoot"/>
+        <p:cTn xmlns:p14="http://schemas.microsoft.com/office/powerpoint/2010/main" id="1" dur="indefinite" restart="never" nodeType="tmRoot"/>
       </p:par>
     </p:tnLst>
   </p:timing>
@@ -38869,7 +38390,7 @@
   <p:timing>
     <p:tnLst>
       <p:par>
-        <p:cTn id="1" dur="indefinite" restart="never" nodeType="tmRoot"/>
+        <p:cTn xmlns:p14="http://schemas.microsoft.com/office/powerpoint/2010/main" id="1" dur="indefinite" restart="never" nodeType="tmRoot"/>
       </p:par>
     </p:tnLst>
   </p:timing>
@@ -39582,7 +39103,7 @@
   <p:timing>
     <p:tnLst>
       <p:par>
-        <p:cTn id="1" dur="indefinite" restart="never" nodeType="tmRoot"/>
+        <p:cTn xmlns:p14="http://schemas.microsoft.com/office/powerpoint/2010/main" id="1" dur="indefinite" restart="never" nodeType="tmRoot"/>
       </p:par>
     </p:tnLst>
   </p:timing>
@@ -40516,7 +40037,7 @@
   <p:timing>
     <p:tnLst>
       <p:par>
-        <p:cTn id="1" dur="indefinite" restart="never" nodeType="tmRoot"/>
+        <p:cTn xmlns:p14="http://schemas.microsoft.com/office/powerpoint/2010/main" id="1" dur="indefinite" restart="never" nodeType="tmRoot"/>
       </p:par>
     </p:tnLst>
   </p:timing>
@@ -40908,7 +40429,7 @@
                   <a:t>Reading a vertex, edge, or property: </a:t>
                 </a:r>
                 <a14:m>
-                  <m:oMath xmlns:m="http://schemas.openxmlformats.org/officeDocument/2006/math">
+                  <m:oMath xmlns:m="http://schemas.openxmlformats.org/officeDocument/2006/math" xmlns="">
                     <m:r>
                       <a:rPr lang="en-US" b="0" i="1" smtClean="0">
                         <a:solidFill>
@@ -40983,7 +40504,7 @@
                   <a:t>edges: </a:t>
                 </a:r>
                 <a14:m>
-                  <m:oMath xmlns:m="http://schemas.openxmlformats.org/officeDocument/2006/math">
+                  <m:oMath xmlns:m="http://schemas.openxmlformats.org/officeDocument/2006/math" xmlns="">
                     <m:r>
                       <a:rPr lang="en-US" b="0" i="1" smtClean="0">
                         <a:solidFill>
@@ -41026,7 +40547,7 @@
                   <a:t>, </a:t>
                 </a:r>
                 <a14:m>
-                  <m:oMath xmlns:m="http://schemas.openxmlformats.org/officeDocument/2006/math">
+                  <m:oMath xmlns:m="http://schemas.openxmlformats.org/officeDocument/2006/math" xmlns="">
                     <m:r>
                       <a:rPr lang="en-US" b="0" i="1" smtClean="0">
                         <a:solidFill>
@@ -41470,7 +40991,7 @@
   <p:timing>
     <p:tnLst>
       <p:par>
-        <p:cTn id="1" dur="indefinite" restart="never" nodeType="tmRoot"/>
+        <p:cTn xmlns:p14="http://schemas.microsoft.com/office/powerpoint/2010/main" id="1" dur="indefinite" restart="never" nodeType="tmRoot"/>
       </p:par>
     </p:tnLst>
   </p:timing>
@@ -42009,16 +41530,6 @@
               </a:rPr>
               <a:t> consistently came in second place</a:t>
             </a:r>
-            <a:endParaRPr lang="en-US" dirty="0" smtClean="0">
-              <a:solidFill>
-                <a:schemeClr val="tx1">
-                  <a:lumMod val="50000"/>
-                  <a:lumOff val="50000"/>
-                </a:schemeClr>
-              </a:solidFill>
-              <a:latin typeface="Roboto Condensed" pitchFamily="2" charset="0"/>
-              <a:ea typeface="Roboto Condensed" pitchFamily="2" charset="0"/>
-            </a:endParaRPr>
           </a:p>
           <a:p>
             <a:pPr marL="342900" indent="-342900">
@@ -42041,16 +41552,6 @@
               </a:rPr>
               <a:t>Alternative methods of performance analysis are possible but were not explored</a:t>
             </a:r>
-            <a:endParaRPr lang="en-US" dirty="0" smtClean="0">
-              <a:solidFill>
-                <a:schemeClr val="tx1">
-                  <a:lumMod val="50000"/>
-                  <a:lumOff val="50000"/>
-                </a:schemeClr>
-              </a:solidFill>
-              <a:latin typeface="Roboto Condensed" pitchFamily="2" charset="0"/>
-              <a:ea typeface="Roboto Condensed" pitchFamily="2" charset="0"/>
-            </a:endParaRPr>
           </a:p>
         </p:txBody>
       </p:sp>
@@ -42185,13 +41686,13 @@
   <p:clrMapOvr>
     <a:masterClrMapping/>
   </p:clrMapOvr>
-  <mc:AlternateContent xmlns:mc="http://schemas.openxmlformats.org/markup-compatibility/2006">
-    <mc:Choice xmlns:p14="http://schemas.microsoft.com/office/powerpoint/2010/main" Requires="p14">
+  <mc:AlternateContent xmlns:mc="http://schemas.openxmlformats.org/markup-compatibility/2006" xmlns:p14="http://schemas.microsoft.com/office/powerpoint/2010/main">
+    <mc:Choice Requires="p14">
       <p:transition spd="med" p14:dur="700">
         <p:fade/>
       </p:transition>
     </mc:Choice>
-    <mc:Fallback>
+    <mc:Fallback xmlns="">
       <p:transition spd="med">
         <p:fade/>
       </p:transition>
@@ -42200,7 +41701,7 @@
   <p:timing>
     <p:tnLst>
       <p:par>
-        <p:cTn id="1" dur="indefinite" restart="never" nodeType="tmRoot"/>
+        <p:cTn xmlns:p14="http://schemas.microsoft.com/office/powerpoint/2010/main" id="1" dur="indefinite" restart="never" nodeType="tmRoot"/>
       </p:par>
     </p:tnLst>
   </p:timing>
@@ -43300,9 +42801,8 @@
               </a:bodyPr>
               <a:lstStyle/>
               <a:p>
-                <a:pPr/>
                 <a14:m>
-                  <m:oMathPara xmlns:m="http://schemas.openxmlformats.org/officeDocument/2006/math">
+                  <m:oMathPara xmlns:m="http://schemas.openxmlformats.org/officeDocument/2006/math" xmlns="">
                     <m:oMathParaPr>
                       <m:jc m:val="centerGroup"/>
                     </m:oMathParaPr>
@@ -43542,7 +43042,7 @@
   <p:timing>
     <p:tnLst>
       <p:par>
-        <p:cTn id="1" dur="indefinite" restart="never" nodeType="tmRoot"/>
+        <p:cTn xmlns:p14="http://schemas.microsoft.com/office/powerpoint/2010/main" id="1" dur="indefinite" restart="never" nodeType="tmRoot"/>
       </p:par>
     </p:tnLst>
   </p:timing>
@@ -44640,7 +44140,7 @@
   <p:timing>
     <p:tnLst>
       <p:par>
-        <p:cTn id="1" dur="indefinite" restart="never" nodeType="tmRoot"/>
+        <p:cTn xmlns:p14="http://schemas.microsoft.com/office/powerpoint/2010/main" id="1" dur="indefinite" restart="never" nodeType="tmRoot"/>
       </p:par>
     </p:tnLst>
   </p:timing>
@@ -46141,7 +45641,7 @@
   <p:timing>
     <p:tnLst>
       <p:par>
-        <p:cTn id="1" dur="indefinite" restart="never" nodeType="tmRoot"/>
+        <p:cTn xmlns:p14="http://schemas.microsoft.com/office/powerpoint/2010/main" id="1" dur="indefinite" restart="never" nodeType="tmRoot"/>
       </p:par>
     </p:tnLst>
   </p:timing>
@@ -46701,7 +46201,7 @@
   <p:timing>
     <p:tnLst>
       <p:par>
-        <p:cTn id="1" dur="indefinite" restart="never" nodeType="tmRoot"/>
+        <p:cTn xmlns:p14="http://schemas.microsoft.com/office/powerpoint/2010/main" id="1" dur="indefinite" restart="never" nodeType="tmRoot"/>
       </p:par>
     </p:tnLst>
   </p:timing>
@@ -47314,9 +46814,8 @@
               </a:bodyPr>
               <a:lstStyle/>
               <a:p>
-                <a:pPr/>
                 <a14:m>
-                  <m:oMathPara xmlns:m="http://schemas.openxmlformats.org/officeDocument/2006/math">
+                  <m:oMathPara xmlns:m="http://schemas.openxmlformats.org/officeDocument/2006/math" xmlns="">
                     <m:oMathParaPr>
                       <m:jc m:val="centerGroup"/>
                     </m:oMathParaPr>
@@ -47826,7 +47325,7 @@
   <p:timing>
     <p:tnLst>
       <p:par>
-        <p:cTn id="1" dur="indefinite" restart="never" nodeType="tmRoot"/>
+        <p:cTn xmlns:p14="http://schemas.microsoft.com/office/powerpoint/2010/main" id="1" dur="indefinite" restart="never" nodeType="tmRoot"/>
       </p:par>
     </p:tnLst>
   </p:timing>
@@ -48088,7 +47587,7 @@
   <a:extraClrSchemeLst/>
   <a:extLst>
     <a:ext uri="{05A4C25C-085E-4340-85A3-A5531E510DB2}">
-      <thm15:themeFamily xmlns:thm15="http://schemas.microsoft.com/office/thememl/2012/main" name="Office Theme" id="{62F939B6-93AF-4DB8-9C6B-D6C7DFDC589F}" vid="{4A3C46E8-61CC-4603-A589-7422A47A8E4A}"/>
+      <thm15:themeFamily xmlns:thm15="http://schemas.microsoft.com/office/thememl/2012/main" xmlns="" name="Office Theme" id="{62F939B6-93AF-4DB8-9C6B-D6C7DFDC589F}" vid="{4A3C46E8-61CC-4603-A589-7422A47A8E4A}"/>
     </a:ext>
   </a:extLst>
 </a:theme>
@@ -48349,7 +47848,7 @@
   <a:extraClrSchemeLst/>
   <a:extLst>
     <a:ext uri="{05A4C25C-085E-4340-85A3-A5531E510DB2}">
-      <thm15:themeFamily xmlns:thm15="http://schemas.microsoft.com/office/thememl/2012/main" name="Office Theme" id="{62F939B6-93AF-4DB8-9C6B-D6C7DFDC589F}" vid="{4A3C46E8-61CC-4603-A589-7422A47A8E4A}"/>
+      <thm15:themeFamily xmlns:thm15="http://schemas.microsoft.com/office/thememl/2012/main" xmlns="" name="Office Theme" id="{62F939B6-93AF-4DB8-9C6B-D6C7DFDC589F}" vid="{4A3C46E8-61CC-4603-A589-7422A47A8E4A}"/>
     </a:ext>
   </a:extLst>
 </a:theme>

</xml_diff>

<commit_message>
Pushed up font-corrected PDF
</commit_message>
<xml_diff>
--- a/docs/In_class_presentation.pptx
+++ b/docs/In_class_presentation.pptx
@@ -53,6 +53,46 @@
   </p:sldIdLst>
   <p:sldSz cx="9144000" cy="6858000" type="screen4x3"/>
   <p:notesSz cx="6858000" cy="9144000"/>
+  <p:embeddedFontLst>
+    <p:embeddedFont>
+      <p:font typeface="Roboto" panose="02000000000000000000" pitchFamily="2" charset="0"/>
+      <p:regular r:id="rId45"/>
+      <p:bold r:id="rId46"/>
+      <p:italic r:id="rId47"/>
+      <p:boldItalic r:id="rId48"/>
+    </p:embeddedFont>
+    <p:embeddedFont>
+      <p:font typeface="Cambria Math" panose="02040503050406030204" pitchFamily="18" charset="0"/>
+      <p:regular r:id="rId49"/>
+    </p:embeddedFont>
+    <p:embeddedFont>
+      <p:font typeface="Roboto Condensed" panose="02000000000000000000" pitchFamily="2" charset="0"/>
+      <p:regular r:id="rId50"/>
+      <p:bold r:id="rId51"/>
+      <p:italic r:id="rId52"/>
+      <p:boldItalic r:id="rId53"/>
+    </p:embeddedFont>
+    <p:embeddedFont>
+      <p:font typeface="Calibri Light" panose="020F0302020204030204" pitchFamily="34" charset="0"/>
+      <p:regular r:id="rId54"/>
+      <p:italic r:id="rId55"/>
+    </p:embeddedFont>
+    <p:embeddedFont>
+      <p:font typeface="SimSun-ExtB" panose="02010609060101010101" pitchFamily="49" charset="-122"/>
+      <p:regular r:id="rId56"/>
+    </p:embeddedFont>
+    <p:embeddedFont>
+      <p:font typeface="Calibri" panose="020F0502020204030204" pitchFamily="34" charset="0"/>
+      <p:regular r:id="rId57"/>
+      <p:bold r:id="rId58"/>
+      <p:italic r:id="rId59"/>
+      <p:boldItalic r:id="rId60"/>
+    </p:embeddedFont>
+    <p:embeddedFont>
+      <p:font typeface="MS Mincho" panose="02020609040205080304" pitchFamily="49" charset="-128"/>
+      <p:regular r:id="rId61"/>
+    </p:embeddedFont>
+  </p:embeddedFontLst>
   <p:defaultTextStyle>
     <a:defPPr>
       <a:defRPr lang="en-US"/>
@@ -228,7 +268,7 @@
       </p14:sectionLst>
     </p:ext>
     <p:ext uri="{EFAFB233-063F-42B5-8137-9DF3F51BA10A}">
-      <p15:sldGuideLst xmlns:p15="http://schemas.microsoft.com/office/powerpoint/2012/main" xmlns="">
+      <p15:sldGuideLst xmlns:p15="http://schemas.microsoft.com/office/powerpoint/2012/main">
         <p15:guide id="1" orient="horz" pos="2160">
           <p15:clr>
             <a:srgbClr val="A4A3A4"/>
@@ -267,9 +307,9 @@
           <c:xMode val="edge"/>
           <c:yMode val="edge"/>
           <c:x val="0.116621417084024"/>
-          <c:y val="0.055649809057232"/>
-          <c:w val="0.873205195503057"/>
-          <c:h val="0.80993949775094"/>
+          <c:y val="5.5649809057231998E-2"/>
+          <c:w val="0.87320519550305697"/>
+          <c:h val="0.80993949775093999"/>
         </c:manualLayout>
       </c:layout>
       <c:barChart>
@@ -340,7 +380,6 @@
             <c:showLeaderLines val="0"/>
             <c:extLst>
               <c:ext xmlns:c15="http://schemas.microsoft.com/office/drawing/2012/chart" uri="{CE6537A1-D6FC-4f65-9D91-7224C49458BB}">
-                <c15:layout/>
                 <c15:showLeaderLines val="1"/>
                 <c15:leaderLines>
                   <c:spPr>
@@ -386,7 +425,7 @@
                 <c:formatCode>General</c:formatCode>
                 <c:ptCount val="4"/>
                 <c:pt idx="0">
-                  <c:v>20.1</c:v>
+                  <c:v>20.100000000000001</c:v>
                 </c:pt>
                 <c:pt idx="1">
                   <c:v>120.9</c:v>
@@ -395,7 +434,7 @@
                   <c:v>2.1</c:v>
                 </c:pt>
                 <c:pt idx="3">
-                  <c:v>4.4</c:v>
+                  <c:v>4.4000000000000004</c:v>
                 </c:pt>
               </c:numCache>
             </c:numRef>
@@ -465,7 +504,6 @@
             <c:showLeaderLines val="0"/>
             <c:extLst>
               <c:ext xmlns:c15="http://schemas.microsoft.com/office/drawing/2012/chart" uri="{CE6537A1-D6FC-4f65-9D91-7224C49458BB}">
-                <c15:layout/>
                 <c15:showLeaderLines val="1"/>
                 <c15:leaderLines>
                   <c:spPr>
@@ -537,11 +575,11 @@
         </c:dLbls>
         <c:gapWidth val="150"/>
         <c:overlap val="-13"/>
-        <c:axId val="2122541160"/>
-        <c:axId val="2122537544"/>
+        <c:axId val="-957424944"/>
+        <c:axId val="-957432016"/>
       </c:barChart>
       <c:catAx>
-        <c:axId val="2122541160"/>
+        <c:axId val="-957424944"/>
         <c:scaling>
           <c:orientation val="minMax"/>
         </c:scaling>
@@ -584,7 +622,7 @@
             <a:endParaRPr lang="en-US"/>
           </a:p>
         </c:txPr>
-        <c:crossAx val="2122537544"/>
+        <c:crossAx val="-957432016"/>
         <c:crosses val="autoZero"/>
         <c:auto val="1"/>
         <c:lblAlgn val="ctr"/>
@@ -592,7 +630,7 @@
         <c:noMultiLvlLbl val="0"/>
       </c:catAx>
       <c:valAx>
-        <c:axId val="2122537544"/>
+        <c:axId val="-957432016"/>
         <c:scaling>
           <c:orientation val="minMax"/>
         </c:scaling>
@@ -651,8 +689,8 @@
             <c:manualLayout>
               <c:xMode val="edge"/>
               <c:yMode val="edge"/>
-              <c:x val="0.00298723737075304"/>
-              <c:y val="0.266713219312793"/>
+              <c:x val="2.98723737075304E-3"/>
+              <c:y val="0.26671321931279302"/>
             </c:manualLayout>
           </c:layout>
           <c:overlay val="0"/>
@@ -663,6 +701,26 @@
             </a:ln>
             <a:effectLst/>
           </c:spPr>
+          <c:txPr>
+            <a:bodyPr rot="-5400000" spcFirstLastPara="1" vertOverflow="ellipsis" vert="horz" wrap="square" anchor="ctr" anchorCtr="1"/>
+            <a:lstStyle/>
+            <a:p>
+              <a:pPr>
+                <a:defRPr sz="1000" b="0" i="0" u="none" strike="noStrike" kern="1200" baseline="0">
+                  <a:solidFill>
+                    <a:schemeClr val="tx1">
+                      <a:lumMod val="65000"/>
+                      <a:lumOff val="35000"/>
+                    </a:schemeClr>
+                  </a:solidFill>
+                  <a:latin typeface="+mn-lt"/>
+                  <a:ea typeface="+mn-ea"/>
+                  <a:cs typeface="+mn-cs"/>
+                </a:defRPr>
+              </a:pPr>
+              <a:endParaRPr lang="en-US"/>
+            </a:p>
+          </c:txPr>
         </c:title>
         <c:numFmt formatCode="General" sourceLinked="1"/>
         <c:majorTickMark val="none"/>
@@ -695,7 +753,7 @@
             <a:endParaRPr lang="en-US"/>
           </a:p>
         </c:txPr>
-        <c:crossAx val="2122541160"/>
+        <c:crossAx val="-957424944"/>
         <c:crosses val="autoZero"/>
         <c:crossBetween val="between"/>
       </c:valAx>
@@ -713,10 +771,10 @@
         <c:manualLayout>
           <c:xMode val="edge"/>
           <c:yMode val="edge"/>
-          <c:x val="0.812653551974888"/>
+          <c:x val="0.81265355197488798"/>
           <c:y val="0.100606383985706"/>
           <c:w val="0.158956239469107"/>
-          <c:h val="0.228618367735937"/>
+          <c:h val="0.22861836773593699"/>
         </c:manualLayout>
       </c:layout>
       <c:overlay val="0"/>
@@ -772,7 +830,7 @@
       <a:endParaRPr lang="en-US"/>
     </a:p>
   </c:txPr>
-  <c:externalData r:id="rId1">
+  <c:externalData r:id="rId3">
     <c:autoUpdate val="0"/>
   </c:externalData>
 </c:chartSpace>
@@ -808,7 +866,6 @@
           </a:p>
         </c:rich>
       </c:tx>
-      <c:layout/>
       <c:overlay val="0"/>
     </c:title>
     <c:autoTitleDeleted val="0"/>
@@ -830,16 +887,16 @@
                 <c:formatCode>General</c:formatCode>
                 <c:ptCount val="4"/>
                 <c:pt idx="0">
-                  <c:v>1000.0</c:v>
+                  <c:v>1000</c:v>
                 </c:pt>
                 <c:pt idx="1">
-                  <c:v>10000.0</c:v>
+                  <c:v>10000</c:v>
                 </c:pt>
                 <c:pt idx="2">
-                  <c:v>100000.0</c:v>
+                  <c:v>100000</c:v>
                 </c:pt>
                 <c:pt idx="3">
-                  <c:v>1.0E6</c:v>
+                  <c:v>1000000</c:v>
                 </c:pt>
               </c:numCache>
             </c:numRef>
@@ -851,13 +908,13 @@
                 <c:formatCode>General</c:formatCode>
                 <c:ptCount val="4"/>
                 <c:pt idx="0">
-                  <c:v>0.311166666666667</c:v>
+                  <c:v>0.31116666666666698</c:v>
                 </c:pt>
                 <c:pt idx="1">
                   <c:v>1.163866666666667</c:v>
                 </c:pt>
                 <c:pt idx="2">
-                  <c:v>9.580100000000001</c:v>
+                  <c:v>9.5801000000000016</c:v>
                 </c:pt>
                 <c:pt idx="3">
                   <c:v>128.172</c:v>
@@ -880,16 +937,16 @@
                 <c:formatCode>General</c:formatCode>
                 <c:ptCount val="4"/>
                 <c:pt idx="0">
-                  <c:v>1000.0</c:v>
+                  <c:v>1000</c:v>
                 </c:pt>
                 <c:pt idx="1">
-                  <c:v>10000.0</c:v>
+                  <c:v>10000</c:v>
                 </c:pt>
                 <c:pt idx="2">
-                  <c:v>100000.0</c:v>
+                  <c:v>100000</c:v>
                 </c:pt>
                 <c:pt idx="3">
-                  <c:v>1.0E6</c:v>
+                  <c:v>1000000</c:v>
                 </c:pt>
               </c:numCache>
             </c:numRef>
@@ -901,13 +958,13 @@
                 <c:formatCode>General</c:formatCode>
                 <c:ptCount val="4"/>
                 <c:pt idx="0">
-                  <c:v>1.718866666666666</c:v>
+                  <c:v>1.7188666666666661</c:v>
                 </c:pt>
                 <c:pt idx="1">
                   <c:v>4.200433333333331</c:v>
                 </c:pt>
                 <c:pt idx="2">
-                  <c:v>34.6763</c:v>
+                  <c:v>34.676299999999998</c:v>
                 </c:pt>
                 <c:pt idx="3">
                   <c:v>109.2299666666666</c:v>
@@ -927,11 +984,11 @@
         </c:dLbls>
         <c:marker val="1"/>
         <c:smooth val="0"/>
-        <c:axId val="2124690008"/>
-        <c:axId val="2124687016"/>
+        <c:axId val="-962078192"/>
+        <c:axId val="-962072752"/>
       </c:lineChart>
       <c:catAx>
-        <c:axId val="2124690008"/>
+        <c:axId val="-962078192"/>
         <c:scaling>
           <c:orientation val="minMax"/>
         </c:scaling>
@@ -941,7 +998,7 @@
         <c:majorTickMark val="none"/>
         <c:minorTickMark val="none"/>
         <c:tickLblPos val="nextTo"/>
-        <c:crossAx val="2124687016"/>
+        <c:crossAx val="-962072752"/>
         <c:crosses val="autoZero"/>
         <c:auto val="1"/>
         <c:lblAlgn val="ctr"/>
@@ -949,10 +1006,10 @@
         <c:noMultiLvlLbl val="0"/>
       </c:catAx>
       <c:valAx>
-        <c:axId val="2124687016"/>
+        <c:axId val="-962072752"/>
         <c:scaling>
           <c:orientation val="minMax"/>
-          <c:min val="0.0"/>
+          <c:min val="0"/>
         </c:scaling>
         <c:delete val="0"/>
         <c:axPos val="l"/>
@@ -978,21 +1035,19 @@
               </a:p>
             </c:rich>
           </c:tx>
-          <c:layout/>
           <c:overlay val="0"/>
         </c:title>
         <c:numFmt formatCode="General" sourceLinked="1"/>
         <c:majorTickMark val="none"/>
         <c:minorTickMark val="none"/>
         <c:tickLblPos val="nextTo"/>
-        <c:crossAx val="2124690008"/>
+        <c:crossAx val="-962078192"/>
         <c:crosses val="autoZero"/>
         <c:crossBetween val="between"/>
       </c:valAx>
     </c:plotArea>
     <c:legend>
       <c:legendPos val="r"/>
-      <c:layout/>
       <c:overlay val="0"/>
     </c:legend>
     <c:plotVisOnly val="1"/>
@@ -1042,7 +1097,6 @@
           </a:p>
         </c:rich>
       </c:tx>
-      <c:layout/>
       <c:overlay val="0"/>
     </c:title>
     <c:autoTitleDeleted val="0"/>
@@ -1064,16 +1118,16 @@
                 <c:formatCode>General</c:formatCode>
                 <c:ptCount val="4"/>
                 <c:pt idx="0">
-                  <c:v>1000.0</c:v>
+                  <c:v>1000</c:v>
                 </c:pt>
                 <c:pt idx="1">
-                  <c:v>10000.0</c:v>
+                  <c:v>10000</c:v>
                 </c:pt>
                 <c:pt idx="2">
-                  <c:v>100000.0</c:v>
+                  <c:v>100000</c:v>
                 </c:pt>
                 <c:pt idx="3">
-                  <c:v>1.0E6</c:v>
+                  <c:v>1000000</c:v>
                 </c:pt>
               </c:numCache>
             </c:numRef>
@@ -1088,13 +1142,13 @@
                   <c:v>5.324066666666651</c:v>
                 </c:pt>
                 <c:pt idx="1">
-                  <c:v>43.3851</c:v>
+                  <c:v>43.385100000000001</c:v>
                 </c:pt>
                 <c:pt idx="2">
-                  <c:v>577.2221666666666</c:v>
+                  <c:v>577.22216666666657</c:v>
                 </c:pt>
                 <c:pt idx="3">
-                  <c:v>6919.294933333334</c:v>
+                  <c:v>6919.2949333333336</c:v>
                 </c:pt>
               </c:numCache>
             </c:numRef>
@@ -1114,16 +1168,16 @@
                 <c:formatCode>General</c:formatCode>
                 <c:ptCount val="4"/>
                 <c:pt idx="0">
-                  <c:v>1000.0</c:v>
+                  <c:v>1000</c:v>
                 </c:pt>
                 <c:pt idx="1">
-                  <c:v>10000.0</c:v>
+                  <c:v>10000</c:v>
                 </c:pt>
                 <c:pt idx="2">
-                  <c:v>100000.0</c:v>
+                  <c:v>100000</c:v>
                 </c:pt>
                 <c:pt idx="3">
-                  <c:v>1.0E6</c:v>
+                  <c:v>1000000</c:v>
                 </c:pt>
               </c:numCache>
             </c:numRef>
@@ -1135,13 +1189,13 @@
                 <c:formatCode>General</c:formatCode>
                 <c:ptCount val="4"/>
                 <c:pt idx="0">
-                  <c:v>4.354466666666663</c:v>
+                  <c:v>4.3544666666666627</c:v>
                 </c:pt>
                 <c:pt idx="1">
-                  <c:v>23.35579999999998</c:v>
+                  <c:v>23.355799999999981</c:v>
                 </c:pt>
                 <c:pt idx="2">
-                  <c:v>332.8497666666665</c:v>
+                  <c:v>332.84976666666648</c:v>
                 </c:pt>
                 <c:pt idx="3">
                   <c:v>3070.222233333333</c:v>
@@ -1161,11 +1215,11 @@
         </c:dLbls>
         <c:marker val="1"/>
         <c:smooth val="0"/>
-        <c:axId val="2124656840"/>
-        <c:axId val="2124653848"/>
+        <c:axId val="-962079280"/>
+        <c:axId val="-962073840"/>
       </c:lineChart>
       <c:catAx>
-        <c:axId val="2124656840"/>
+        <c:axId val="-962079280"/>
         <c:scaling>
           <c:orientation val="minMax"/>
         </c:scaling>
@@ -1175,7 +1229,7 @@
         <c:majorTickMark val="none"/>
         <c:minorTickMark val="none"/>
         <c:tickLblPos val="nextTo"/>
-        <c:crossAx val="2124653848"/>
+        <c:crossAx val="-962073840"/>
         <c:crosses val="autoZero"/>
         <c:auto val="1"/>
         <c:lblAlgn val="ctr"/>
@@ -1183,10 +1237,10 @@
         <c:noMultiLvlLbl val="0"/>
       </c:catAx>
       <c:valAx>
-        <c:axId val="2124653848"/>
+        <c:axId val="-962073840"/>
         <c:scaling>
           <c:orientation val="minMax"/>
-          <c:max val="7000.0"/>
+          <c:max val="7000"/>
         </c:scaling>
         <c:delete val="0"/>
         <c:axPos val="l"/>
@@ -1207,21 +1261,19 @@
               </a:p>
             </c:rich>
           </c:tx>
-          <c:layout/>
           <c:overlay val="0"/>
         </c:title>
         <c:numFmt formatCode="General" sourceLinked="1"/>
         <c:majorTickMark val="none"/>
         <c:minorTickMark val="none"/>
         <c:tickLblPos val="nextTo"/>
-        <c:crossAx val="2124656840"/>
+        <c:crossAx val="-962079280"/>
         <c:crosses val="autoZero"/>
         <c:crossBetween val="between"/>
       </c:valAx>
     </c:plotArea>
     <c:legend>
       <c:legendPos val="r"/>
-      <c:layout/>
       <c:overlay val="0"/>
     </c:legend>
     <c:plotVisOnly val="1"/>
@@ -1276,7 +1328,6 @@
           </a:p>
         </c:rich>
       </c:tx>
-      <c:layout/>
       <c:overlay val="0"/>
     </c:title>
     <c:autoTitleDeleted val="0"/>
@@ -1298,16 +1349,16 @@
                 <c:formatCode>General</c:formatCode>
                 <c:ptCount val="4"/>
                 <c:pt idx="0">
-                  <c:v>1000.0</c:v>
+                  <c:v>1000</c:v>
                 </c:pt>
                 <c:pt idx="1">
-                  <c:v>10000.0</c:v>
+                  <c:v>10000</c:v>
                 </c:pt>
                 <c:pt idx="2">
-                  <c:v>100000.0</c:v>
+                  <c:v>100000</c:v>
                 </c:pt>
                 <c:pt idx="3">
-                  <c:v>1.0E6</c:v>
+                  <c:v>1000000</c:v>
                 </c:pt>
               </c:numCache>
             </c:numRef>
@@ -1319,7 +1370,7 @@
                 <c:formatCode>General</c:formatCode>
                 <c:ptCount val="4"/>
                 <c:pt idx="0">
-                  <c:v>0.417033333333333</c:v>
+                  <c:v>0.41703333333333298</c:v>
                 </c:pt>
                 <c:pt idx="1">
                   <c:v>1.687433333333334</c:v>
@@ -1328,7 +1379,7 @@
                   <c:v>13.33123333333333</c:v>
                 </c:pt>
                 <c:pt idx="3">
-                  <c:v>129.7343666666667</c:v>
+                  <c:v>129.73436666666669</c:v>
                 </c:pt>
               </c:numCache>
             </c:numRef>
@@ -1348,16 +1399,16 @@
                 <c:formatCode>General</c:formatCode>
                 <c:ptCount val="4"/>
                 <c:pt idx="0">
-                  <c:v>1000.0</c:v>
+                  <c:v>1000</c:v>
                 </c:pt>
                 <c:pt idx="1">
-                  <c:v>10000.0</c:v>
+                  <c:v>10000</c:v>
                 </c:pt>
                 <c:pt idx="2">
-                  <c:v>100000.0</c:v>
+                  <c:v>100000</c:v>
                 </c:pt>
                 <c:pt idx="3">
-                  <c:v>1.0E6</c:v>
+                  <c:v>1000000</c:v>
                 </c:pt>
               </c:numCache>
             </c:numRef>
@@ -1369,13 +1420,13 @@
                 <c:formatCode>General</c:formatCode>
                 <c:ptCount val="4"/>
                 <c:pt idx="0">
-                  <c:v>2.057566666666666</c:v>
+                  <c:v>2.0575666666666659</c:v>
                 </c:pt>
                 <c:pt idx="1">
-                  <c:v>7.8892</c:v>
+                  <c:v>7.8891999999999998</c:v>
                 </c:pt>
                 <c:pt idx="2">
-                  <c:v>32.3161333333333</c:v>
+                  <c:v>32.316133333333298</c:v>
                 </c:pt>
                 <c:pt idx="3">
                   <c:v>103.0397</c:v>
@@ -1395,11 +1446,11 @@
         </c:dLbls>
         <c:marker val="1"/>
         <c:smooth val="0"/>
-        <c:axId val="2126132536"/>
-        <c:axId val="2126135512"/>
+        <c:axId val="-962073296"/>
+        <c:axId val="-962068400"/>
       </c:lineChart>
       <c:catAx>
-        <c:axId val="2126132536"/>
+        <c:axId val="-962073296"/>
         <c:scaling>
           <c:orientation val="minMax"/>
         </c:scaling>
@@ -1409,7 +1460,7 @@
         <c:majorTickMark val="none"/>
         <c:minorTickMark val="none"/>
         <c:tickLblPos val="nextTo"/>
-        <c:crossAx val="2126135512"/>
+        <c:crossAx val="-962068400"/>
         <c:crosses val="autoZero"/>
         <c:auto val="1"/>
         <c:lblAlgn val="ctr"/>
@@ -1417,7 +1468,7 @@
         <c:noMultiLvlLbl val="0"/>
       </c:catAx>
       <c:valAx>
-        <c:axId val="2126135512"/>
+        <c:axId val="-962068400"/>
         <c:scaling>
           <c:orientation val="minMax"/>
         </c:scaling>
@@ -1440,21 +1491,19 @@
               </a:p>
             </c:rich>
           </c:tx>
-          <c:layout/>
           <c:overlay val="0"/>
         </c:title>
         <c:numFmt formatCode="General" sourceLinked="1"/>
         <c:majorTickMark val="none"/>
         <c:minorTickMark val="none"/>
         <c:tickLblPos val="nextTo"/>
-        <c:crossAx val="2126132536"/>
+        <c:crossAx val="-962073296"/>
         <c:crosses val="autoZero"/>
         <c:crossBetween val="between"/>
       </c:valAx>
     </c:plotArea>
     <c:legend>
       <c:legendPos val="r"/>
-      <c:layout/>
       <c:overlay val="0"/>
     </c:legend>
     <c:plotVisOnly val="1"/>
@@ -1514,7 +1563,7 @@
           <c:xMode val="edge"/>
           <c:yMode val="edge"/>
           <c:x val="0.198556867891513"/>
-          <c:y val="0.037037037037037"/>
+          <c:y val="3.7037037037037E-2"/>
         </c:manualLayout>
       </c:layout>
       <c:overlay val="0"/>
@@ -1538,16 +1587,16 @@
                 <c:formatCode>General</c:formatCode>
                 <c:ptCount val="4"/>
                 <c:pt idx="0">
-                  <c:v>1000.0</c:v>
+                  <c:v>1000</c:v>
                 </c:pt>
                 <c:pt idx="1">
-                  <c:v>10000.0</c:v>
+                  <c:v>10000</c:v>
                 </c:pt>
                 <c:pt idx="2">
-                  <c:v>100000.0</c:v>
+                  <c:v>100000</c:v>
                 </c:pt>
                 <c:pt idx="3">
-                  <c:v>1.0E6</c:v>
+                  <c:v>1000000</c:v>
                 </c:pt>
               </c:numCache>
             </c:numRef>
@@ -1559,7 +1608,7 @@
                 <c:formatCode>General</c:formatCode>
                 <c:ptCount val="4"/>
                 <c:pt idx="0">
-                  <c:v>1.8029</c:v>
+                  <c:v>1.8028999999999999</c:v>
                 </c:pt>
                 <c:pt idx="1">
                   <c:v>14.88473333333333</c:v>
@@ -1568,7 +1617,7 @@
                   <c:v>140.8356666666667</c:v>
                 </c:pt>
                 <c:pt idx="3">
-                  <c:v>1921.3449</c:v>
+                  <c:v>1921.3449000000001</c:v>
                 </c:pt>
               </c:numCache>
             </c:numRef>
@@ -1588,16 +1637,16 @@
                 <c:formatCode>General</c:formatCode>
                 <c:ptCount val="4"/>
                 <c:pt idx="0">
-                  <c:v>1000.0</c:v>
+                  <c:v>1000</c:v>
                 </c:pt>
                 <c:pt idx="1">
-                  <c:v>10000.0</c:v>
+                  <c:v>10000</c:v>
                 </c:pt>
                 <c:pt idx="2">
-                  <c:v>100000.0</c:v>
+                  <c:v>100000</c:v>
                 </c:pt>
                 <c:pt idx="3">
-                  <c:v>1.0E6</c:v>
+                  <c:v>1000000</c:v>
                 </c:pt>
               </c:numCache>
             </c:numRef>
@@ -1609,13 +1658,13 @@
                 <c:formatCode>General</c:formatCode>
                 <c:ptCount val="4"/>
                 <c:pt idx="0">
-                  <c:v>6.886933333333332</c:v>
+                  <c:v>6.8869333333333316</c:v>
                 </c:pt>
                 <c:pt idx="1">
-                  <c:v>54.04926666666643</c:v>
+                  <c:v>54.049266666666433</c:v>
                 </c:pt>
                 <c:pt idx="2">
-                  <c:v>702.753566666667</c:v>
+                  <c:v>702.75356666666698</c:v>
                 </c:pt>
                 <c:pt idx="3">
                   <c:v>11682.47279999999</c:v>
@@ -1635,11 +1684,11 @@
         </c:dLbls>
         <c:marker val="1"/>
         <c:smooth val="0"/>
-        <c:axId val="2126166200"/>
-        <c:axId val="2126169176"/>
+        <c:axId val="-962071664"/>
+        <c:axId val="-962075472"/>
       </c:lineChart>
       <c:catAx>
-        <c:axId val="2126166200"/>
+        <c:axId val="-962071664"/>
         <c:scaling>
           <c:orientation val="minMax"/>
         </c:scaling>
@@ -1649,7 +1698,7 @@
         <c:majorTickMark val="none"/>
         <c:minorTickMark val="none"/>
         <c:tickLblPos val="nextTo"/>
-        <c:crossAx val="2126169176"/>
+        <c:crossAx val="-962075472"/>
         <c:crosses val="autoZero"/>
         <c:auto val="1"/>
         <c:lblAlgn val="ctr"/>
@@ -1657,10 +1706,10 @@
         <c:noMultiLvlLbl val="0"/>
       </c:catAx>
       <c:valAx>
-        <c:axId val="2126169176"/>
+        <c:axId val="-962075472"/>
         <c:scaling>
           <c:orientation val="minMax"/>
-          <c:max val="12000.0"/>
+          <c:max val="12000"/>
         </c:scaling>
         <c:delete val="0"/>
         <c:axPos val="l"/>
@@ -1685,8 +1734,8 @@
             <c:manualLayout>
               <c:xMode val="edge"/>
               <c:yMode val="edge"/>
-              <c:x val="0.0361111111111111"/>
-              <c:y val="0.314215514727326"/>
+              <c:x val="3.6111111111111101E-2"/>
+              <c:y val="0.31421551472732601"/>
             </c:manualLayout>
           </c:layout>
           <c:overlay val="0"/>
@@ -1695,14 +1744,13 @@
         <c:majorTickMark val="none"/>
         <c:minorTickMark val="none"/>
         <c:tickLblPos val="nextTo"/>
-        <c:crossAx val="2126166200"/>
+        <c:crossAx val="-962071664"/>
         <c:crosses val="autoZero"/>
         <c:crossBetween val="between"/>
       </c:valAx>
     </c:plotArea>
     <c:legend>
       <c:legendPos val="r"/>
-      <c:layout/>
       <c:overlay val="0"/>
     </c:legend>
     <c:plotVisOnly val="1"/>
@@ -1776,7 +1824,6 @@
           </a:p>
         </c:rich>
       </c:tx>
-      <c:layout/>
       <c:overlay val="0"/>
       <c:spPr>
         <a:noFill/>
@@ -1793,10 +1840,10 @@
           <c:layoutTarget val="inner"/>
           <c:xMode val="edge"/>
           <c:yMode val="edge"/>
-          <c:x val="0.112808529432038"/>
-          <c:y val="0.128204599425072"/>
-          <c:w val="0.848919141780788"/>
-          <c:h val="0.723951381077365"/>
+          <c:x val="0.11280852943203799"/>
+          <c:y val="0.12820459942507201"/>
+          <c:w val="0.84891914178078798"/>
+          <c:h val="0.72395138107736501"/>
         </c:manualLayout>
       </c:layout>
       <c:barChart>
@@ -1867,7 +1914,6 @@
             <c:showLeaderLines val="0"/>
             <c:extLst>
               <c:ext xmlns:c15="http://schemas.microsoft.com/office/drawing/2012/chart" uri="{CE6537A1-D6FC-4f65-9D91-7224C49458BB}">
-                <c15:layout/>
                 <c15:showLeaderLines val="1"/>
                 <c15:leaderLines>
                   <c:spPr>
@@ -1986,7 +2032,6 @@
             <c:showLeaderLines val="0"/>
             <c:extLst>
               <c:ext xmlns:c15="http://schemas.microsoft.com/office/drawing/2012/chart" uri="{CE6537A1-D6FC-4f65-9D91-7224C49458BB}">
-                <c15:layout/>
                 <c15:showLeaderLines val="1"/>
                 <c15:leaderLines>
                   <c:spPr>
@@ -2105,7 +2150,6 @@
             <c:showLeaderLines val="0"/>
             <c:extLst>
               <c:ext xmlns:c15="http://schemas.microsoft.com/office/drawing/2012/chart" uri="{CE6537A1-D6FC-4f65-9D91-7224C49458BB}">
-                <c15:layout/>
                 <c15:showLeaderLines val="1"/>
                 <c15:leaderLines>
                   <c:spPr>
@@ -2171,11 +2215,11 @@
         </c:dLbls>
         <c:gapWidth val="219"/>
         <c:overlap val="-27"/>
-        <c:axId val="-2145544184"/>
-        <c:axId val="-2145887944"/>
+        <c:axId val="-957428752"/>
+        <c:axId val="-957438000"/>
       </c:barChart>
       <c:catAx>
-        <c:axId val="-2145544184"/>
+        <c:axId val="-957428752"/>
         <c:scaling>
           <c:orientation val="minMax"/>
         </c:scaling>
@@ -2215,7 +2259,7 @@
             <a:endParaRPr lang="en-US"/>
           </a:p>
         </c:txPr>
-        <c:crossAx val="-2145887944"/>
+        <c:crossAx val="-957438000"/>
         <c:crosses val="autoZero"/>
         <c:auto val="1"/>
         <c:lblAlgn val="ctr"/>
@@ -2223,9 +2267,9 @@
         <c:noMultiLvlLbl val="0"/>
       </c:catAx>
       <c:valAx>
-        <c:axId val="-2145887944"/>
+        <c:axId val="-957438000"/>
         <c:scaling>
-          <c:logBase val="10.0"/>
+          <c:logBase val="10"/>
           <c:orientation val="minMax"/>
         </c:scaling>
         <c:delete val="0"/>
@@ -2278,8 +2322,8 @@
             <c:manualLayout>
               <c:xMode val="edge"/>
               <c:yMode val="edge"/>
-              <c:x val="0.0151302280341511"/>
-              <c:y val="0.547839020122485"/>
+              <c:x val="1.5130228034151099E-2"/>
+              <c:y val="0.54783902012248498"/>
             </c:manualLayout>
           </c:layout>
           <c:overlay val="0"/>
@@ -2319,7 +2363,7 @@
             <a:endParaRPr lang="en-US"/>
           </a:p>
         </c:txPr>
-        <c:crossAx val="-2145544184"/>
+        <c:crossAx val="-957428752"/>
         <c:crosses val="autoZero"/>
         <c:crossBetween val="between"/>
       </c:valAx>
@@ -2337,9 +2381,9 @@
         <c:manualLayout>
           <c:xMode val="edge"/>
           <c:yMode val="edge"/>
-          <c:x val="0.87094630300792"/>
-          <c:y val="0.0465373078365204"/>
-          <c:w val="0.0899853718436498"/>
+          <c:x val="0.87094630300791998"/>
+          <c:y val="4.6537307836520402E-2"/>
+          <c:w val="8.9985371843649797E-2"/>
           <c:h val="0.200894263217098"/>
         </c:manualLayout>
       </c:layout>
@@ -2487,7 +2531,6 @@
             <c:showLeaderLines val="0"/>
             <c:extLst>
               <c:ext xmlns:c15="http://schemas.microsoft.com/office/drawing/2012/chart" uri="{CE6537A1-D6FC-4f65-9D91-7224C49458BB}">
-                <c15:layout/>
                 <c15:showLeaderLines val="1"/>
                 <c15:leaderLines>
                   <c:spPr>
@@ -2524,7 +2567,7 @@
                 <c:formatCode>General</c:formatCode>
                 <c:ptCount val="1"/>
                 <c:pt idx="0">
-                  <c:v>981.0</c:v>
+                  <c:v>981</c:v>
                 </c:pt>
               </c:numCache>
             </c:numRef>
@@ -2594,7 +2637,6 @@
             <c:showLeaderLines val="0"/>
             <c:extLst>
               <c:ext xmlns:c15="http://schemas.microsoft.com/office/drawing/2012/chart" uri="{CE6537A1-D6FC-4f65-9D91-7224C49458BB}">
-                <c15:layout/>
                 <c15:showLeaderLines val="1"/>
                 <c15:leaderLines>
                   <c:spPr>
@@ -2631,7 +2673,7 @@
                 <c:formatCode>General</c:formatCode>
                 <c:ptCount val="1"/>
                 <c:pt idx="0">
-                  <c:v>78.0</c:v>
+                  <c:v>78</c:v>
                 </c:pt>
               </c:numCache>
             </c:numRef>
@@ -2679,7 +2721,7 @@
                 <c:formatCode>General</c:formatCode>
                 <c:ptCount val="1"/>
                 <c:pt idx="0">
-                  <c:v>117.0</c:v>
+                  <c:v>117</c:v>
                 </c:pt>
               </c:numCache>
             </c:numRef>
@@ -2727,7 +2769,7 @@
                 <c:formatCode>General</c:formatCode>
                 <c:ptCount val="1"/>
                 <c:pt idx="0">
-                  <c:v>92.0</c:v>
+                  <c:v>92</c:v>
                 </c:pt>
               </c:numCache>
             </c:numRef>
@@ -2775,7 +2817,7 @@
                 <c:formatCode>General</c:formatCode>
                 <c:ptCount val="1"/>
                 <c:pt idx="0">
-                  <c:v>106.0</c:v>
+                  <c:v>106</c:v>
                 </c:pt>
               </c:numCache>
             </c:numRef>
@@ -2823,7 +2865,7 @@
                 <c:formatCode>General</c:formatCode>
                 <c:ptCount val="1"/>
                 <c:pt idx="0">
-                  <c:v>78.0</c:v>
+                  <c:v>78</c:v>
                 </c:pt>
               </c:numCache>
             </c:numRef>
@@ -2871,7 +2913,7 @@
                 <c:formatCode>General</c:formatCode>
                 <c:ptCount val="1"/>
                 <c:pt idx="0">
-                  <c:v>105.0</c:v>
+                  <c:v>105</c:v>
                 </c:pt>
               </c:numCache>
             </c:numRef>
@@ -2919,7 +2961,7 @@
                 <c:formatCode>General</c:formatCode>
                 <c:ptCount val="1"/>
                 <c:pt idx="0">
-                  <c:v>95.0</c:v>
+                  <c:v>95</c:v>
                 </c:pt>
               </c:numCache>
             </c:numRef>
@@ -2967,7 +3009,7 @@
                 <c:formatCode>General</c:formatCode>
                 <c:ptCount val="1"/>
                 <c:pt idx="0">
-                  <c:v>109.0</c:v>
+                  <c:v>109</c:v>
                 </c:pt>
               </c:numCache>
             </c:numRef>
@@ -3015,7 +3057,7 @@
                 <c:formatCode>General</c:formatCode>
                 <c:ptCount val="1"/>
                 <c:pt idx="0">
-                  <c:v>93.0</c:v>
+                  <c:v>93</c:v>
                 </c:pt>
               </c:numCache>
             </c:numRef>
@@ -3063,7 +3105,7 @@
                 <c:formatCode>General</c:formatCode>
                 <c:ptCount val="1"/>
                 <c:pt idx="0">
-                  <c:v>102.0</c:v>
+                  <c:v>102</c:v>
                 </c:pt>
               </c:numCache>
             </c:numRef>
@@ -3111,7 +3153,7 @@
                 <c:formatCode>General</c:formatCode>
                 <c:ptCount val="1"/>
                 <c:pt idx="0">
-                  <c:v>86.0</c:v>
+                  <c:v>86</c:v>
                 </c:pt>
               </c:numCache>
             </c:numRef>
@@ -3159,7 +3201,7 @@
                 <c:formatCode>General</c:formatCode>
                 <c:ptCount val="1"/>
                 <c:pt idx="0">
-                  <c:v>97.0</c:v>
+                  <c:v>97</c:v>
                 </c:pt>
               </c:numCache>
             </c:numRef>
@@ -3207,7 +3249,7 @@
                 <c:formatCode>General</c:formatCode>
                 <c:ptCount val="1"/>
                 <c:pt idx="0">
-                  <c:v>78.0</c:v>
+                  <c:v>78</c:v>
                 </c:pt>
               </c:numCache>
             </c:numRef>
@@ -3255,7 +3297,7 @@
                 <c:formatCode>General</c:formatCode>
                 <c:ptCount val="1"/>
                 <c:pt idx="0">
-                  <c:v>105.0</c:v>
+                  <c:v>105</c:v>
                 </c:pt>
               </c:numCache>
             </c:numRef>
@@ -3303,7 +3345,7 @@
                 <c:formatCode>General</c:formatCode>
                 <c:ptCount val="1"/>
                 <c:pt idx="0">
-                  <c:v>86.0</c:v>
+                  <c:v>86</c:v>
                 </c:pt>
               </c:numCache>
             </c:numRef>
@@ -3351,7 +3393,7 @@
                 <c:formatCode>General</c:formatCode>
                 <c:ptCount val="1"/>
                 <c:pt idx="0">
-                  <c:v>89.0</c:v>
+                  <c:v>89</c:v>
                 </c:pt>
               </c:numCache>
             </c:numRef>
@@ -3399,7 +3441,7 @@
                 <c:formatCode>General</c:formatCode>
                 <c:ptCount val="1"/>
                 <c:pt idx="0">
-                  <c:v>78.0</c:v>
+                  <c:v>78</c:v>
                 </c:pt>
               </c:numCache>
             </c:numRef>
@@ -3447,7 +3489,7 @@
                 <c:formatCode>General</c:formatCode>
                 <c:ptCount val="1"/>
                 <c:pt idx="0">
-                  <c:v>86.0</c:v>
+                  <c:v>86</c:v>
                 </c:pt>
               </c:numCache>
             </c:numRef>
@@ -3495,7 +3537,7 @@
                 <c:formatCode>General</c:formatCode>
                 <c:ptCount val="1"/>
                 <c:pt idx="0">
-                  <c:v>93.0</c:v>
+                  <c:v>93</c:v>
                 </c:pt>
               </c:numCache>
             </c:numRef>
@@ -3543,7 +3585,7 @@
                 <c:formatCode>General</c:formatCode>
                 <c:ptCount val="1"/>
                 <c:pt idx="0">
-                  <c:v>86.0</c:v>
+                  <c:v>86</c:v>
                 </c:pt>
               </c:numCache>
             </c:numRef>
@@ -3591,7 +3633,7 @@
                 <c:formatCode>General</c:formatCode>
                 <c:ptCount val="1"/>
                 <c:pt idx="0">
-                  <c:v>81.0</c:v>
+                  <c:v>81</c:v>
                 </c:pt>
               </c:numCache>
             </c:numRef>
@@ -3639,7 +3681,7 @@
                 <c:formatCode>General</c:formatCode>
                 <c:ptCount val="1"/>
                 <c:pt idx="0">
-                  <c:v>94.0</c:v>
+                  <c:v>94</c:v>
                 </c:pt>
               </c:numCache>
             </c:numRef>
@@ -3687,7 +3729,7 @@
                 <c:formatCode>General</c:formatCode>
                 <c:ptCount val="1"/>
                 <c:pt idx="0">
-                  <c:v>86.0</c:v>
+                  <c:v>86</c:v>
                 </c:pt>
               </c:numCache>
             </c:numRef>
@@ -3735,7 +3777,7 @@
                 <c:formatCode>General</c:formatCode>
                 <c:ptCount val="1"/>
                 <c:pt idx="0">
-                  <c:v>80.0</c:v>
+                  <c:v>80</c:v>
                 </c:pt>
               </c:numCache>
             </c:numRef>
@@ -3783,7 +3825,7 @@
                 <c:formatCode>General</c:formatCode>
                 <c:ptCount val="1"/>
                 <c:pt idx="0">
-                  <c:v>83.0</c:v>
+                  <c:v>83</c:v>
                 </c:pt>
               </c:numCache>
             </c:numRef>
@@ -3831,7 +3873,7 @@
                 <c:formatCode>General</c:formatCode>
                 <c:ptCount val="1"/>
                 <c:pt idx="0">
-                  <c:v>94.0</c:v>
+                  <c:v>94</c:v>
                 </c:pt>
               </c:numCache>
             </c:numRef>
@@ -3879,7 +3921,7 @@
                 <c:formatCode>General</c:formatCode>
                 <c:ptCount val="1"/>
                 <c:pt idx="0">
-                  <c:v>90.0</c:v>
+                  <c:v>90</c:v>
                 </c:pt>
               </c:numCache>
             </c:numRef>
@@ -3927,7 +3969,7 @@
                 <c:formatCode>General</c:formatCode>
                 <c:ptCount val="1"/>
                 <c:pt idx="0">
-                  <c:v>94.0</c:v>
+                  <c:v>94</c:v>
                 </c:pt>
               </c:numCache>
             </c:numRef>
@@ -3975,7 +4017,7 @@
                 <c:formatCode>General</c:formatCode>
                 <c:ptCount val="1"/>
                 <c:pt idx="0">
-                  <c:v>85.0</c:v>
+                  <c:v>85</c:v>
                 </c:pt>
               </c:numCache>
             </c:numRef>
@@ -3991,11 +4033,11 @@
         </c:dLbls>
         <c:gapWidth val="219"/>
         <c:overlap val="-27"/>
-        <c:axId val="2124393240"/>
-        <c:axId val="2124396872"/>
+        <c:axId val="-957429296"/>
+        <c:axId val="-957436912"/>
       </c:barChart>
       <c:catAx>
-        <c:axId val="2124393240"/>
+        <c:axId val="-957429296"/>
         <c:scaling>
           <c:orientation val="minMax"/>
         </c:scaling>
@@ -4038,7 +4080,7 @@
             <a:endParaRPr lang="en-US"/>
           </a:p>
         </c:txPr>
-        <c:crossAx val="2124396872"/>
+        <c:crossAx val="-957436912"/>
         <c:crosses val="autoZero"/>
         <c:auto val="1"/>
         <c:lblAlgn val="ctr"/>
@@ -4046,7 +4088,7 @@
         <c:noMultiLvlLbl val="0"/>
       </c:catAx>
       <c:valAx>
-        <c:axId val="2124396872"/>
+        <c:axId val="-957436912"/>
         <c:scaling>
           <c:orientation val="minMax"/>
         </c:scaling>
@@ -4101,7 +4143,6 @@
               </a:p>
             </c:rich>
           </c:tx>
-          <c:layout/>
           <c:overlay val="0"/>
           <c:spPr>
             <a:noFill/>
@@ -4110,6 +4151,26 @@
             </a:ln>
             <a:effectLst/>
           </c:spPr>
+          <c:txPr>
+            <a:bodyPr rot="-5400000" spcFirstLastPara="1" vertOverflow="ellipsis" vert="horz" wrap="square" anchor="ctr" anchorCtr="1"/>
+            <a:lstStyle/>
+            <a:p>
+              <a:pPr>
+                <a:defRPr sz="1400" b="0" i="0" u="none" strike="noStrike" kern="1200" baseline="0">
+                  <a:solidFill>
+                    <a:schemeClr val="tx1">
+                      <a:lumMod val="50000"/>
+                      <a:lumOff val="50000"/>
+                    </a:schemeClr>
+                  </a:solidFill>
+                  <a:latin typeface="Roboto Condensed" panose="02000000000000000000" pitchFamily="2" charset="0"/>
+                  <a:ea typeface="Roboto Condensed" panose="02000000000000000000" pitchFamily="2" charset="0"/>
+                  <a:cs typeface="+mn-cs"/>
+                </a:defRPr>
+              </a:pPr>
+              <a:endParaRPr lang="en-US"/>
+            </a:p>
+          </c:txPr>
         </c:title>
         <c:numFmt formatCode="General" sourceLinked="1"/>
         <c:majorTickMark val="none"/>
@@ -4142,7 +4203,7 @@
             <a:endParaRPr lang="en-US"/>
           </a:p>
         </c:txPr>
-        <c:crossAx val="2124393240"/>
+        <c:crossAx val="-957429296"/>
         <c:crosses val="autoZero"/>
         <c:crossBetween val="between"/>
       </c:valAx>
@@ -4178,7 +4239,7 @@
       <a:endParaRPr lang="en-US"/>
     </a:p>
   </c:txPr>
-  <c:externalData r:id="rId1">
+  <c:externalData r:id="rId3">
     <c:autoUpdate val="0"/>
   </c:externalData>
 </c:chartSpace>
@@ -4234,25 +4295,25 @@
                   <c:v>239.7</c:v>
                 </c:pt>
                 <c:pt idx="2">
-                  <c:v>288.9333333333333</c:v>
+                  <c:v>288.93333333333328</c:v>
                 </c:pt>
                 <c:pt idx="3">
-                  <c:v>236.4333333333334</c:v>
+                  <c:v>236.43333333333339</c:v>
                 </c:pt>
                 <c:pt idx="4">
                   <c:v>232.8</c:v>
                 </c:pt>
                 <c:pt idx="5">
-                  <c:v>286.3333333333333</c:v>
+                  <c:v>286.33333333333331</c:v>
                 </c:pt>
                 <c:pt idx="6">
-                  <c:v>878.5333333333335</c:v>
+                  <c:v>878.53333333333353</c:v>
                 </c:pt>
                 <c:pt idx="7">
-                  <c:v>851.5333333333335</c:v>
+                  <c:v>851.53333333333353</c:v>
                 </c:pt>
                 <c:pt idx="8">
-                  <c:v>1209.1</c:v>
+                  <c:v>1209.0999999999999</c:v>
                 </c:pt>
               </c:numCache>
             </c:numRef>
@@ -4281,25 +4342,25 @@
                 <c:formatCode>General</c:formatCode>
                 <c:ptCount val="9"/>
                 <c:pt idx="0">
-                  <c:v>559.2666666666666</c:v>
+                  <c:v>559.26666666666665</c:v>
                 </c:pt>
                 <c:pt idx="1">
                   <c:v>493.4666666666667</c:v>
                 </c:pt>
                 <c:pt idx="2">
-                  <c:v>644.6333333333335</c:v>
+                  <c:v>644.63333333333355</c:v>
                 </c:pt>
                 <c:pt idx="3">
-                  <c:v>570.5333333333335</c:v>
+                  <c:v>570.53333333333353</c:v>
                 </c:pt>
                 <c:pt idx="4">
                   <c:v>498.9666666666667</c:v>
                 </c:pt>
                 <c:pt idx="5">
-                  <c:v>649.2666666666666</c:v>
+                  <c:v>649.26666666666665</c:v>
                 </c:pt>
                 <c:pt idx="6">
-                  <c:v>1974.266666666667</c:v>
+                  <c:v>1974.2666666666671</c:v>
                 </c:pt>
                 <c:pt idx="7">
                   <c:v>1523.6</c:v>
@@ -4321,11 +4382,11 @@
         </c:dLbls>
         <c:gapWidth val="110"/>
         <c:overlap val="-27"/>
-        <c:axId val="2125894632"/>
-        <c:axId val="2125901128"/>
+        <c:axId val="-1032350768"/>
+        <c:axId val="-1032349136"/>
       </c:barChart>
       <c:catAx>
-        <c:axId val="2125894632"/>
+        <c:axId val="-1032350768"/>
         <c:scaling>
           <c:orientation val="minMax"/>
         </c:scaling>
@@ -4357,7 +4418,6 @@
               </a:p>
             </c:rich>
           </c:tx>
-          <c:layout/>
           <c:overlay val="0"/>
           <c:spPr>
             <a:noFill/>
@@ -4366,6 +4426,26 @@
             </a:ln>
             <a:effectLst/>
           </c:spPr>
+          <c:txPr>
+            <a:bodyPr rot="0" spcFirstLastPara="1" vertOverflow="ellipsis" vert="horz" wrap="square" anchor="ctr" anchorCtr="1"/>
+            <a:lstStyle/>
+            <a:p>
+              <a:pPr>
+                <a:defRPr sz="1000" b="0" i="0" u="none" strike="noStrike" kern="1200" baseline="0">
+                  <a:solidFill>
+                    <a:schemeClr val="tx1">
+                      <a:lumMod val="65000"/>
+                      <a:lumOff val="35000"/>
+                    </a:schemeClr>
+                  </a:solidFill>
+                  <a:latin typeface="+mn-lt"/>
+                  <a:ea typeface="+mn-ea"/>
+                  <a:cs typeface="+mn-cs"/>
+                </a:defRPr>
+              </a:pPr>
+              <a:endParaRPr lang="en-US"/>
+            </a:p>
+          </c:txPr>
         </c:title>
         <c:majorTickMark val="none"/>
         <c:minorTickMark val="none"/>
@@ -4403,7 +4483,7 @@
             <a:endParaRPr lang="en-US"/>
           </a:p>
         </c:txPr>
-        <c:crossAx val="2125901128"/>
+        <c:crossAx val="-1032349136"/>
         <c:crosses val="autoZero"/>
         <c:auto val="1"/>
         <c:lblAlgn val="ctr"/>
@@ -4411,10 +4491,10 @@
         <c:noMultiLvlLbl val="0"/>
       </c:catAx>
       <c:valAx>
-        <c:axId val="2125901128"/>
+        <c:axId val="-1032349136"/>
         <c:scaling>
           <c:orientation val="minMax"/>
-          <c:max val="2500.0"/>
+          <c:max val="2500"/>
         </c:scaling>
         <c:delete val="0"/>
         <c:axPos val="l"/>
@@ -4458,7 +4538,6 @@
               </a:p>
             </c:rich>
           </c:tx>
-          <c:layout/>
           <c:overlay val="0"/>
           <c:spPr>
             <a:noFill/>
@@ -4467,6 +4546,26 @@
             </a:ln>
             <a:effectLst/>
           </c:spPr>
+          <c:txPr>
+            <a:bodyPr rot="-5400000" spcFirstLastPara="1" vertOverflow="ellipsis" vert="horz" wrap="square" anchor="ctr" anchorCtr="1"/>
+            <a:lstStyle/>
+            <a:p>
+              <a:pPr>
+                <a:defRPr sz="1400" b="0" i="0" u="none" strike="noStrike" kern="1200" baseline="0">
+                  <a:solidFill>
+                    <a:schemeClr val="tx1">
+                      <a:lumMod val="65000"/>
+                      <a:lumOff val="35000"/>
+                    </a:schemeClr>
+                  </a:solidFill>
+                  <a:latin typeface="+mn-lt"/>
+                  <a:ea typeface="+mn-ea"/>
+                  <a:cs typeface="+mn-cs"/>
+                </a:defRPr>
+              </a:pPr>
+              <a:endParaRPr lang="en-US"/>
+            </a:p>
+          </c:txPr>
         </c:title>
         <c:numFmt formatCode="General" sourceLinked="1"/>
         <c:majorTickMark val="none"/>
@@ -4499,7 +4598,7 @@
             <a:endParaRPr lang="en-US"/>
           </a:p>
         </c:txPr>
-        <c:crossAx val="2125894632"/>
+        <c:crossAx val="-1032350768"/>
         <c:crosses val="autoZero"/>
         <c:crossBetween val="between"/>
       </c:valAx>
@@ -4517,10 +4616,10 @@
         <c:manualLayout>
           <c:xMode val="edge"/>
           <c:yMode val="edge"/>
-          <c:x val="0.787148388029513"/>
-          <c:y val="0.0641696455773179"/>
-          <c:w val="0.116592825896763"/>
-          <c:h val="0.125000874890639"/>
+          <c:x val="0.78714838802951304"/>
+          <c:y val="6.4169645577317899E-2"/>
+          <c:w val="0.11659282589676299"/>
+          <c:h val="0.12500087489063899"/>
         </c:manualLayout>
       </c:layout>
       <c:overlay val="1"/>
@@ -4573,10 +4672,10 @@
       <a:endParaRPr lang="en-US"/>
     </a:p>
   </c:txPr>
-  <c:externalData r:id="rId1">
+  <c:externalData r:id="rId3">
     <c:autoUpdate val="0"/>
   </c:externalData>
-  <c:userShapes r:id="rId2"/>
+  <c:userShapes r:id="rId4"/>
 </c:chartSpace>
 </file>
 
@@ -4625,7 +4724,6 @@
           </a:p>
         </c:rich>
       </c:tx>
-      <c:layout/>
       <c:overlay val="0"/>
       <c:spPr>
         <a:noFill/>
@@ -4634,6 +4732,26 @@
         </a:ln>
         <a:effectLst/>
       </c:spPr>
+      <c:txPr>
+        <a:bodyPr rot="0" spcFirstLastPara="1" vertOverflow="ellipsis" vert="horz" wrap="square" anchor="ctr" anchorCtr="1"/>
+        <a:lstStyle/>
+        <a:p>
+          <a:pPr>
+            <a:defRPr sz="1600" b="0" i="0" u="none" strike="noStrike" kern="1200" spc="0" baseline="0">
+              <a:solidFill>
+                <a:schemeClr val="tx1">
+                  <a:lumMod val="65000"/>
+                  <a:lumOff val="35000"/>
+                </a:schemeClr>
+              </a:solidFill>
+              <a:latin typeface="+mn-lt"/>
+              <a:ea typeface="+mn-ea"/>
+              <a:cs typeface="+mn-cs"/>
+            </a:defRPr>
+          </a:pPr>
+          <a:endParaRPr lang="en-US"/>
+        </a:p>
+      </c:txPr>
     </c:title>
     <c:autoTitleDeleted val="0"/>
     <c:plotArea>
@@ -4662,94 +4780,94 @@
                 <c:formatCode>General</c:formatCode>
                 <c:ptCount val="30"/>
                 <c:pt idx="0">
-                  <c:v>14283.0</c:v>
+                  <c:v>14283</c:v>
                 </c:pt>
                 <c:pt idx="1">
-                  <c:v>13797.0</c:v>
+                  <c:v>13797</c:v>
                 </c:pt>
                 <c:pt idx="2">
-                  <c:v>10101.0</c:v>
+                  <c:v>10101</c:v>
                 </c:pt>
                 <c:pt idx="3">
-                  <c:v>8899.0</c:v>
+                  <c:v>8899</c:v>
                 </c:pt>
                 <c:pt idx="4">
-                  <c:v>8847.0</c:v>
+                  <c:v>8847</c:v>
                 </c:pt>
                 <c:pt idx="5">
-                  <c:v>8779.0</c:v>
+                  <c:v>8779</c:v>
                 </c:pt>
                 <c:pt idx="6">
-                  <c:v>8801.0</c:v>
+                  <c:v>8801</c:v>
                 </c:pt>
                 <c:pt idx="7">
-                  <c:v>8706.0</c:v>
+                  <c:v>8706</c:v>
                 </c:pt>
                 <c:pt idx="8">
-                  <c:v>8735.0</c:v>
+                  <c:v>8735</c:v>
                 </c:pt>
                 <c:pt idx="9">
-                  <c:v>13375.0</c:v>
+                  <c:v>13375</c:v>
                 </c:pt>
                 <c:pt idx="10">
-                  <c:v>13482.0</c:v>
+                  <c:v>13482</c:v>
                 </c:pt>
                 <c:pt idx="11">
-                  <c:v>13507.0</c:v>
+                  <c:v>13507</c:v>
                 </c:pt>
                 <c:pt idx="12">
-                  <c:v>13475.0</c:v>
+                  <c:v>13475</c:v>
                 </c:pt>
                 <c:pt idx="13">
-                  <c:v>12429.0</c:v>
+                  <c:v>12429</c:v>
                 </c:pt>
                 <c:pt idx="14">
-                  <c:v>8759.0</c:v>
+                  <c:v>8759</c:v>
                 </c:pt>
                 <c:pt idx="15">
-                  <c:v>8621.0</c:v>
+                  <c:v>8621</c:v>
                 </c:pt>
                 <c:pt idx="16">
-                  <c:v>8753.0</c:v>
+                  <c:v>8753</c:v>
                 </c:pt>
                 <c:pt idx="17">
-                  <c:v>8713.0</c:v>
+                  <c:v>8713</c:v>
                 </c:pt>
                 <c:pt idx="18">
-                  <c:v>8568.0</c:v>
+                  <c:v>8568</c:v>
                 </c:pt>
                 <c:pt idx="19">
-                  <c:v>8696.0</c:v>
+                  <c:v>8696</c:v>
                 </c:pt>
                 <c:pt idx="20">
-                  <c:v>10148.0</c:v>
+                  <c:v>10148</c:v>
                 </c:pt>
                 <c:pt idx="21">
-                  <c:v>13586.0</c:v>
+                  <c:v>13586</c:v>
                 </c:pt>
                 <c:pt idx="22">
-                  <c:v>13762.0</c:v>
+                  <c:v>13762</c:v>
                 </c:pt>
                 <c:pt idx="23">
-                  <c:v>13559.0</c:v>
+                  <c:v>13559</c:v>
                 </c:pt>
                 <c:pt idx="24">
-                  <c:v>13935.0</c:v>
+                  <c:v>13935</c:v>
                 </c:pt>
                 <c:pt idx="25">
-                  <c:v>10506.0</c:v>
+                  <c:v>10506</c:v>
                 </c:pt>
                 <c:pt idx="26">
-                  <c:v>8689.0</c:v>
+                  <c:v>8689</c:v>
                 </c:pt>
                 <c:pt idx="27">
-                  <c:v>8670.0</c:v>
+                  <c:v>8670</c:v>
                 </c:pt>
                 <c:pt idx="28">
-                  <c:v>8494.0</c:v>
+                  <c:v>8494</c:v>
                 </c:pt>
                 <c:pt idx="29">
-                  <c:v>8724.0</c:v>
+                  <c:v>8724</c:v>
                 </c:pt>
               </c:numCache>
             </c:numRef>
@@ -4765,11 +4883,11 @@
         </c:dLbls>
         <c:gapWidth val="75"/>
         <c:overlap val="-27"/>
-        <c:axId val="2125833960"/>
-        <c:axId val="2125828456"/>
+        <c:axId val="-1032350224"/>
+        <c:axId val="-1032348048"/>
       </c:barChart>
       <c:catAx>
-        <c:axId val="2125833960"/>
+        <c:axId val="-1032350224"/>
         <c:scaling>
           <c:orientation val="minMax"/>
         </c:scaling>
@@ -4806,7 +4924,6 @@
               </a:p>
             </c:rich>
           </c:tx>
-          <c:layout/>
           <c:overlay val="0"/>
           <c:spPr>
             <a:noFill/>
@@ -4815,6 +4932,26 @@
             </a:ln>
             <a:effectLst/>
           </c:spPr>
+          <c:txPr>
+            <a:bodyPr rot="0" spcFirstLastPara="1" vertOverflow="ellipsis" vert="horz" wrap="square" anchor="ctr" anchorCtr="1"/>
+            <a:lstStyle/>
+            <a:p>
+              <a:pPr>
+                <a:defRPr sz="1600" b="0" i="0" u="none" strike="noStrike" kern="1200" baseline="0">
+                  <a:solidFill>
+                    <a:schemeClr val="tx1">
+                      <a:lumMod val="65000"/>
+                      <a:lumOff val="35000"/>
+                    </a:schemeClr>
+                  </a:solidFill>
+                  <a:latin typeface="+mn-lt"/>
+                  <a:ea typeface="+mn-ea"/>
+                  <a:cs typeface="+mn-cs"/>
+                </a:defRPr>
+              </a:pPr>
+              <a:endParaRPr lang="en-US"/>
+            </a:p>
+          </c:txPr>
         </c:title>
         <c:majorTickMark val="none"/>
         <c:minorTickMark val="none"/>
@@ -4852,7 +4989,7 @@
             <a:endParaRPr lang="en-US"/>
           </a:p>
         </c:txPr>
-        <c:crossAx val="2125828456"/>
+        <c:crossAx val="-1032348048"/>
         <c:crosses val="autoZero"/>
         <c:auto val="1"/>
         <c:lblAlgn val="ctr"/>
@@ -4860,7 +4997,7 @@
         <c:noMultiLvlLbl val="0"/>
       </c:catAx>
       <c:valAx>
-        <c:axId val="2125828456"/>
+        <c:axId val="-1032348048"/>
         <c:scaling>
           <c:orientation val="minMax"/>
         </c:scaling>
@@ -4906,7 +5043,6 @@
               </a:p>
             </c:rich>
           </c:tx>
-          <c:layout/>
           <c:overlay val="0"/>
           <c:spPr>
             <a:noFill/>
@@ -4915,6 +5051,26 @@
             </a:ln>
             <a:effectLst/>
           </c:spPr>
+          <c:txPr>
+            <a:bodyPr rot="-5400000" spcFirstLastPara="1" vertOverflow="ellipsis" vert="horz" wrap="square" anchor="ctr" anchorCtr="1"/>
+            <a:lstStyle/>
+            <a:p>
+              <a:pPr>
+                <a:defRPr sz="1600" b="0" i="0" u="none" strike="noStrike" kern="1200" baseline="0">
+                  <a:solidFill>
+                    <a:schemeClr val="tx1">
+                      <a:lumMod val="65000"/>
+                      <a:lumOff val="35000"/>
+                    </a:schemeClr>
+                  </a:solidFill>
+                  <a:latin typeface="+mn-lt"/>
+                  <a:ea typeface="+mn-ea"/>
+                  <a:cs typeface="+mn-cs"/>
+                </a:defRPr>
+              </a:pPr>
+              <a:endParaRPr lang="en-US"/>
+            </a:p>
+          </c:txPr>
         </c:title>
         <c:numFmt formatCode="General" sourceLinked="1"/>
         <c:majorTickMark val="none"/>
@@ -4947,7 +5103,7 @@
             <a:endParaRPr lang="en-US"/>
           </a:p>
         </c:txPr>
-        <c:crossAx val="2125833960"/>
+        <c:crossAx val="-1032350224"/>
         <c:crosses val="autoZero"/>
         <c:crossBetween val="between"/>
       </c:valAx>
@@ -4980,7 +5136,7 @@
       <a:endParaRPr lang="en-US"/>
     </a:p>
   </c:txPr>
-  <c:externalData r:id="rId1">
+  <c:externalData r:id="rId3">
     <c:autoUpdate val="0"/>
   </c:externalData>
 </c:chartSpace>
@@ -5016,7 +5172,6 @@
           </a:p>
         </c:rich>
       </c:tx>
-      <c:layout/>
       <c:overlay val="0"/>
     </c:title>
     <c:autoTitleDeleted val="0"/>
@@ -5027,9 +5182,9 @@
           <c:xMode val="edge"/>
           <c:yMode val="edge"/>
           <c:x val="0.135497976895952"/>
-          <c:y val="0.295672073969554"/>
+          <c:y val="0.29567207396955397"/>
           <c:w val="0.51103208303059"/>
-          <c:h val="0.624121166693464"/>
+          <c:h val="0.62412116669346396"/>
         </c:manualLayout>
       </c:layout>
       <c:radarChart>
@@ -5071,16 +5226,16 @@
                 <c:formatCode>General</c:formatCode>
                 <c:ptCount val="5"/>
                 <c:pt idx="0">
-                  <c:v>0.311166666666667</c:v>
+                  <c:v>0.31116666666666698</c:v>
                 </c:pt>
                 <c:pt idx="1">
-                  <c:v>5.324066666666639</c:v>
+                  <c:v>5.3240666666666394</c:v>
                 </c:pt>
                 <c:pt idx="2">
-                  <c:v>0.417033333333333</c:v>
+                  <c:v>0.41703333333333298</c:v>
                 </c:pt>
                 <c:pt idx="3">
-                  <c:v>1.8029</c:v>
+                  <c:v>1.8028999999999999</c:v>
                 </c:pt>
                 <c:pt idx="4">
                   <c:v>2.437533333333334</c:v>
@@ -5125,19 +5280,19 @@
                 <c:formatCode>General</c:formatCode>
                 <c:ptCount val="5"/>
                 <c:pt idx="0">
-                  <c:v>1.718866666666666</c:v>
+                  <c:v>1.7188666666666661</c:v>
                 </c:pt>
                 <c:pt idx="1">
-                  <c:v>4.354466666666647</c:v>
+                  <c:v>4.3544666666666467</c:v>
                 </c:pt>
                 <c:pt idx="2">
-                  <c:v>2.057566666666666</c:v>
+                  <c:v>2.0575666666666659</c:v>
                 </c:pt>
                 <c:pt idx="3">
-                  <c:v>6.886933333333332</c:v>
+                  <c:v>6.8869333333333316</c:v>
                 </c:pt>
                 <c:pt idx="4">
-                  <c:v>3.95693333333333</c:v>
+                  <c:v>3.9569333333333301</c:v>
                 </c:pt>
               </c:numCache>
             </c:numRef>
@@ -5151,11 +5306,11 @@
           <c:showPercent val="0"/>
           <c:showBubbleSize val="0"/>
         </c:dLbls>
-        <c:axId val="2125045928"/>
-        <c:axId val="2125049176"/>
+        <c:axId val="-1245306224"/>
+        <c:axId val="-1245318736"/>
       </c:radarChart>
       <c:catAx>
-        <c:axId val="2125045928"/>
+        <c:axId val="-1245306224"/>
         <c:scaling>
           <c:orientation val="minMax"/>
         </c:scaling>
@@ -5171,7 +5326,7 @@
             <a:noFill/>
           </a:ln>
         </c:spPr>
-        <c:crossAx val="2125049176"/>
+        <c:crossAx val="-1245318736"/>
         <c:crosses val="autoZero"/>
         <c:auto val="1"/>
         <c:lblAlgn val="ctr"/>
@@ -5179,7 +5334,7 @@
         <c:noMultiLvlLbl val="0"/>
       </c:catAx>
       <c:valAx>
-        <c:axId val="2125049176"/>
+        <c:axId val="-1245318736"/>
         <c:scaling>
           <c:orientation val="minMax"/>
         </c:scaling>
@@ -5190,7 +5345,7 @@
         <c:majorTickMark val="none"/>
         <c:minorTickMark val="none"/>
         <c:tickLblPos val="nextTo"/>
-        <c:crossAx val="2125045928"/>
+        <c:crossAx val="-1245306224"/>
         <c:crosses val="autoZero"/>
         <c:crossBetween val="between"/>
       </c:valAx>
@@ -5201,10 +5356,10 @@
         <c:manualLayout>
           <c:xMode val="edge"/>
           <c:yMode val="edge"/>
-          <c:x val="0.739797584845146"/>
-          <c:y val="0.408928577139765"/>
-          <c:w val="0.221859628657529"/>
-          <c:h val="0.305450993581917"/>
+          <c:x val="0.73979758484514602"/>
+          <c:y val="0.40892857713976499"/>
+          <c:w val="0.22185962865752901"/>
+          <c:h val="0.30545099358191702"/>
         </c:manualLayout>
       </c:layout>
       <c:overlay val="0"/>
@@ -5249,7 +5404,6 @@
           </a:p>
         </c:rich>
       </c:tx>
-      <c:layout/>
       <c:overlay val="0"/>
     </c:title>
     <c:autoTitleDeleted val="0"/>
@@ -5259,10 +5413,10 @@
           <c:layoutTarget val="inner"/>
           <c:xMode val="edge"/>
           <c:yMode val="edge"/>
-          <c:x val="0.0991368738824105"/>
-          <c:y val="0.244850840453454"/>
+          <c:x val="9.9136873882410506E-2"/>
+          <c:y val="0.24485084045345401"/>
           <c:w val="0.48494709733538"/>
-          <c:h val="0.698289142478447"/>
+          <c:h val="0.69828914247844698"/>
         </c:manualLayout>
       </c:layout>
       <c:radarChart>
@@ -5307,7 +5461,7 @@
                   <c:v>1.163866666666667</c:v>
                 </c:pt>
                 <c:pt idx="1">
-                  <c:v>43.3851</c:v>
+                  <c:v>43.385100000000001</c:v>
                 </c:pt>
                 <c:pt idx="2">
                   <c:v>1.687433333333334</c:v>
@@ -5316,7 +5470,7 @@
                   <c:v>14.88473333333333</c:v>
                 </c:pt>
                 <c:pt idx="4">
-                  <c:v>25.78506666666667</c:v>
+                  <c:v>25.785066666666669</c:v>
                 </c:pt>
               </c:numCache>
             </c:numRef>
@@ -5361,13 +5515,13 @@
                   <c:v>4.200433333333331</c:v>
                 </c:pt>
                 <c:pt idx="1">
-                  <c:v>23.35579999999998</c:v>
+                  <c:v>23.355799999999981</c:v>
                 </c:pt>
                 <c:pt idx="2">
-                  <c:v>7.8892</c:v>
+                  <c:v>7.8891999999999998</c:v>
                 </c:pt>
                 <c:pt idx="3">
-                  <c:v>54.04926666666633</c:v>
+                  <c:v>54.049266666666327</c:v>
                 </c:pt>
                 <c:pt idx="4">
                   <c:v>10.9564</c:v>
@@ -5384,11 +5538,11 @@
           <c:showPercent val="0"/>
           <c:showBubbleSize val="0"/>
         </c:dLbls>
-        <c:axId val="2125076696"/>
-        <c:axId val="2125079944"/>
+        <c:axId val="-961880848"/>
+        <c:axId val="-961878672"/>
       </c:radarChart>
       <c:catAx>
-        <c:axId val="2125076696"/>
+        <c:axId val="-961880848"/>
         <c:scaling>
           <c:orientation val="minMax"/>
         </c:scaling>
@@ -5404,7 +5558,7 @@
             <a:noFill/>
           </a:ln>
         </c:spPr>
-        <c:crossAx val="2125079944"/>
+        <c:crossAx val="-961878672"/>
         <c:crosses val="autoZero"/>
         <c:auto val="1"/>
         <c:lblAlgn val="ctr"/>
@@ -5412,7 +5566,7 @@
         <c:noMultiLvlLbl val="0"/>
       </c:catAx>
       <c:valAx>
-        <c:axId val="2125079944"/>
+        <c:axId val="-961878672"/>
         <c:scaling>
           <c:orientation val="minMax"/>
         </c:scaling>
@@ -5423,7 +5577,7 @@
         <c:majorTickMark val="none"/>
         <c:minorTickMark val="none"/>
         <c:tickLblPos val="nextTo"/>
-        <c:crossAx val="2125076696"/>
+        <c:crossAx val="-961880848"/>
         <c:crosses val="autoZero"/>
         <c:crossBetween val="between"/>
       </c:valAx>
@@ -5434,10 +5588,10 @@
         <c:manualLayout>
           <c:xMode val="edge"/>
           <c:yMode val="edge"/>
-          <c:x val="0.67909197196012"/>
-          <c:y val="0.545517183841381"/>
-          <c:w val="0.232994841162096"/>
-          <c:h val="0.21902808957391"/>
+          <c:x val="0.67909197196012006"/>
+          <c:y val="0.54551718384138104"/>
+          <c:w val="0.23299484116209601"/>
+          <c:h val="0.21902808957391001"/>
         </c:manualLayout>
       </c:layout>
       <c:overlay val="0"/>
@@ -5482,7 +5636,6 @@
           </a:p>
         </c:rich>
       </c:tx>
-      <c:layout/>
       <c:overlay val="0"/>
     </c:title>
     <c:autoTitleDeleted val="0"/>
@@ -5492,10 +5645,10 @@
           <c:layoutTarget val="inner"/>
           <c:xMode val="edge"/>
           <c:yMode val="edge"/>
-          <c:x val="0.144689323710024"/>
-          <c:y val="0.267895475266261"/>
-          <c:w val="0.490277429763724"/>
-          <c:h val="0.635258719265882"/>
+          <c:x val="0.14468932371002399"/>
+          <c:y val="0.26789547526626101"/>
+          <c:w val="0.49027742976372402"/>
+          <c:h val="0.63525871926588195"/>
         </c:manualLayout>
       </c:layout>
       <c:radarChart>
@@ -5537,10 +5690,10 @@
                 <c:formatCode>General</c:formatCode>
                 <c:ptCount val="5"/>
                 <c:pt idx="0">
-                  <c:v>9.580100000000001</c:v>
+                  <c:v>9.5801000000000016</c:v>
                 </c:pt>
                 <c:pt idx="1">
-                  <c:v>577.2221666666666</c:v>
+                  <c:v>577.22216666666657</c:v>
                 </c:pt>
                 <c:pt idx="2">
                   <c:v>13.33123333333333</c:v>
@@ -5571,19 +5724,19 @@
                 <c:formatCode>General</c:formatCode>
                 <c:ptCount val="5"/>
                 <c:pt idx="0">
-                  <c:v>34.6763</c:v>
+                  <c:v>34.676299999999998</c:v>
                 </c:pt>
                 <c:pt idx="1">
-                  <c:v>332.8497666666665</c:v>
+                  <c:v>332.84976666666648</c:v>
                 </c:pt>
                 <c:pt idx="2">
-                  <c:v>32.3161333333333</c:v>
+                  <c:v>32.316133333333298</c:v>
                 </c:pt>
                 <c:pt idx="3">
-                  <c:v>702.753566666667</c:v>
+                  <c:v>702.75356666666698</c:v>
                 </c:pt>
                 <c:pt idx="4">
-                  <c:v>75.7799</c:v>
+                  <c:v>75.779899999999998</c:v>
                 </c:pt>
               </c:numCache>
             </c:numRef>
@@ -5597,11 +5750,11 @@
           <c:showPercent val="0"/>
           <c:showBubbleSize val="0"/>
         </c:dLbls>
-        <c:axId val="2125147320"/>
-        <c:axId val="2125150504"/>
+        <c:axId val="-961883568"/>
+        <c:axId val="-961879216"/>
       </c:radarChart>
       <c:catAx>
-        <c:axId val="2125147320"/>
+        <c:axId val="-961883568"/>
         <c:scaling>
           <c:orientation val="minMax"/>
         </c:scaling>
@@ -5617,7 +5770,7 @@
             <a:noFill/>
           </a:ln>
         </c:spPr>
-        <c:crossAx val="2125150504"/>
+        <c:crossAx val="-961879216"/>
         <c:crosses val="autoZero"/>
         <c:auto val="1"/>
         <c:lblAlgn val="ctr"/>
@@ -5625,7 +5778,7 @@
         <c:noMultiLvlLbl val="0"/>
       </c:catAx>
       <c:valAx>
-        <c:axId val="2125150504"/>
+        <c:axId val="-961879216"/>
         <c:scaling>
           <c:orientation val="minMax"/>
         </c:scaling>
@@ -5636,7 +5789,7 @@
         <c:majorTickMark val="none"/>
         <c:minorTickMark val="none"/>
         <c:tickLblPos val="nextTo"/>
-        <c:crossAx val="2125147320"/>
+        <c:crossAx val="-961883568"/>
         <c:crosses val="autoZero"/>
         <c:crossBetween val="between"/>
       </c:valAx>
@@ -5647,10 +5800,10 @@
         <c:manualLayout>
           <c:xMode val="edge"/>
           <c:yMode val="edge"/>
-          <c:x val="0.696359193345346"/>
+          <c:x val="0.69635919334534602"/>
           <c:y val="0.519204180201017"/>
-          <c:w val="0.224430676572952"/>
-          <c:h val="0.23791006955664"/>
+          <c:w val="0.22443067657295199"/>
+          <c:h val="0.23791006955664001"/>
         </c:manualLayout>
       </c:layout>
       <c:overlay val="0"/>
@@ -5696,7 +5849,6 @@
           </a:p>
         </c:rich>
       </c:tx>
-      <c:layout/>
       <c:overlay val="0"/>
     </c:title>
     <c:autoTitleDeleted val="0"/>
@@ -5708,8 +5860,8 @@
           <c:yMode val="edge"/>
           <c:x val="0.124351598594812"/>
           <c:y val="0.256551216842067"/>
-          <c:w val="0.492471966181835"/>
-          <c:h val="0.668269485775889"/>
+          <c:w val="0.49247196618183497"/>
+          <c:h val="0.66826948577588896"/>
         </c:manualLayout>
       </c:layout>
       <c:radarChart>
@@ -5756,13 +5908,13 @@
                   <c:v>128.172</c:v>
                 </c:pt>
                 <c:pt idx="1">
-                  <c:v>6919.294933333334</c:v>
+                  <c:v>6919.2949333333336</c:v>
                 </c:pt>
                 <c:pt idx="2">
-                  <c:v>129.7343666666667</c:v>
+                  <c:v>129.73436666666669</c:v>
                 </c:pt>
                 <c:pt idx="3">
-                  <c:v>1921.3449</c:v>
+                  <c:v>1921.3449000000001</c:v>
                 </c:pt>
                 <c:pt idx="4">
                   <c:v>2855.033333333336</c:v>
@@ -5799,7 +5951,7 @@
                   <c:v>11682.47279999999</c:v>
                 </c:pt>
                 <c:pt idx="4">
-                  <c:v>478.1699666666665</c:v>
+                  <c:v>478.16996666666648</c:v>
                 </c:pt>
               </c:numCache>
             </c:numRef>
@@ -5813,11 +5965,11 @@
           <c:showPercent val="0"/>
           <c:showBubbleSize val="0"/>
         </c:dLbls>
-        <c:axId val="2125178488"/>
-        <c:axId val="2125181688"/>
+        <c:axId val="-961877584"/>
+        <c:axId val="-961880304"/>
       </c:radarChart>
       <c:catAx>
-        <c:axId val="2125178488"/>
+        <c:axId val="-961877584"/>
         <c:scaling>
           <c:orientation val="minMax"/>
         </c:scaling>
@@ -5833,7 +5985,7 @@
             <a:noFill/>
           </a:ln>
         </c:spPr>
-        <c:crossAx val="2125181688"/>
+        <c:crossAx val="-961880304"/>
         <c:crosses val="autoZero"/>
         <c:auto val="1"/>
         <c:lblAlgn val="ctr"/>
@@ -5841,7 +5993,7 @@
         <c:noMultiLvlLbl val="0"/>
       </c:catAx>
       <c:valAx>
-        <c:axId val="2125181688"/>
+        <c:axId val="-961880304"/>
         <c:scaling>
           <c:orientation val="minMax"/>
         </c:scaling>
@@ -5852,7 +6004,7 @@
         <c:majorTickMark val="none"/>
         <c:minorTickMark val="none"/>
         <c:tickLblPos val="nextTo"/>
-        <c:crossAx val="2125178488"/>
+        <c:crossAx val="-961877584"/>
         <c:crosses val="autoZero"/>
         <c:crossBetween val="between"/>
       </c:valAx>
@@ -5863,10 +6015,10 @@
         <c:manualLayout>
           <c:xMode val="edge"/>
           <c:yMode val="edge"/>
-          <c:x val="0.672555057966679"/>
-          <c:y val="0.474332550536446"/>
-          <c:w val="0.202463366168298"/>
-          <c:h val="0.180115815119523"/>
+          <c:x val="0.67255505796667903"/>
+          <c:y val="0.47433255053644602"/>
+          <c:w val="0.20246336616829799"/>
+          <c:h val="0.18011581511952299"/>
         </c:manualLayout>
       </c:layout>
       <c:overlay val="0"/>
@@ -5911,7 +6063,6 @@
           </a:p>
         </c:rich>
       </c:tx>
-      <c:layout/>
       <c:overlay val="0"/>
     </c:title>
     <c:autoTitleDeleted val="0"/>
@@ -5933,16 +6084,16 @@
                 <c:formatCode>General</c:formatCode>
                 <c:ptCount val="4"/>
                 <c:pt idx="0">
-                  <c:v>1000.0</c:v>
+                  <c:v>1000</c:v>
                 </c:pt>
                 <c:pt idx="1">
-                  <c:v>10000.0</c:v>
+                  <c:v>10000</c:v>
                 </c:pt>
                 <c:pt idx="2">
-                  <c:v>100000.0</c:v>
+                  <c:v>100000</c:v>
                 </c:pt>
                 <c:pt idx="3">
-                  <c:v>1.0E6</c:v>
+                  <c:v>1000000</c:v>
                 </c:pt>
               </c:numCache>
             </c:numRef>
@@ -5957,7 +6108,7 @@
                   <c:v>2.437533333333334</c:v>
                 </c:pt>
                 <c:pt idx="1">
-                  <c:v>25.78506666666667</c:v>
+                  <c:v>25.785066666666669</c:v>
                 </c:pt>
                 <c:pt idx="2">
                   <c:v>245.6928333333334</c:v>
@@ -5983,16 +6134,16 @@
                 <c:formatCode>General</c:formatCode>
                 <c:ptCount val="4"/>
                 <c:pt idx="0">
-                  <c:v>1000.0</c:v>
+                  <c:v>1000</c:v>
                 </c:pt>
                 <c:pt idx="1">
-                  <c:v>10000.0</c:v>
+                  <c:v>10000</c:v>
                 </c:pt>
                 <c:pt idx="2">
-                  <c:v>100000.0</c:v>
+                  <c:v>100000</c:v>
                 </c:pt>
                 <c:pt idx="3">
-                  <c:v>1.0E6</c:v>
+                  <c:v>1000000</c:v>
                 </c:pt>
               </c:numCache>
             </c:numRef>
@@ -6004,16 +6155,16 @@
                 <c:formatCode>General</c:formatCode>
                 <c:ptCount val="4"/>
                 <c:pt idx="0">
-                  <c:v>3.95693333333333</c:v>
+                  <c:v>3.9569333333333301</c:v>
                 </c:pt>
                 <c:pt idx="1">
                   <c:v>10.9564</c:v>
                 </c:pt>
                 <c:pt idx="2">
-                  <c:v>75.7799</c:v>
+                  <c:v>75.779899999999998</c:v>
                 </c:pt>
                 <c:pt idx="3">
-                  <c:v>478.1699666666665</c:v>
+                  <c:v>478.16996666666648</c:v>
                 </c:pt>
               </c:numCache>
             </c:numRef>
@@ -6030,11 +6181,11 @@
         </c:dLbls>
         <c:marker val="1"/>
         <c:smooth val="0"/>
-        <c:axId val="2125387368"/>
-        <c:axId val="2125390344"/>
+        <c:axId val="-961881936"/>
+        <c:axId val="-962065680"/>
       </c:lineChart>
       <c:catAx>
-        <c:axId val="2125387368"/>
+        <c:axId val="-961881936"/>
         <c:scaling>
           <c:orientation val="minMax"/>
         </c:scaling>
@@ -6044,7 +6195,7 @@
         <c:majorTickMark val="none"/>
         <c:minorTickMark val="none"/>
         <c:tickLblPos val="nextTo"/>
-        <c:crossAx val="2125390344"/>
+        <c:crossAx val="-962065680"/>
         <c:crosses val="autoZero"/>
         <c:auto val="1"/>
         <c:lblAlgn val="ctr"/>
@@ -6052,7 +6203,7 @@
         <c:noMultiLvlLbl val="0"/>
       </c:catAx>
       <c:valAx>
-        <c:axId val="2125390344"/>
+        <c:axId val="-962065680"/>
         <c:scaling>
           <c:orientation val="minMax"/>
         </c:scaling>
@@ -6075,21 +6226,19 @@
               </a:p>
             </c:rich>
           </c:tx>
-          <c:layout/>
           <c:overlay val="0"/>
         </c:title>
         <c:numFmt formatCode="General" sourceLinked="1"/>
         <c:majorTickMark val="none"/>
         <c:minorTickMark val="none"/>
         <c:tickLblPos val="nextTo"/>
-        <c:crossAx val="2125387368"/>
+        <c:crossAx val="-961881936"/>
         <c:crosses val="autoZero"/>
         <c:crossBetween val="between"/>
       </c:valAx>
     </c:plotArea>
     <c:legend>
       <c:legendPos val="r"/>
-      <c:layout/>
       <c:overlay val="0"/>
     </c:legend>
     <c:plotVisOnly val="1"/>
@@ -9387,7 +9536,7 @@
           <a:p>
             <a:fld id="{A3BFE250-D821-4DA3-BEB3-32FB0787C8F3}" type="datetimeFigureOut">
               <a:rPr lang="en-US" smtClean="0"/>
-              <a:t>4/20/15</a:t>
+              <a:t>4/20/2015</a:t>
             </a:fld>
             <a:endParaRPr lang="en-US"/>
           </a:p>
@@ -13272,7 +13421,7 @@
           <a:p>
             <a:fld id="{67E91C90-18AE-45D1-A9AB-89459A33ACA2}" type="datetime1">
               <a:rPr lang="en-US" smtClean="0"/>
-              <a:t>4/20/15</a:t>
+              <a:t>4/20/2015</a:t>
             </a:fld>
             <a:endParaRPr lang="en-US"/>
           </a:p>
@@ -13442,7 +13591,7 @@
           <a:p>
             <a:fld id="{19B275A2-BBBD-4644-B69E-2525BDF44711}" type="datetime1">
               <a:rPr lang="en-US" smtClean="0"/>
-              <a:t>4/20/15</a:t>
+              <a:t>4/20/2015</a:t>
             </a:fld>
             <a:endParaRPr lang="en-US"/>
           </a:p>
@@ -13622,7 +13771,7 @@
           <a:p>
             <a:fld id="{7D403FD5-6B37-4524-8589-AC5C6406ED24}" type="datetime1">
               <a:rPr lang="en-US" smtClean="0"/>
-              <a:t>4/20/15</a:t>
+              <a:t>4/20/2015</a:t>
             </a:fld>
             <a:endParaRPr lang="en-US"/>
           </a:p>
@@ -13792,7 +13941,7 @@
           <a:p>
             <a:fld id="{A6309C2A-F073-416B-9704-FEF00B67AB58}" type="datetime1">
               <a:rPr lang="en-US" smtClean="0"/>
-              <a:t>4/20/15</a:t>
+              <a:t>4/20/2015</a:t>
             </a:fld>
             <a:endParaRPr lang="en-US"/>
           </a:p>
@@ -14036,7 +14185,7 @@
           <a:p>
             <a:fld id="{0DB4366B-823D-46F1-B4E2-77E643BCE048}" type="datetime1">
               <a:rPr lang="en-US" smtClean="0"/>
-              <a:t>4/20/15</a:t>
+              <a:t>4/20/2015</a:t>
             </a:fld>
             <a:endParaRPr lang="en-US"/>
           </a:p>
@@ -14268,7 +14417,7 @@
           <a:p>
             <a:fld id="{9E11D3E0-45FE-42C5-B6CA-4CFB0C1A93BB}" type="datetime1">
               <a:rPr lang="en-US" smtClean="0"/>
-              <a:t>4/20/15</a:t>
+              <a:t>4/20/2015</a:t>
             </a:fld>
             <a:endParaRPr lang="en-US"/>
           </a:p>
@@ -14635,7 +14784,7 @@
           <a:p>
             <a:fld id="{E100C0EC-2AF5-4EFC-B9E5-8F9F65222854}" type="datetime1">
               <a:rPr lang="en-US" smtClean="0"/>
-              <a:t>4/20/15</a:t>
+              <a:t>4/20/2015</a:t>
             </a:fld>
             <a:endParaRPr lang="en-US"/>
           </a:p>
@@ -14753,7 +14902,7 @@
           <a:p>
             <a:fld id="{5E03BEEA-7F33-4937-A47D-9059B374CDE2}" type="datetime1">
               <a:rPr lang="en-US" smtClean="0"/>
-              <a:t>4/20/15</a:t>
+              <a:t>4/20/2015</a:t>
             </a:fld>
             <a:endParaRPr lang="en-US"/>
           </a:p>
@@ -14848,7 +14997,7 @@
           <a:p>
             <a:fld id="{481886B9-3780-4C60-8A32-5E6CE0AFB25E}" type="datetime1">
               <a:rPr lang="en-US" smtClean="0"/>
-              <a:t>4/20/15</a:t>
+              <a:t>4/20/2015</a:t>
             </a:fld>
             <a:endParaRPr lang="en-US"/>
           </a:p>
@@ -15125,7 +15274,7 @@
           <a:p>
             <a:fld id="{EDD6E08E-BAA0-4DB7-810C-D540BE557D46}" type="datetime1">
               <a:rPr lang="en-US" smtClean="0"/>
-              <a:t>4/20/15</a:t>
+              <a:t>4/20/2015</a:t>
             </a:fld>
             <a:endParaRPr lang="en-US"/>
           </a:p>
@@ -15382,7 +15531,7 @@
           <a:p>
             <a:fld id="{B46E7A41-2D2E-41B1-8F9A-BA0D3E0DD5F1}" type="datetime1">
               <a:rPr lang="en-US" smtClean="0"/>
-              <a:t>4/20/15</a:t>
+              <a:t>4/20/2015</a:t>
             </a:fld>
             <a:endParaRPr lang="en-US"/>
           </a:p>
@@ -15595,7 +15744,7 @@
           <a:p>
             <a:fld id="{18C502F7-23D9-40E9-A6B2-EE015524757A}" type="datetime1">
               <a:rPr lang="en-US" smtClean="0"/>
-              <a:t>4/20/15</a:t>
+              <a:t>4/20/2015</a:t>
             </a:fld>
             <a:endParaRPr lang="en-US"/>
           </a:p>
@@ -16031,7 +16180,7 @@
           <a:noFill/>
           <a:extLst>
             <a:ext uri="{909E8E84-426E-40dd-AFC4-6F175D3DCCD1}">
-              <a14:hiddenFill xmlns:a14="http://schemas.microsoft.com/office/drawing/2010/main">
+              <a14:hiddenFill xmlns:a14="http://schemas.microsoft.com/office/drawing/2010/main" xmlns="">
                 <a:solidFill>
                   <a:srgbClr val="FFFFFF"/>
                 </a:solidFill>
@@ -16273,7 +16422,7 @@
   <p:timing>
     <p:tnLst>
       <p:par>
-        <p:cTn xmlns:p14="http://schemas.microsoft.com/office/powerpoint/2010/main" id="1" dur="indefinite" restart="never" nodeType="tmRoot"/>
+        <p:cTn id="1" dur="indefinite" restart="never" nodeType="tmRoot"/>
       </p:par>
     </p:tnLst>
   </p:timing>
@@ -16806,7 +16955,7 @@
   <p:timing>
     <p:tnLst>
       <p:par>
-        <p:cTn xmlns:p14="http://schemas.microsoft.com/office/powerpoint/2010/main" id="1" dur="indefinite" restart="never" nodeType="tmRoot"/>
+        <p:cTn id="1" dur="indefinite" restart="never" nodeType="tmRoot"/>
       </p:par>
     </p:tnLst>
   </p:timing>
@@ -17418,7 +17567,7 @@
   <p:timing>
     <p:tnLst>
       <p:par>
-        <p:cTn xmlns:p14="http://schemas.microsoft.com/office/powerpoint/2010/main" id="1" dur="indefinite" restart="never" nodeType="tmRoot"/>
+        <p:cTn id="1" dur="indefinite" restart="never" nodeType="tmRoot"/>
       </p:par>
     </p:tnLst>
   </p:timing>
@@ -18439,7 +18588,7 @@
   <p:timing>
     <p:tnLst>
       <p:par>
-        <p:cTn xmlns:p14="http://schemas.microsoft.com/office/powerpoint/2010/main" id="1" dur="indefinite" restart="never" nodeType="tmRoot"/>
+        <p:cTn id="1" dur="indefinite" restart="never" nodeType="tmRoot"/>
       </p:par>
     </p:tnLst>
   </p:timing>
@@ -19225,7 +19374,7 @@
   <p:timing>
     <p:tnLst>
       <p:par>
-        <p:cTn xmlns:p14="http://schemas.microsoft.com/office/powerpoint/2010/main" id="1" dur="indefinite" restart="never" nodeType="tmRoot"/>
+        <p:cTn id="1" dur="indefinite" restart="never" nodeType="tmRoot"/>
       </p:par>
     </p:tnLst>
   </p:timing>
@@ -20178,7 +20327,7 @@
   <p:timing>
     <p:tnLst>
       <p:par>
-        <p:cTn xmlns:p14="http://schemas.microsoft.com/office/powerpoint/2010/main" id="1" dur="indefinite" restart="never" nodeType="tmRoot"/>
+        <p:cTn id="1" dur="indefinite" restart="never" nodeType="tmRoot"/>
       </p:par>
     </p:tnLst>
   </p:timing>
@@ -21647,7 +21796,7 @@
   <p:timing>
     <p:tnLst>
       <p:par>
-        <p:cTn xmlns:p14="http://schemas.microsoft.com/office/powerpoint/2010/main" id="1" dur="indefinite" restart="never" nodeType="tmRoot"/>
+        <p:cTn id="1" dur="indefinite" restart="never" nodeType="tmRoot"/>
       </p:par>
     </p:tnLst>
   </p:timing>
@@ -22261,7 +22410,7 @@
   <p:timing>
     <p:tnLst>
       <p:par>
-        <p:cTn xmlns:p14="http://schemas.microsoft.com/office/powerpoint/2010/main" id="1" dur="indefinite" restart="never" nodeType="tmRoot"/>
+        <p:cTn id="1" dur="indefinite" restart="never" nodeType="tmRoot"/>
       </p:par>
     </p:tnLst>
   </p:timing>
@@ -22834,7 +22983,7 @@
   <p:timing>
     <p:tnLst>
       <p:par>
-        <p:cTn xmlns:p14="http://schemas.microsoft.com/office/powerpoint/2010/main" id="1" dur="indefinite" restart="never" nodeType="tmRoot"/>
+        <p:cTn id="1" dur="indefinite" restart="never" nodeType="tmRoot"/>
       </p:par>
     </p:tnLst>
   </p:timing>
@@ -23424,8 +23573,8 @@
           </a:p>
         </p:txBody>
       </p:sp>
-      <mc:AlternateContent xmlns:mc="http://schemas.openxmlformats.org/markup-compatibility/2006" xmlns:a14="http://schemas.microsoft.com/office/drawing/2010/main">
-        <mc:Choice Requires="a14">
+      <mc:AlternateContent xmlns:mc="http://schemas.openxmlformats.org/markup-compatibility/2006">
+        <mc:Choice xmlns:a14="http://schemas.microsoft.com/office/drawing/2010/main" Requires="a14">
           <p:sp>
             <p:nvSpPr>
               <p:cNvPr id="3" name="Rectangle 2"/>
@@ -23435,7 +23584,7 @@
             <p:spPr>
               <a:xfrm>
                 <a:off x="4769318" y="3337188"/>
-                <a:ext cx="2612959" cy="394210"/>
+                <a:ext cx="2400272" cy="492955"/>
               </a:xfrm>
               <a:prstGeom prst="rect">
                 <a:avLst/>
@@ -23447,72 +23596,95 @@
               </a:bodyPr>
               <a:lstStyle/>
               <a:p>
+                <a:pPr/>
                 <a14:m>
-                  <m:oMathPara xmlns:m="http://schemas.openxmlformats.org/officeDocument/2006/math" xmlns="">
+                  <m:oMathPara xmlns:m="http://schemas.openxmlformats.org/officeDocument/2006/math">
                     <m:oMathParaPr>
                       <m:jc m:val="centerGroup"/>
                     </m:oMathParaPr>
                     <m:oMath xmlns:m="http://schemas.openxmlformats.org/officeDocument/2006/math">
                       <m:r>
-                        <a:rPr lang="en-US" i="1"/>
+                        <a:rPr lang="en-US" i="1" smtClean="0">
+                          <a:latin typeface="Cambria Math" panose="02040503050406030204" pitchFamily="18" charset="0"/>
+                        </a:rPr>
                         <m:t>(</m:t>
                       </m:r>
                       <m:sSub>
                         <m:sSubPr>
                           <m:ctrlPr>
-                            <a:rPr lang="en-US" i="1"/>
+                            <a:rPr lang="en-US" i="1">
+                              <a:latin typeface="Cambria Math" panose="02040503050406030204" pitchFamily="18" charset="0"/>
+                            </a:rPr>
                           </m:ctrlPr>
                         </m:sSubPr>
                         <m:e>
                           <m:r>
-                            <a:rPr lang="en-US" i="1"/>
+                            <a:rPr lang="en-US" i="1">
+                              <a:latin typeface="Cambria Math" panose="02040503050406030204" pitchFamily="18" charset="0"/>
+                            </a:rPr>
                             <m:t>𝑐</m:t>
                           </m:r>
                         </m:e>
                         <m:sub>
                           <m:r>
-                            <a:rPr lang="en-US" i="1"/>
+                            <a:rPr lang="en-US" i="1">
+                              <a:latin typeface="Cambria Math" panose="02040503050406030204" pitchFamily="18" charset="0"/>
+                            </a:rPr>
                             <m:t>1</m:t>
                           </m:r>
                         </m:sub>
                       </m:sSub>
                       <m:r>
-                        <a:rPr lang="en-US" i="1"/>
+                        <a:rPr lang="en-US" i="1">
+                          <a:latin typeface="Cambria Math" panose="02040503050406030204" pitchFamily="18" charset="0"/>
+                        </a:rPr>
                         <m:t>,</m:t>
                       </m:r>
                       <m:sSub>
                         <m:sSubPr>
                           <m:ctrlPr>
-                            <a:rPr lang="en-US" i="1"/>
+                            <a:rPr lang="en-US" i="1">
+                              <a:latin typeface="Cambria Math" panose="02040503050406030204" pitchFamily="18" charset="0"/>
+                            </a:rPr>
                           </m:ctrlPr>
                         </m:sSubPr>
                         <m:e>
                           <m:r>
-                            <a:rPr lang="en-US" i="1"/>
+                            <a:rPr lang="en-US" i="1">
+                              <a:latin typeface="Cambria Math" panose="02040503050406030204" pitchFamily="18" charset="0"/>
+                            </a:rPr>
                             <m:t>𝑐</m:t>
                           </m:r>
                         </m:e>
                         <m:sub>
                           <m:r>
-                            <a:rPr lang="en-US" i="1"/>
+                            <a:rPr lang="en-US" i="1">
+                              <a:latin typeface="Cambria Math" panose="02040503050406030204" pitchFamily="18" charset="0"/>
+                            </a:rPr>
                             <m:t>2</m:t>
                           </m:r>
                         </m:sub>
                       </m:sSub>
                       <m:r>
-                        <a:rPr lang="en-US" i="1"/>
+                        <a:rPr lang="en-US" i="1">
+                          <a:latin typeface="Cambria Math" panose="02040503050406030204" pitchFamily="18" charset="0"/>
+                        </a:rPr>
                         <m:t>)= </m:t>
                       </m:r>
                       <m:acc>
                         <m:accPr>
                           <m:chr m:val="̅"/>
                           <m:ctrlPr>
-                            <a:rPr lang="en-US" i="1"/>
+                            <a:rPr lang="en-US" i="1">
+                              <a:latin typeface="Cambria Math" panose="02040503050406030204" pitchFamily="18" charset="0"/>
+                            </a:rPr>
                           </m:ctrlPr>
                         </m:accPr>
                         <m:e>
                           <m:r>
-                            <a:rPr lang="en-US" i="1"/>
+                            <a:rPr lang="en-US" i="1">
+                              <a:latin typeface="Cambria Math" panose="02040503050406030204" pitchFamily="18" charset="0"/>
+                            </a:rPr>
                             <m:t>𝑥</m:t>
                           </m:r>
                         </m:e>
@@ -23527,49 +23699,80 @@
                       <m:sSub>
                         <m:sSubPr>
                           <m:ctrlPr>
-                            <a:rPr lang="en-US" i="1"/>
+                            <a:rPr lang="en-US" i="1">
+                              <a:latin typeface="Cambria Math" panose="02040503050406030204" pitchFamily="18" charset="0"/>
+                            </a:rPr>
                           </m:ctrlPr>
                         </m:sSubPr>
                         <m:e>
                           <m:r>
-                            <a:rPr lang="en-US" i="1"/>
+                            <a:rPr lang="en-US" i="1">
+                              <a:latin typeface="Cambria Math" panose="02040503050406030204" pitchFamily="18" charset="0"/>
+                            </a:rPr>
                             <m:t>𝑧</m:t>
                           </m:r>
                         </m:e>
                         <m:sub>
                           <m:r>
-                            <a:rPr lang="en-US" i="1"/>
+                            <a:rPr lang="en-US" i="1">
+                              <a:latin typeface="Cambria Math" panose="02040503050406030204" pitchFamily="18" charset="0"/>
+                            </a:rPr>
                             <m:t>1−</m:t>
                           </m:r>
-                          <m:r>
-                            <a:rPr lang="en-US" i="1"/>
-                            <m:t>𝛼</m:t>
-                          </m:r>
-                          <m:r>
-                            <a:rPr lang="en-US" i="1"/>
-                            <m:t>/2</m:t>
-                          </m:r>
+                          <m:f>
+                            <m:fPr>
+                              <m:ctrlPr>
+                                <a:rPr lang="en-US" i="1">
+                                  <a:latin typeface="Cambria Math" panose="02040503050406030204" pitchFamily="18" charset="0"/>
+                                </a:rPr>
+                              </m:ctrlPr>
+                            </m:fPr>
+                            <m:num>
+                              <m:r>
+                                <a:rPr lang="en-US" i="1">
+                                  <a:latin typeface="Cambria Math" panose="02040503050406030204" pitchFamily="18" charset="0"/>
+                                </a:rPr>
+                                <m:t>𝛼</m:t>
+                              </m:r>
+                            </m:num>
+                            <m:den>
+                              <m:r>
+                                <a:rPr lang="en-US" i="1">
+                                  <a:latin typeface="Cambria Math" panose="02040503050406030204" pitchFamily="18" charset="0"/>
+                                </a:rPr>
+                                <m:t>2</m:t>
+                              </m:r>
+                            </m:den>
+                          </m:f>
                         </m:sub>
                       </m:sSub>
                       <m:sSub>
                         <m:sSubPr>
                           <m:ctrlPr>
-                            <a:rPr lang="en-US" i="1"/>
+                            <a:rPr lang="en-US" i="1">
+                              <a:latin typeface="Cambria Math" panose="02040503050406030204" pitchFamily="18" charset="0"/>
+                            </a:rPr>
                           </m:ctrlPr>
                         </m:sSubPr>
                         <m:e>
                           <m:r>
-                            <a:rPr lang="en-US" i="1"/>
+                            <a:rPr lang="en-US" i="1">
+                              <a:latin typeface="Cambria Math" panose="02040503050406030204" pitchFamily="18" charset="0"/>
+                            </a:rPr>
                             <m:t> </m:t>
                           </m:r>
                           <m:r>
-                            <a:rPr lang="en-US" i="1"/>
+                            <a:rPr lang="en-US" i="1">
+                              <a:latin typeface="Cambria Math" panose="02040503050406030204" pitchFamily="18" charset="0"/>
+                            </a:rPr>
                             <m:t>𝑠</m:t>
                           </m:r>
                         </m:e>
                         <m:sub>
                           <m:r>
-                            <a:rPr lang="en-US" i="1"/>
+                            <a:rPr lang="en-US" i="1">
+                              <a:latin typeface="Cambria Math" panose="02040503050406030204" pitchFamily="18" charset="0"/>
+                            </a:rPr>
                             <m:t>𝑥</m:t>
                           </m:r>
                         </m:sub>
@@ -23589,7 +23792,7 @@
             </p:txBody>
           </p:sp>
         </mc:Choice>
-        <mc:Fallback xmlns="">
+        <mc:Fallback>
           <p:sp>
             <p:nvSpPr>
               <p:cNvPr id="3" name="Rectangle 2"/>
@@ -23601,7 +23804,7 @@
             <p:spPr>
               <a:xfrm>
                 <a:off x="4769318" y="3337188"/>
-                <a:ext cx="2612959" cy="394210"/>
+                <a:ext cx="2400272" cy="492955"/>
               </a:xfrm>
               <a:prstGeom prst="rect">
                 <a:avLst/>
@@ -23609,7 +23812,7 @@
               <a:blipFill rotWithShape="0">
                 <a:blip r:embed="rId3"/>
                 <a:stretch>
-                  <a:fillRect b="-9231"/>
+                  <a:fillRect b="-2469"/>
                 </a:stretch>
               </a:blipFill>
             </p:spPr>
@@ -23783,8 +23986,8 @@
           </a:p>
         </p:txBody>
       </p:sp>
-      <mc:AlternateContent xmlns:mc="http://schemas.openxmlformats.org/markup-compatibility/2006">
-        <mc:Choice xmlns:a14="http://schemas.microsoft.com/office/drawing/2010/main" Requires="a14">
+      <mc:AlternateContent xmlns:mc="http://schemas.openxmlformats.org/markup-compatibility/2006" xmlns:a14="http://schemas.microsoft.com/office/drawing/2010/main">
+        <mc:Choice Requires="a14">
           <p:sp>
             <p:nvSpPr>
               <p:cNvPr id="17" name="Rectangle 16"/>
@@ -23806,13 +24009,12 @@
               </a:bodyPr>
               <a:lstStyle/>
               <a:p>
-                <a14:m/>
                 <a:endParaRPr lang="en-US" dirty="0"/>
               </a:p>
             </p:txBody>
           </p:sp>
         </mc:Choice>
-        <mc:Fallback>
+        <mc:Fallback xmlns="">
           <p:sp>
             <p:nvSpPr>
               <p:cNvPr id="17" name="Rectangle 16"/>
@@ -23831,6 +24033,414 @@
               </a:prstGeom>
               <a:blipFill rotWithShape="1">
                 <a:blip r:embed="rId4"/>
+                <a:stretch>
+                  <a:fillRect/>
+                </a:stretch>
+              </a:blipFill>
+            </p:spPr>
+            <p:txBody>
+              <a:bodyPr/>
+              <a:lstStyle/>
+              <a:p>
+                <a:r>
+                  <a:rPr lang="en-US">
+                    <a:noFill/>
+                  </a:rPr>
+                  <a:t> </a:t>
+                </a:r>
+              </a:p>
+            </p:txBody>
+          </p:sp>
+        </mc:Fallback>
+      </mc:AlternateContent>
+      <mc:AlternateContent xmlns:mc="http://schemas.openxmlformats.org/markup-compatibility/2006">
+        <mc:Choice xmlns:a14="http://schemas.microsoft.com/office/drawing/2010/main" Requires="a14">
+          <p:sp>
+            <p:nvSpPr>
+              <p:cNvPr id="18" name="Rectangle 17"/>
+              <p:cNvSpPr/>
+              <p:nvPr/>
+            </p:nvSpPr>
+            <p:spPr>
+              <a:xfrm>
+                <a:off x="1971699" y="3068554"/>
+                <a:ext cx="1677319" cy="910699"/>
+              </a:xfrm>
+              <a:prstGeom prst="rect">
+                <a:avLst/>
+              </a:prstGeom>
+            </p:spPr>
+            <p:txBody>
+              <a:bodyPr wrap="none">
+                <a:spAutoFit/>
+              </a:bodyPr>
+              <a:lstStyle/>
+              <a:p>
+                <a:pPr/>
+                <a14:m>
+                  <m:oMathPara xmlns:m="http://schemas.openxmlformats.org/officeDocument/2006/math">
+                    <m:oMathParaPr>
+                      <m:jc m:val="centerGroup"/>
+                    </m:oMathParaPr>
+                    <m:oMath xmlns:m="http://schemas.openxmlformats.org/officeDocument/2006/math">
+                      <m:sSub>
+                        <m:sSubPr>
+                          <m:ctrlPr>
+                            <a:rPr lang="en-US" b="0" i="1" smtClean="0">
+                              <a:solidFill>
+                                <a:schemeClr val="tx1">
+                                  <a:lumMod val="75000"/>
+                                  <a:lumOff val="25000"/>
+                                </a:schemeClr>
+                              </a:solidFill>
+                              <a:latin typeface="Cambria Math" panose="02040503050406030204" pitchFamily="18" charset="0"/>
+                            </a:rPr>
+                          </m:ctrlPr>
+                        </m:sSubPr>
+                        <m:e>
+                          <m:r>
+                            <a:rPr lang="en-US" b="0" i="1" smtClean="0">
+                              <a:solidFill>
+                                <a:schemeClr val="tx1">
+                                  <a:lumMod val="75000"/>
+                                  <a:lumOff val="25000"/>
+                                </a:schemeClr>
+                              </a:solidFill>
+                              <a:latin typeface="Cambria Math" panose="02040503050406030204" pitchFamily="18" charset="0"/>
+                            </a:rPr>
+                            <m:t>𝑠</m:t>
+                          </m:r>
+                        </m:e>
+                        <m:sub>
+                          <m:r>
+                            <a:rPr lang="en-US" b="0" i="1" smtClean="0">
+                              <a:solidFill>
+                                <a:schemeClr val="tx1">
+                                  <a:lumMod val="75000"/>
+                                  <a:lumOff val="25000"/>
+                                </a:schemeClr>
+                              </a:solidFill>
+                              <a:latin typeface="Cambria Math" panose="02040503050406030204" pitchFamily="18" charset="0"/>
+                            </a:rPr>
+                            <m:t>𝑥</m:t>
+                          </m:r>
+                        </m:sub>
+                      </m:sSub>
+                      <m:r>
+                        <a:rPr lang="en-US" b="0" i="1" smtClean="0">
+                          <a:solidFill>
+                            <a:schemeClr val="tx1">
+                              <a:lumMod val="75000"/>
+                              <a:lumOff val="25000"/>
+                            </a:schemeClr>
+                          </a:solidFill>
+                          <a:latin typeface="Cambria Math" panose="02040503050406030204" pitchFamily="18" charset="0"/>
+                        </a:rPr>
+                        <m:t>=</m:t>
+                      </m:r>
+                      <m:rad>
+                        <m:radPr>
+                          <m:degHide m:val="on"/>
+                          <m:ctrlPr>
+                            <a:rPr lang="en-US" b="0" i="1" smtClean="0">
+                              <a:solidFill>
+                                <a:schemeClr val="tx1">
+                                  <a:lumMod val="75000"/>
+                                  <a:lumOff val="25000"/>
+                                </a:schemeClr>
+                              </a:solidFill>
+                              <a:latin typeface="Cambria Math" panose="02040503050406030204" pitchFamily="18" charset="0"/>
+                            </a:rPr>
+                          </m:ctrlPr>
+                        </m:radPr>
+                        <m:deg/>
+                        <m:e>
+                          <m:f>
+                            <m:fPr>
+                              <m:ctrlPr>
+                                <a:rPr lang="en-US" b="0" i="1" smtClean="0">
+                                  <a:solidFill>
+                                    <a:schemeClr val="tx1">
+                                      <a:lumMod val="75000"/>
+                                      <a:lumOff val="25000"/>
+                                    </a:schemeClr>
+                                  </a:solidFill>
+                                  <a:latin typeface="Cambria Math" panose="02040503050406030204" pitchFamily="18" charset="0"/>
+                                </a:rPr>
+                              </m:ctrlPr>
+                            </m:fPr>
+                            <m:num>
+                              <m:sSubSup>
+                                <m:sSubSupPr>
+                                  <m:ctrlPr>
+                                    <a:rPr lang="en-US" b="0" i="1" smtClean="0">
+                                      <a:solidFill>
+                                        <a:schemeClr val="tx1">
+                                          <a:lumMod val="75000"/>
+                                          <a:lumOff val="25000"/>
+                                        </a:schemeClr>
+                                      </a:solidFill>
+                                      <a:latin typeface="Cambria Math" panose="02040503050406030204" pitchFamily="18" charset="0"/>
+                                    </a:rPr>
+                                  </m:ctrlPr>
+                                </m:sSubSupPr>
+                                <m:e>
+                                  <m:r>
+                                    <a:rPr lang="en-US" b="0" i="1" smtClean="0">
+                                      <a:solidFill>
+                                        <a:schemeClr val="tx1">
+                                          <a:lumMod val="75000"/>
+                                          <a:lumOff val="25000"/>
+                                        </a:schemeClr>
+                                      </a:solidFill>
+                                      <a:latin typeface="Cambria Math" panose="02040503050406030204" pitchFamily="18" charset="0"/>
+                                    </a:rPr>
+                                    <m:t>𝑠</m:t>
+                                  </m:r>
+                                </m:e>
+                                <m:sub>
+                                  <m:r>
+                                    <a:rPr lang="en-US" b="0" i="1" smtClean="0">
+                                      <a:solidFill>
+                                        <a:schemeClr val="tx1">
+                                          <a:lumMod val="75000"/>
+                                          <a:lumOff val="25000"/>
+                                        </a:schemeClr>
+                                      </a:solidFill>
+                                      <a:latin typeface="Cambria Math" panose="02040503050406030204" pitchFamily="18" charset="0"/>
+                                    </a:rPr>
+                                    <m:t>1</m:t>
+                                  </m:r>
+                                </m:sub>
+                                <m:sup>
+                                  <m:r>
+                                    <a:rPr lang="en-US" b="0" i="1" smtClean="0">
+                                      <a:solidFill>
+                                        <a:schemeClr val="tx1">
+                                          <a:lumMod val="75000"/>
+                                          <a:lumOff val="25000"/>
+                                        </a:schemeClr>
+                                      </a:solidFill>
+                                      <a:latin typeface="Cambria Math" panose="02040503050406030204" pitchFamily="18" charset="0"/>
+                                    </a:rPr>
+                                    <m:t>2</m:t>
+                                  </m:r>
+                                </m:sup>
+                              </m:sSubSup>
+                            </m:num>
+                            <m:den>
+                              <m:sSub>
+                                <m:sSubPr>
+                                  <m:ctrlPr>
+                                    <a:rPr lang="en-US" b="0" i="1" smtClean="0">
+                                      <a:solidFill>
+                                        <a:schemeClr val="tx1">
+                                          <a:lumMod val="75000"/>
+                                          <a:lumOff val="25000"/>
+                                        </a:schemeClr>
+                                      </a:solidFill>
+                                      <a:latin typeface="Cambria Math" panose="02040503050406030204" pitchFamily="18" charset="0"/>
+                                    </a:rPr>
+                                  </m:ctrlPr>
+                                </m:sSubPr>
+                                <m:e>
+                                  <m:r>
+                                    <a:rPr lang="en-US" b="0" i="1" smtClean="0">
+                                      <a:solidFill>
+                                        <a:schemeClr val="tx1">
+                                          <a:lumMod val="75000"/>
+                                          <a:lumOff val="25000"/>
+                                        </a:schemeClr>
+                                      </a:solidFill>
+                                      <a:latin typeface="Cambria Math" panose="02040503050406030204" pitchFamily="18" charset="0"/>
+                                    </a:rPr>
+                                    <m:t>𝑛</m:t>
+                                  </m:r>
+                                </m:e>
+                                <m:sub>
+                                  <m:r>
+                                    <a:rPr lang="en-US" b="0" i="1" smtClean="0">
+                                      <a:solidFill>
+                                        <a:schemeClr val="tx1">
+                                          <a:lumMod val="75000"/>
+                                          <a:lumOff val="25000"/>
+                                        </a:schemeClr>
+                                      </a:solidFill>
+                                      <a:latin typeface="Cambria Math" panose="02040503050406030204" pitchFamily="18" charset="0"/>
+                                    </a:rPr>
+                                    <m:t>1</m:t>
+                                  </m:r>
+                                </m:sub>
+                              </m:sSub>
+                            </m:den>
+                          </m:f>
+                          <m:r>
+                            <a:rPr lang="en-US" b="0" i="1" smtClean="0">
+                              <a:solidFill>
+                                <a:schemeClr val="tx1">
+                                  <a:lumMod val="75000"/>
+                                  <a:lumOff val="25000"/>
+                                </a:schemeClr>
+                              </a:solidFill>
+                              <a:latin typeface="Cambria Math" panose="02040503050406030204" pitchFamily="18" charset="0"/>
+                            </a:rPr>
+                            <m:t>+</m:t>
+                          </m:r>
+                          <m:f>
+                            <m:fPr>
+                              <m:ctrlPr>
+                                <a:rPr lang="en-US" b="0" i="1" smtClean="0">
+                                  <a:solidFill>
+                                    <a:schemeClr val="tx1">
+                                      <a:lumMod val="75000"/>
+                                      <a:lumOff val="25000"/>
+                                    </a:schemeClr>
+                                  </a:solidFill>
+                                  <a:latin typeface="Cambria Math" panose="02040503050406030204" pitchFamily="18" charset="0"/>
+                                </a:rPr>
+                              </m:ctrlPr>
+                            </m:fPr>
+                            <m:num>
+                              <m:sSubSup>
+                                <m:sSubSupPr>
+                                  <m:ctrlPr>
+                                    <a:rPr lang="en-US" b="0" i="1" smtClean="0">
+                                      <a:solidFill>
+                                        <a:schemeClr val="tx1">
+                                          <a:lumMod val="75000"/>
+                                          <a:lumOff val="25000"/>
+                                        </a:schemeClr>
+                                      </a:solidFill>
+                                      <a:latin typeface="Cambria Math" panose="02040503050406030204" pitchFamily="18" charset="0"/>
+                                    </a:rPr>
+                                  </m:ctrlPr>
+                                </m:sSubSupPr>
+                                <m:e>
+                                  <m:r>
+                                    <a:rPr lang="en-US" b="0" i="1" smtClean="0">
+                                      <a:solidFill>
+                                        <a:schemeClr val="tx1">
+                                          <a:lumMod val="75000"/>
+                                          <a:lumOff val="25000"/>
+                                        </a:schemeClr>
+                                      </a:solidFill>
+                                      <a:latin typeface="Cambria Math" panose="02040503050406030204" pitchFamily="18" charset="0"/>
+                                    </a:rPr>
+                                    <m:t>𝑠</m:t>
+                                  </m:r>
+                                </m:e>
+                                <m:sub>
+                                  <m:r>
+                                    <a:rPr lang="en-US" b="0" i="1" smtClean="0">
+                                      <a:solidFill>
+                                        <a:schemeClr val="tx1">
+                                          <a:lumMod val="75000"/>
+                                          <a:lumOff val="25000"/>
+                                        </a:schemeClr>
+                                      </a:solidFill>
+                                      <a:latin typeface="Cambria Math" panose="02040503050406030204" pitchFamily="18" charset="0"/>
+                                    </a:rPr>
+                                    <m:t>2</m:t>
+                                  </m:r>
+                                </m:sub>
+                                <m:sup>
+                                  <m:r>
+                                    <a:rPr lang="en-US" b="0" i="1" smtClean="0">
+                                      <a:solidFill>
+                                        <a:schemeClr val="tx1">
+                                          <a:lumMod val="75000"/>
+                                          <a:lumOff val="25000"/>
+                                        </a:schemeClr>
+                                      </a:solidFill>
+                                      <a:latin typeface="Cambria Math" panose="02040503050406030204" pitchFamily="18" charset="0"/>
+                                    </a:rPr>
+                                    <m:t>2</m:t>
+                                  </m:r>
+                                </m:sup>
+                              </m:sSubSup>
+                            </m:num>
+                            <m:den>
+                              <m:sSub>
+                                <m:sSubPr>
+                                  <m:ctrlPr>
+                                    <a:rPr lang="en-US" b="0" i="1" smtClean="0">
+                                      <a:solidFill>
+                                        <a:schemeClr val="tx1">
+                                          <a:lumMod val="75000"/>
+                                          <a:lumOff val="25000"/>
+                                        </a:schemeClr>
+                                      </a:solidFill>
+                                      <a:latin typeface="Cambria Math" panose="02040503050406030204" pitchFamily="18" charset="0"/>
+                                    </a:rPr>
+                                  </m:ctrlPr>
+                                </m:sSubPr>
+                                <m:e>
+                                  <m:r>
+                                    <a:rPr lang="en-US" b="0" i="1" smtClean="0">
+                                      <a:solidFill>
+                                        <a:schemeClr val="tx1">
+                                          <a:lumMod val="75000"/>
+                                          <a:lumOff val="25000"/>
+                                        </a:schemeClr>
+                                      </a:solidFill>
+                                      <a:latin typeface="Cambria Math" panose="02040503050406030204" pitchFamily="18" charset="0"/>
+                                    </a:rPr>
+                                    <m:t>𝑛</m:t>
+                                  </m:r>
+                                </m:e>
+                                <m:sub>
+                                  <m:r>
+                                    <a:rPr lang="en-US" b="0" i="1" smtClean="0">
+                                      <a:solidFill>
+                                        <a:schemeClr val="tx1">
+                                          <a:lumMod val="75000"/>
+                                          <a:lumOff val="25000"/>
+                                        </a:schemeClr>
+                                      </a:solidFill>
+                                      <a:latin typeface="Cambria Math" panose="02040503050406030204" pitchFamily="18" charset="0"/>
+                                    </a:rPr>
+                                    <m:t>2</m:t>
+                                  </m:r>
+                                </m:sub>
+                              </m:sSub>
+                            </m:den>
+                          </m:f>
+                        </m:e>
+                      </m:rad>
+                    </m:oMath>
+                  </m:oMathPara>
+                </a14:m>
+                <a:endParaRPr lang="en-US" dirty="0">
+                  <a:solidFill>
+                    <a:schemeClr val="tx1">
+                      <a:lumMod val="75000"/>
+                      <a:lumOff val="25000"/>
+                    </a:schemeClr>
+                  </a:solidFill>
+                </a:endParaRPr>
+              </a:p>
+            </p:txBody>
+          </p:sp>
+        </mc:Choice>
+        <mc:Fallback>
+          <p:sp>
+            <p:nvSpPr>
+              <p:cNvPr id="18" name="Rectangle 17"/>
+              <p:cNvSpPr>
+                <a:spLocks noRot="1" noChangeAspect="1" noMove="1" noResize="1" noEditPoints="1" noAdjustHandles="1" noChangeArrowheads="1" noChangeShapeType="1" noTextEdit="1"/>
+              </p:cNvSpPr>
+              <p:nvPr/>
+            </p:nvSpPr>
+            <p:spPr>
+              <a:xfrm>
+                <a:off x="1971699" y="3068554"/>
+                <a:ext cx="1677319" cy="910699"/>
+              </a:xfrm>
+              <a:prstGeom prst="rect">
+                <a:avLst/>
+              </a:prstGeom>
+              <a:blipFill rotWithShape="0">
+                <a:blip r:embed="rId5"/>
                 <a:stretch>
                   <a:fillRect/>
                 </a:stretch>
@@ -23876,7 +24486,7 @@
   <p:timing>
     <p:tnLst>
       <p:par>
-        <p:cTn xmlns:p14="http://schemas.microsoft.com/office/powerpoint/2010/main" id="1" dur="indefinite" restart="never" nodeType="tmRoot"/>
+        <p:cTn id="1" dur="indefinite" restart="never" nodeType="tmRoot"/>
       </p:par>
     </p:tnLst>
   </p:timing>
@@ -24389,7 +24999,7 @@
   <p:timing>
     <p:tnLst>
       <p:par>
-        <p:cTn xmlns:p14="http://schemas.microsoft.com/office/powerpoint/2010/main" id="1" dur="indefinite" restart="never" nodeType="tmRoot"/>
+        <p:cTn id="1" dur="indefinite" restart="never" nodeType="tmRoot"/>
       </p:par>
     </p:tnLst>
   </p:timing>
@@ -25331,7 +25941,7 @@
   <p:timing>
     <p:tnLst>
       <p:par>
-        <p:cTn xmlns:p14="http://schemas.microsoft.com/office/powerpoint/2010/main" id="1" dur="indefinite" restart="never" nodeType="tmRoot"/>
+        <p:cTn id="1" dur="indefinite" restart="never" nodeType="tmRoot"/>
       </p:par>
     </p:tnLst>
   </p:timing>
@@ -26002,7 +26612,7 @@
   <p:timing>
     <p:tnLst>
       <p:par>
-        <p:cTn xmlns:p14="http://schemas.microsoft.com/office/powerpoint/2010/main" id="1" dur="indefinite" restart="never" nodeType="tmRoot"/>
+        <p:cTn id="1" dur="indefinite" restart="never" nodeType="tmRoot"/>
       </p:par>
     </p:tnLst>
   </p:timing>
@@ -26744,7 +27354,7 @@
   <p:timing>
     <p:tnLst>
       <p:par>
-        <p:cTn xmlns:p14="http://schemas.microsoft.com/office/powerpoint/2010/main" id="1" dur="indefinite" restart="never" nodeType="tmRoot"/>
+        <p:cTn id="1" dur="indefinite" restart="never" nodeType="tmRoot"/>
       </p:par>
     </p:tnLst>
   </p:timing>
@@ -27170,7 +27780,7 @@
           <a:graphicData uri="http://schemas.openxmlformats.org/presentationml/2006/ole">
             <mc:AlternateContent xmlns:mc="http://schemas.openxmlformats.org/markup-compatibility/2006">
               <mc:Choice xmlns:v="urn:schemas-microsoft-com:vml" Requires="v">
-                <p:oleObj spid="_x0000_s1052" name="Document" r:id="rId5" imgW="6096000" imgH="2590800" progId="Word.Document.12">
+                <p:oleObj spid="_x0000_s1053" name="Document" r:id="rId5" imgW="6096000" imgH="2590800" progId="Word.Document.12">
                   <p:embed/>
                 </p:oleObj>
               </mc:Choice>
@@ -27230,7 +27840,7 @@
   <p:timing>
     <p:tnLst>
       <p:par>
-        <p:cTn xmlns:p14="http://schemas.microsoft.com/office/powerpoint/2010/main" id="1" dur="indefinite" restart="never" nodeType="tmRoot"/>
+        <p:cTn id="1" dur="indefinite" restart="never" nodeType="tmRoot"/>
       </p:par>
     </p:tnLst>
   </p:timing>
@@ -27764,7 +28374,7 @@
           <a:graphicData uri="http://schemas.openxmlformats.org/presentationml/2006/ole">
             <mc:AlternateContent xmlns:mc="http://schemas.openxmlformats.org/markup-compatibility/2006">
               <mc:Choice xmlns:v="urn:schemas-microsoft-com:vml" Requires="v">
-                <p:oleObj spid="_x0000_s2073" name="Document" r:id="rId5" imgW="6096000" imgH="1333500" progId="Word.Document.12">
+                <p:oleObj spid="_x0000_s2074" name="Document" r:id="rId5" imgW="6096000" imgH="1333500" progId="Word.Document.12">
                   <p:embed/>
                 </p:oleObj>
               </mc:Choice>
@@ -27824,7 +28434,7 @@
   <p:timing>
     <p:tnLst>
       <p:par>
-        <p:cTn xmlns:p14="http://schemas.microsoft.com/office/powerpoint/2010/main" id="1" dur="indefinite" restart="never" nodeType="tmRoot"/>
+        <p:cTn id="1" dur="indefinite" restart="never" nodeType="tmRoot"/>
       </p:par>
     </p:tnLst>
   </p:timing>
@@ -28451,7 +29061,7 @@
   <p:timing>
     <p:tnLst>
       <p:par>
-        <p:cTn xmlns:p14="http://schemas.microsoft.com/office/powerpoint/2010/main" id="1" dur="indefinite" restart="never" nodeType="tmRoot"/>
+        <p:cTn id="1" dur="indefinite" restart="never" nodeType="tmRoot"/>
       </p:par>
     </p:tnLst>
   </p:timing>
@@ -28966,7 +29576,7 @@
   <p:timing>
     <p:tnLst>
       <p:par>
-        <p:cTn xmlns:p14="http://schemas.microsoft.com/office/powerpoint/2010/main" id="1" dur="indefinite" restart="never" nodeType="tmRoot"/>
+        <p:cTn id="1" dur="indefinite" restart="never" nodeType="tmRoot"/>
       </p:par>
     </p:tnLst>
   </p:timing>
@@ -29481,7 +30091,7 @@
   <p:timing>
     <p:tnLst>
       <p:par>
-        <p:cTn xmlns:p14="http://schemas.microsoft.com/office/powerpoint/2010/main" id="1" dur="indefinite" restart="never" nodeType="tmRoot"/>
+        <p:cTn id="1" dur="indefinite" restart="never" nodeType="tmRoot"/>
       </p:par>
     </p:tnLst>
   </p:timing>
@@ -29949,7 +30559,7 @@
           <a:graphicData uri="http://schemas.openxmlformats.org/presentationml/2006/ole">
             <mc:AlternateContent xmlns:mc="http://schemas.openxmlformats.org/markup-compatibility/2006">
               <mc:Choice xmlns:v="urn:schemas-microsoft-com:vml" Requires="v">
-                <p:oleObj spid="_x0000_s3094" name="Document" r:id="rId5" imgW="6096000" imgH="2197100" progId="Word.Document.12">
+                <p:oleObj spid="_x0000_s3095" name="Document" r:id="rId5" imgW="6096000" imgH="2197100" progId="Word.Document.12">
                   <p:embed/>
                 </p:oleObj>
               </mc:Choice>
@@ -30009,7 +30619,7 @@
   <p:timing>
     <p:tnLst>
       <p:par>
-        <p:cTn xmlns:p14="http://schemas.microsoft.com/office/powerpoint/2010/main" id="1" dur="indefinite" restart="never" nodeType="tmRoot"/>
+        <p:cTn id="1" dur="indefinite" restart="never" nodeType="tmRoot"/>
       </p:par>
     </p:tnLst>
   </p:timing>
@@ -30477,7 +31087,7 @@
           <a:graphicData uri="http://schemas.openxmlformats.org/presentationml/2006/ole">
             <mc:AlternateContent xmlns:mc="http://schemas.openxmlformats.org/markup-compatibility/2006">
               <mc:Choice xmlns:v="urn:schemas-microsoft-com:vml" Requires="v">
-                <p:oleObj spid="_x0000_s4118" name="Document" r:id="rId5" imgW="6096000" imgH="3378200" progId="Word.Document.12">
+                <p:oleObj spid="_x0000_s4119" name="Document" r:id="rId5" imgW="6096000" imgH="3378200" progId="Word.Document.12">
                   <p:embed/>
                 </p:oleObj>
               </mc:Choice>
@@ -30537,7 +31147,7 @@
   <p:timing>
     <p:tnLst>
       <p:par>
-        <p:cTn xmlns:p14="http://schemas.microsoft.com/office/powerpoint/2010/main" id="1" dur="indefinite" restart="never" nodeType="tmRoot"/>
+        <p:cTn id="1" dur="indefinite" restart="never" nodeType="tmRoot"/>
       </p:par>
     </p:tnLst>
   </p:timing>
@@ -31116,7 +31726,7 @@
   <p:timing>
     <p:tnLst>
       <p:par>
-        <p:cTn xmlns:p14="http://schemas.microsoft.com/office/powerpoint/2010/main" id="1" dur="indefinite" restart="never" nodeType="tmRoot"/>
+        <p:cTn id="1" dur="indefinite" restart="never" nodeType="tmRoot"/>
       </p:par>
     </p:tnLst>
   </p:timing>
@@ -32692,7 +33302,7 @@
   <p:timing>
     <p:tnLst>
       <p:par>
-        <p:cTn xmlns:p14="http://schemas.microsoft.com/office/powerpoint/2010/main" id="1" dur="indefinite" restart="never" nodeType="tmRoot"/>
+        <p:cTn id="1" dur="indefinite" restart="never" nodeType="tmRoot"/>
       </p:par>
     </p:tnLst>
   </p:timing>
@@ -33185,7 +33795,7 @@
   <p:timing>
     <p:tnLst>
       <p:par>
-        <p:cTn xmlns:p14="http://schemas.microsoft.com/office/powerpoint/2010/main" id="1" dur="indefinite" restart="never" nodeType="tmRoot"/>
+        <p:cTn id="1" dur="indefinite" restart="never" nodeType="tmRoot"/>
       </p:par>
     </p:tnLst>
   </p:timing>
@@ -33700,7 +34310,7 @@
   <p:timing>
     <p:tnLst>
       <p:par>
-        <p:cTn xmlns:p14="http://schemas.microsoft.com/office/powerpoint/2010/main" id="1" dur="indefinite" restart="never" nodeType="tmRoot"/>
+        <p:cTn id="1" dur="indefinite" restart="never" nodeType="tmRoot"/>
       </p:par>
     </p:tnLst>
   </p:timing>
@@ -34215,7 +34825,7 @@
   <p:timing>
     <p:tnLst>
       <p:par>
-        <p:cTn xmlns:p14="http://schemas.microsoft.com/office/powerpoint/2010/main" id="1" dur="indefinite" restart="never" nodeType="tmRoot"/>
+        <p:cTn id="1" dur="indefinite" restart="never" nodeType="tmRoot"/>
       </p:par>
     </p:tnLst>
   </p:timing>
@@ -34888,7 +35498,7 @@
   <p:timing>
     <p:tnLst>
       <p:par>
-        <p:cTn xmlns:p14="http://schemas.microsoft.com/office/powerpoint/2010/main" id="1" dur="indefinite" restart="never" nodeType="tmRoot"/>
+        <p:cTn id="1" dur="indefinite" restart="never" nodeType="tmRoot"/>
       </p:par>
     </p:tnLst>
   </p:timing>
@@ -35480,7 +36090,7 @@
   <p:timing>
     <p:tnLst>
       <p:par>
-        <p:cTn xmlns:p14="http://schemas.microsoft.com/office/powerpoint/2010/main" id="1" dur="indefinite" restart="never" nodeType="tmRoot"/>
+        <p:cTn id="1" dur="indefinite" restart="never" nodeType="tmRoot"/>
       </p:par>
     </p:tnLst>
   </p:timing>
@@ -36128,7 +36738,7 @@
   <p:timing>
     <p:tnLst>
       <p:par>
-        <p:cTn xmlns:p14="http://schemas.microsoft.com/office/powerpoint/2010/main" id="1" dur="indefinite" restart="never" nodeType="tmRoot"/>
+        <p:cTn id="1" dur="indefinite" restart="never" nodeType="tmRoot"/>
       </p:par>
     </p:tnLst>
   </p:timing>
@@ -36585,7 +37195,7 @@
   <p:timing>
     <p:tnLst>
       <p:par>
-        <p:cTn xmlns:p14="http://schemas.microsoft.com/office/powerpoint/2010/main" id="1" dur="indefinite" restart="never" nodeType="tmRoot"/>
+        <p:cTn id="1" dur="indefinite" restart="never" nodeType="tmRoot"/>
       </p:par>
     </p:tnLst>
   </p:timing>
@@ -37245,7 +37855,7 @@
   <p:timing>
     <p:tnLst>
       <p:par>
-        <p:cTn xmlns:p14="http://schemas.microsoft.com/office/powerpoint/2010/main" id="1" dur="indefinite" restart="never" nodeType="tmRoot"/>
+        <p:cTn id="1" dur="indefinite" restart="never" nodeType="tmRoot"/>
       </p:par>
     </p:tnLst>
   </p:timing>
@@ -37897,7 +38507,7 @@
   <p:timing>
     <p:tnLst>
       <p:par>
-        <p:cTn xmlns:p14="http://schemas.microsoft.com/office/powerpoint/2010/main" id="1" dur="indefinite" restart="never" nodeType="tmRoot"/>
+        <p:cTn id="1" dur="indefinite" restart="never" nodeType="tmRoot"/>
       </p:par>
     </p:tnLst>
   </p:timing>
@@ -38390,7 +39000,7 @@
   <p:timing>
     <p:tnLst>
       <p:par>
-        <p:cTn xmlns:p14="http://schemas.microsoft.com/office/powerpoint/2010/main" id="1" dur="indefinite" restart="never" nodeType="tmRoot"/>
+        <p:cTn id="1" dur="indefinite" restart="never" nodeType="tmRoot"/>
       </p:par>
     </p:tnLst>
   </p:timing>
@@ -39103,7 +39713,7 @@
   <p:timing>
     <p:tnLst>
       <p:par>
-        <p:cTn xmlns:p14="http://schemas.microsoft.com/office/powerpoint/2010/main" id="1" dur="indefinite" restart="never" nodeType="tmRoot"/>
+        <p:cTn id="1" dur="indefinite" restart="never" nodeType="tmRoot"/>
       </p:par>
     </p:tnLst>
   </p:timing>
@@ -40037,7 +40647,7 @@
   <p:timing>
     <p:tnLst>
       <p:par>
-        <p:cTn xmlns:p14="http://schemas.microsoft.com/office/powerpoint/2010/main" id="1" dur="indefinite" restart="never" nodeType="tmRoot"/>
+        <p:cTn id="1" dur="indefinite" restart="never" nodeType="tmRoot"/>
       </p:par>
     </p:tnLst>
   </p:timing>
@@ -40429,7 +41039,7 @@
                   <a:t>Reading a vertex, edge, or property: </a:t>
                 </a:r>
                 <a14:m>
-                  <m:oMath xmlns:m="http://schemas.openxmlformats.org/officeDocument/2006/math" xmlns="">
+                  <m:oMath xmlns:m="http://schemas.openxmlformats.org/officeDocument/2006/math">
                     <m:r>
                       <a:rPr lang="en-US" b="0" i="1" smtClean="0">
                         <a:solidFill>
@@ -40504,7 +41114,7 @@
                   <a:t>edges: </a:t>
                 </a:r>
                 <a14:m>
-                  <m:oMath xmlns:m="http://schemas.openxmlformats.org/officeDocument/2006/math" xmlns="">
+                  <m:oMath xmlns:m="http://schemas.openxmlformats.org/officeDocument/2006/math">
                     <m:r>
                       <a:rPr lang="en-US" b="0" i="1" smtClean="0">
                         <a:solidFill>
@@ -40547,7 +41157,7 @@
                   <a:t>, </a:t>
                 </a:r>
                 <a14:m>
-                  <m:oMath xmlns:m="http://schemas.openxmlformats.org/officeDocument/2006/math" xmlns="">
+                  <m:oMath xmlns:m="http://schemas.openxmlformats.org/officeDocument/2006/math">
                     <m:r>
                       <a:rPr lang="en-US" b="0" i="1" smtClean="0">
                         <a:solidFill>
@@ -40991,7 +41601,7 @@
   <p:timing>
     <p:tnLst>
       <p:par>
-        <p:cTn xmlns:p14="http://schemas.microsoft.com/office/powerpoint/2010/main" id="1" dur="indefinite" restart="never" nodeType="tmRoot"/>
+        <p:cTn id="1" dur="indefinite" restart="never" nodeType="tmRoot"/>
       </p:par>
     </p:tnLst>
   </p:timing>
@@ -41701,7 +42311,7 @@
   <p:timing>
     <p:tnLst>
       <p:par>
-        <p:cTn xmlns:p14="http://schemas.microsoft.com/office/powerpoint/2010/main" id="1" dur="indefinite" restart="never" nodeType="tmRoot"/>
+        <p:cTn id="1" dur="indefinite" restart="never" nodeType="tmRoot"/>
       </p:par>
     </p:tnLst>
   </p:timing>
@@ -42801,8 +43411,9 @@
               </a:bodyPr>
               <a:lstStyle/>
               <a:p>
+                <a:pPr/>
                 <a14:m>
-                  <m:oMathPara xmlns:m="http://schemas.openxmlformats.org/officeDocument/2006/math" xmlns="">
+                  <m:oMathPara xmlns:m="http://schemas.openxmlformats.org/officeDocument/2006/math">
                     <m:oMathParaPr>
                       <m:jc m:val="centerGroup"/>
                     </m:oMathParaPr>
@@ -43042,7 +43653,7 @@
   <p:timing>
     <p:tnLst>
       <p:par>
-        <p:cTn xmlns:p14="http://schemas.microsoft.com/office/powerpoint/2010/main" id="1" dur="indefinite" restart="never" nodeType="tmRoot"/>
+        <p:cTn id="1" dur="indefinite" restart="never" nodeType="tmRoot"/>
       </p:par>
     </p:tnLst>
   </p:timing>
@@ -44140,7 +44751,7 @@
   <p:timing>
     <p:tnLst>
       <p:par>
-        <p:cTn xmlns:p14="http://schemas.microsoft.com/office/powerpoint/2010/main" id="1" dur="indefinite" restart="never" nodeType="tmRoot"/>
+        <p:cTn id="1" dur="indefinite" restart="never" nodeType="tmRoot"/>
       </p:par>
     </p:tnLst>
   </p:timing>
@@ -45641,7 +46252,7 @@
   <p:timing>
     <p:tnLst>
       <p:par>
-        <p:cTn xmlns:p14="http://schemas.microsoft.com/office/powerpoint/2010/main" id="1" dur="indefinite" restart="never" nodeType="tmRoot"/>
+        <p:cTn id="1" dur="indefinite" restart="never" nodeType="tmRoot"/>
       </p:par>
     </p:tnLst>
   </p:timing>
@@ -46201,7 +46812,7 @@
   <p:timing>
     <p:tnLst>
       <p:par>
-        <p:cTn xmlns:p14="http://schemas.microsoft.com/office/powerpoint/2010/main" id="1" dur="indefinite" restart="never" nodeType="tmRoot"/>
+        <p:cTn id="1" dur="indefinite" restart="never" nodeType="tmRoot"/>
       </p:par>
     </p:tnLst>
   </p:timing>
@@ -46814,8 +47425,9 @@
               </a:bodyPr>
               <a:lstStyle/>
               <a:p>
+                <a:pPr/>
                 <a14:m>
-                  <m:oMathPara xmlns:m="http://schemas.openxmlformats.org/officeDocument/2006/math" xmlns="">
+                  <m:oMathPara xmlns:m="http://schemas.openxmlformats.org/officeDocument/2006/math">
                     <m:oMathParaPr>
                       <m:jc m:val="centerGroup"/>
                     </m:oMathParaPr>
@@ -47325,7 +47937,7 @@
   <p:timing>
     <p:tnLst>
       <p:par>
-        <p:cTn xmlns:p14="http://schemas.microsoft.com/office/powerpoint/2010/main" id="1" dur="indefinite" restart="never" nodeType="tmRoot"/>
+        <p:cTn id="1" dur="indefinite" restart="never" nodeType="tmRoot"/>
       </p:par>
     </p:tnLst>
   </p:timing>
@@ -47587,7 +48199,7 @@
   <a:extraClrSchemeLst/>
   <a:extLst>
     <a:ext uri="{05A4C25C-085E-4340-85A3-A5531E510DB2}">
-      <thm15:themeFamily xmlns:thm15="http://schemas.microsoft.com/office/thememl/2012/main" xmlns="" name="Office Theme" id="{62F939B6-93AF-4DB8-9C6B-D6C7DFDC589F}" vid="{4A3C46E8-61CC-4603-A589-7422A47A8E4A}"/>
+      <thm15:themeFamily xmlns:thm15="http://schemas.microsoft.com/office/thememl/2012/main" name="Office Theme" id="{62F939B6-93AF-4DB8-9C6B-D6C7DFDC589F}" vid="{4A3C46E8-61CC-4603-A589-7422A47A8E4A}"/>
     </a:ext>
   </a:extLst>
 </a:theme>
@@ -47848,7 +48460,7 @@
   <a:extraClrSchemeLst/>
   <a:extLst>
     <a:ext uri="{05A4C25C-085E-4340-85A3-A5531E510DB2}">
-      <thm15:themeFamily xmlns:thm15="http://schemas.microsoft.com/office/thememl/2012/main" xmlns="" name="Office Theme" id="{62F939B6-93AF-4DB8-9C6B-D6C7DFDC589F}" vid="{4A3C46E8-61CC-4603-A589-7422A47A8E4A}"/>
+      <thm15:themeFamily xmlns:thm15="http://schemas.microsoft.com/office/thememl/2012/main" name="Office Theme" id="{62F939B6-93AF-4DB8-9C6B-D6C7DFDC589F}" vid="{4A3C46E8-61CC-4603-A589-7422A47A8E4A}"/>
     </a:ext>
   </a:extLst>
 </a:theme>

</xml_diff>